<commit_message>
Demo for IMI Team
</commit_message>
<xml_diff>
--- a/DnD Knowledge Sharing - Powershell Task Automation.pptx
+++ b/DnD Knowledge Sharing - Powershell Task Automation.pptx
@@ -23,7 +23,9 @@
     <p:sldId id="278" r:id="rId17"/>
     <p:sldId id="279" r:id="rId18"/>
     <p:sldId id="280" r:id="rId19"/>
-    <p:sldId id="262" r:id="rId20"/>
+    <p:sldId id="286" r:id="rId20"/>
+    <p:sldId id="285" r:id="rId21"/>
+    <p:sldId id="283" r:id="rId22"/>
   </p:sldIdLst>
   <p:sldSz cx="9907588" cy="6858000"/>
   <p:notesSz cx="7772400" cy="10058400"/>
@@ -128,1185 +130,6 @@
     </p:ext>
   </p:extLst>
 </p:presentation>
-</file>
-
-<file path=ppt/revisionInfo.xml><?xml version="1.0" encoding="utf-8"?>
-<p1510:revInfo xmlns:a="http://schemas.openxmlformats.org/drawingml/2006/main" xmlns:r="http://schemas.openxmlformats.org/officeDocument/2006/relationships" xmlns:p1510="http://schemas.microsoft.com/office/powerpoint/2015/10/main">
-  <p1510:revLst>
-    <p1510:client id="{E70F2195-4369-414C-89DD-45E4502DC55A}" v="6369" dt="2022-12-15T01:27:40.021"/>
-    <p1510:client id="{EE1D13CC-5292-4A9B-A36E-C9C6FD6E8A58}" v="3" dt="2022-12-15T01:42:40.389"/>
-  </p1510:revLst>
-</p1510:revInfo>
-</file>
-
-<file path=ppt/changesInfos/changesInfo1.xml><?xml version="1.0" encoding="utf-8"?>
-<pc:chgInfo xmlns:a="http://schemas.openxmlformats.org/drawingml/2006/main" xmlns:r="http://schemas.openxmlformats.org/officeDocument/2006/relationships" xmlns:ac="http://schemas.microsoft.com/office/drawing/2013/main/command" xmlns:pc="http://schemas.microsoft.com/office/powerpoint/2013/main/command">
-  <pc:docChgLst>
-    <pc:chgData name="IMI TORIO, Bryndell S." userId="9ac92bdc-9297-429a-9c1d-d92c5c31c7e1" providerId="ADAL" clId="{EE1D13CC-5292-4A9B-A36E-C9C6FD6E8A58}"/>
-    <pc:docChg chg="modSld">
-      <pc:chgData name="IMI TORIO, Bryndell S." userId="9ac92bdc-9297-429a-9c1d-d92c5c31c7e1" providerId="ADAL" clId="{EE1D13CC-5292-4A9B-A36E-C9C6FD6E8A58}" dt="2022-12-15T01:42:40.389" v="2" actId="20577"/>
-      <pc:docMkLst>
-        <pc:docMk/>
-      </pc:docMkLst>
-      <pc:sldChg chg="modSp">
-        <pc:chgData name="IMI TORIO, Bryndell S." userId="9ac92bdc-9297-429a-9c1d-d92c5c31c7e1" providerId="ADAL" clId="{EE1D13CC-5292-4A9B-A36E-C9C6FD6E8A58}" dt="2022-12-15T01:42:40.389" v="2" actId="20577"/>
-        <pc:sldMkLst>
-          <pc:docMk/>
-          <pc:sldMk cId="2200638735" sldId="278"/>
-        </pc:sldMkLst>
-        <pc:spChg chg="mod">
-          <ac:chgData name="IMI TORIO, Bryndell S." userId="9ac92bdc-9297-429a-9c1d-d92c5c31c7e1" providerId="ADAL" clId="{EE1D13CC-5292-4A9B-A36E-C9C6FD6E8A58}" dt="2022-12-15T01:42:40.389" v="2" actId="20577"/>
-          <ac:spMkLst>
-            <pc:docMk/>
-            <pc:sldMk cId="2200638735" sldId="278"/>
-            <ac:spMk id="5" creationId="{664A213E-E4A6-40A3-8023-3B48FBAF1E04}"/>
-          </ac:spMkLst>
-        </pc:spChg>
-      </pc:sldChg>
-    </pc:docChg>
-  </pc:docChgLst>
-  <pc:docChgLst>
-    <pc:chgData name="IMI TORIO, Bryndell S." userId="9ac92bdc-9297-429a-9c1d-d92c5c31c7e1" providerId="ADAL" clId="{E70F2195-4369-414C-89DD-45E4502DC55A}"/>
-    <pc:docChg chg="undo custSel addSld delSld modSld sldOrd delMainMaster">
-      <pc:chgData name="IMI TORIO, Bryndell S." userId="9ac92bdc-9297-429a-9c1d-d92c5c31c7e1" providerId="ADAL" clId="{E70F2195-4369-414C-89DD-45E4502DC55A}" dt="2022-12-15T01:27:48.745" v="7705" actId="14100"/>
-      <pc:docMkLst>
-        <pc:docMk/>
-      </pc:docMkLst>
-      <pc:sldChg chg="modSp mod modAnim">
-        <pc:chgData name="IMI TORIO, Bryndell S." userId="9ac92bdc-9297-429a-9c1d-d92c5c31c7e1" providerId="ADAL" clId="{E70F2195-4369-414C-89DD-45E4502DC55A}" dt="2022-12-15T01:27:48.745" v="7705" actId="14100"/>
-        <pc:sldMkLst>
-          <pc:docMk/>
-          <pc:sldMk cId="0" sldId="256"/>
-        </pc:sldMkLst>
-        <pc:spChg chg="mod">
-          <ac:chgData name="IMI TORIO, Bryndell S." userId="9ac92bdc-9297-429a-9c1d-d92c5c31c7e1" providerId="ADAL" clId="{E70F2195-4369-414C-89DD-45E4502DC55A}" dt="2022-12-15T01:27:48.745" v="7705" actId="14100"/>
-          <ac:spMkLst>
-            <pc:docMk/>
-            <pc:sldMk cId="0" sldId="256"/>
-            <ac:spMk id="248" creationId="{00000000-0000-0000-0000-000000000000}"/>
-          </ac:spMkLst>
-        </pc:spChg>
-      </pc:sldChg>
-      <pc:sldChg chg="modSp mod modAnim">
-        <pc:chgData name="IMI TORIO, Bryndell S." userId="9ac92bdc-9297-429a-9c1d-d92c5c31c7e1" providerId="ADAL" clId="{E70F2195-4369-414C-89DD-45E4502DC55A}" dt="2022-12-12T09:50:14.152" v="1372" actId="20577"/>
-        <pc:sldMkLst>
-          <pc:docMk/>
-          <pc:sldMk cId="0" sldId="257"/>
-        </pc:sldMkLst>
-        <pc:spChg chg="mod">
-          <ac:chgData name="IMI TORIO, Bryndell S." userId="9ac92bdc-9297-429a-9c1d-d92c5c31c7e1" providerId="ADAL" clId="{E70F2195-4369-414C-89DD-45E4502DC55A}" dt="2022-12-12T08:57:47.901" v="622" actId="1076"/>
-          <ac:spMkLst>
-            <pc:docMk/>
-            <pc:sldMk cId="0" sldId="257"/>
-            <ac:spMk id="251" creationId="{00000000-0000-0000-0000-000000000000}"/>
-          </ac:spMkLst>
-        </pc:spChg>
-        <pc:spChg chg="mod">
-          <ac:chgData name="IMI TORIO, Bryndell S." userId="9ac92bdc-9297-429a-9c1d-d92c5c31c7e1" providerId="ADAL" clId="{E70F2195-4369-414C-89DD-45E4502DC55A}" dt="2022-12-12T09:50:14.152" v="1372" actId="20577"/>
-          <ac:spMkLst>
-            <pc:docMk/>
-            <pc:sldMk cId="0" sldId="257"/>
-            <ac:spMk id="252" creationId="{00000000-0000-0000-0000-000000000000}"/>
-          </ac:spMkLst>
-        </pc:spChg>
-      </pc:sldChg>
-      <pc:sldChg chg="modSp del mod">
-        <pc:chgData name="IMI TORIO, Bryndell S." userId="9ac92bdc-9297-429a-9c1d-d92c5c31c7e1" providerId="ADAL" clId="{E70F2195-4369-414C-89DD-45E4502DC55A}" dt="2022-12-12T08:59:00.209" v="658" actId="47"/>
-        <pc:sldMkLst>
-          <pc:docMk/>
-          <pc:sldMk cId="0" sldId="258"/>
-        </pc:sldMkLst>
-        <pc:spChg chg="mod">
-          <ac:chgData name="IMI TORIO, Bryndell S." userId="9ac92bdc-9297-429a-9c1d-d92c5c31c7e1" providerId="ADAL" clId="{E70F2195-4369-414C-89DD-45E4502DC55A}" dt="2022-12-12T08:58:14.832" v="626" actId="1076"/>
-          <ac:spMkLst>
-            <pc:docMk/>
-            <pc:sldMk cId="0" sldId="258"/>
-            <ac:spMk id="255" creationId="{00000000-0000-0000-0000-000000000000}"/>
-          </ac:spMkLst>
-        </pc:spChg>
-      </pc:sldChg>
-      <pc:sldChg chg="del">
-        <pc:chgData name="IMI TORIO, Bryndell S." userId="9ac92bdc-9297-429a-9c1d-d92c5c31c7e1" providerId="ADAL" clId="{E70F2195-4369-414C-89DD-45E4502DC55A}" dt="2022-12-12T09:13:33.316" v="1078" actId="47"/>
-        <pc:sldMkLst>
-          <pc:docMk/>
-          <pc:sldMk cId="0" sldId="259"/>
-        </pc:sldMkLst>
-      </pc:sldChg>
-      <pc:sldChg chg="addSp delSp modSp del mod">
-        <pc:chgData name="IMI TORIO, Bryndell S." userId="9ac92bdc-9297-429a-9c1d-d92c5c31c7e1" providerId="ADAL" clId="{E70F2195-4369-414C-89DD-45E4502DC55A}" dt="2022-12-12T09:15:10.421" v="1140" actId="47"/>
-        <pc:sldMkLst>
-          <pc:docMk/>
-          <pc:sldMk cId="0" sldId="260"/>
-        </pc:sldMkLst>
-        <pc:spChg chg="del">
-          <ac:chgData name="IMI TORIO, Bryndell S." userId="9ac92bdc-9297-429a-9c1d-d92c5c31c7e1" providerId="ADAL" clId="{E70F2195-4369-414C-89DD-45E4502DC55A}" dt="2022-12-12T08:35:53.374" v="361" actId="478"/>
-          <ac:spMkLst>
-            <pc:docMk/>
-            <pc:sldMk cId="0" sldId="260"/>
-            <ac:spMk id="2" creationId="{BCBA4245-1DBF-41FE-BAC5-A54D8B833C20}"/>
-          </ac:spMkLst>
-        </pc:spChg>
-        <pc:spChg chg="del">
-          <ac:chgData name="IMI TORIO, Bryndell S." userId="9ac92bdc-9297-429a-9c1d-d92c5c31c7e1" providerId="ADAL" clId="{E70F2195-4369-414C-89DD-45E4502DC55A}" dt="2022-12-12T08:35:51.498" v="358" actId="478"/>
-          <ac:spMkLst>
-            <pc:docMk/>
-            <pc:sldMk cId="0" sldId="260"/>
-            <ac:spMk id="3" creationId="{243C768A-C570-491D-9086-3065FA488693}"/>
-          </ac:spMkLst>
-        </pc:spChg>
-        <pc:spChg chg="del mod">
-          <ac:chgData name="IMI TORIO, Bryndell S." userId="9ac92bdc-9297-429a-9c1d-d92c5c31c7e1" providerId="ADAL" clId="{E70F2195-4369-414C-89DD-45E4502DC55A}" dt="2022-12-12T08:35:52.850" v="360" actId="478"/>
-          <ac:spMkLst>
-            <pc:docMk/>
-            <pc:sldMk cId="0" sldId="260"/>
-            <ac:spMk id="6" creationId="{10980ADA-2E4E-486E-8708-96474C15FB65}"/>
-          </ac:spMkLst>
-        </pc:spChg>
-        <pc:spChg chg="del">
-          <ac:chgData name="IMI TORIO, Bryndell S." userId="9ac92bdc-9297-429a-9c1d-d92c5c31c7e1" providerId="ADAL" clId="{E70F2195-4369-414C-89DD-45E4502DC55A}" dt="2022-12-12T08:35:59.917" v="365" actId="478"/>
-          <ac:spMkLst>
-            <pc:docMk/>
-            <pc:sldMk cId="0" sldId="260"/>
-            <ac:spMk id="7" creationId="{7845573C-965D-4C27-90A5-8621CC7A8C56}"/>
-          </ac:spMkLst>
-        </pc:spChg>
-        <pc:spChg chg="del">
-          <ac:chgData name="IMI TORIO, Bryndell S." userId="9ac92bdc-9297-429a-9c1d-d92c5c31c7e1" providerId="ADAL" clId="{E70F2195-4369-414C-89DD-45E4502DC55A}" dt="2022-12-12T08:35:50.777" v="357" actId="478"/>
-          <ac:spMkLst>
-            <pc:docMk/>
-            <pc:sldMk cId="0" sldId="260"/>
-            <ac:spMk id="9" creationId="{6313C74A-DBFF-4DC6-9849-482928CEEE18}"/>
-          </ac:spMkLst>
-        </pc:spChg>
-        <pc:spChg chg="del">
-          <ac:chgData name="IMI TORIO, Bryndell S." userId="9ac92bdc-9297-429a-9c1d-d92c5c31c7e1" providerId="ADAL" clId="{E70F2195-4369-414C-89DD-45E4502DC55A}" dt="2022-12-12T08:35:49.962" v="356" actId="478"/>
-          <ac:spMkLst>
-            <pc:docMk/>
-            <pc:sldMk cId="0" sldId="260"/>
-            <ac:spMk id="10" creationId="{8B24A795-731E-4403-9F3A-5BB06746CF6A}"/>
-          </ac:spMkLst>
-        </pc:spChg>
-        <pc:spChg chg="add del mod">
-          <ac:chgData name="IMI TORIO, Bryndell S." userId="9ac92bdc-9297-429a-9c1d-d92c5c31c7e1" providerId="ADAL" clId="{E70F2195-4369-414C-89DD-45E4502DC55A}" dt="2022-12-12T08:36:36.759" v="379" actId="20577"/>
-          <ac:spMkLst>
-            <pc:docMk/>
-            <pc:sldMk cId="0" sldId="260"/>
-            <ac:spMk id="11" creationId="{6B0799A8-925D-425F-B736-6D3D7D44B7B2}"/>
-          </ac:spMkLst>
-        </pc:spChg>
-        <pc:spChg chg="del">
-          <ac:chgData name="IMI TORIO, Bryndell S." userId="9ac92bdc-9297-429a-9c1d-d92c5c31c7e1" providerId="ADAL" clId="{E70F2195-4369-414C-89DD-45E4502DC55A}" dt="2022-12-12T08:36:00.668" v="366" actId="478"/>
-          <ac:spMkLst>
-            <pc:docMk/>
-            <pc:sldMk cId="0" sldId="260"/>
-            <ac:spMk id="12" creationId="{F44C8040-4373-414C-9446-473F1BCE51B0}"/>
-          </ac:spMkLst>
-        </pc:spChg>
-        <pc:spChg chg="mod">
-          <ac:chgData name="IMI TORIO, Bryndell S." userId="9ac92bdc-9297-429a-9c1d-d92c5c31c7e1" providerId="ADAL" clId="{E70F2195-4369-414C-89DD-45E4502DC55A}" dt="2022-12-12T08:33:54.011" v="162" actId="20577"/>
-          <ac:spMkLst>
-            <pc:docMk/>
-            <pc:sldMk cId="0" sldId="260"/>
-            <ac:spMk id="259" creationId="{00000000-0000-0000-0000-000000000000}"/>
-          </ac:spMkLst>
-        </pc:spChg>
-      </pc:sldChg>
-      <pc:sldChg chg="del">
-        <pc:chgData name="IMI TORIO, Bryndell S." userId="9ac92bdc-9297-429a-9c1d-d92c5c31c7e1" providerId="ADAL" clId="{E70F2195-4369-414C-89DD-45E4502DC55A}" dt="2022-12-12T10:14:12.396" v="1783" actId="47"/>
-        <pc:sldMkLst>
-          <pc:docMk/>
-          <pc:sldMk cId="0" sldId="261"/>
-        </pc:sldMkLst>
-      </pc:sldChg>
-      <pc:sldChg chg="modSp add del mod">
-        <pc:chgData name="IMI TORIO, Bryndell S." userId="9ac92bdc-9297-429a-9c1d-d92c5c31c7e1" providerId="ADAL" clId="{E70F2195-4369-414C-89DD-45E4502DC55A}" dt="2022-12-12T08:33:30.803" v="146" actId="47"/>
-        <pc:sldMkLst>
-          <pc:docMk/>
-          <pc:sldMk cId="2243668055" sldId="263"/>
-        </pc:sldMkLst>
-        <pc:spChg chg="mod">
-          <ac:chgData name="IMI TORIO, Bryndell S." userId="9ac92bdc-9297-429a-9c1d-d92c5c31c7e1" providerId="ADAL" clId="{E70F2195-4369-414C-89DD-45E4502DC55A}" dt="2022-12-12T08:33:23.750" v="145"/>
-          <ac:spMkLst>
-            <pc:docMk/>
-            <pc:sldMk cId="2243668055" sldId="263"/>
-            <ac:spMk id="11" creationId="{6B0799A8-925D-425F-B736-6D3D7D44B7B2}"/>
-          </ac:spMkLst>
-        </pc:spChg>
-        <pc:spChg chg="mod">
-          <ac:chgData name="IMI TORIO, Bryndell S." userId="9ac92bdc-9297-429a-9c1d-d92c5c31c7e1" providerId="ADAL" clId="{E70F2195-4369-414C-89DD-45E4502DC55A}" dt="2022-12-12T08:32:56.186" v="144" actId="20577"/>
-          <ac:spMkLst>
-            <pc:docMk/>
-            <pc:sldMk cId="2243668055" sldId="263"/>
-            <ac:spMk id="259" creationId="{00000000-0000-0000-0000-000000000000}"/>
-          </ac:spMkLst>
-        </pc:spChg>
-      </pc:sldChg>
-      <pc:sldChg chg="add del">
-        <pc:chgData name="IMI TORIO, Bryndell S." userId="9ac92bdc-9297-429a-9c1d-d92c5c31c7e1" providerId="ADAL" clId="{E70F2195-4369-414C-89DD-45E4502DC55A}" dt="2022-12-12T09:14:02.812" v="1090" actId="47"/>
-        <pc:sldMkLst>
-          <pc:docMk/>
-          <pc:sldMk cId="1986265483" sldId="264"/>
-        </pc:sldMkLst>
-      </pc:sldChg>
-      <pc:sldChg chg="addSp delSp modSp add del mod">
-        <pc:chgData name="IMI TORIO, Bryndell S." userId="9ac92bdc-9297-429a-9c1d-d92c5c31c7e1" providerId="ADAL" clId="{E70F2195-4369-414C-89DD-45E4502DC55A}" dt="2022-12-12T09:14:36.309" v="1123" actId="47"/>
-        <pc:sldMkLst>
-          <pc:docMk/>
-          <pc:sldMk cId="2478203474" sldId="265"/>
-        </pc:sldMkLst>
-        <pc:spChg chg="del">
-          <ac:chgData name="IMI TORIO, Bryndell S." userId="9ac92bdc-9297-429a-9c1d-d92c5c31c7e1" providerId="ADAL" clId="{E70F2195-4369-414C-89DD-45E4502DC55A}" dt="2022-12-12T08:41:24.467" v="381" actId="478"/>
-          <ac:spMkLst>
-            <pc:docMk/>
-            <pc:sldMk cId="2478203474" sldId="265"/>
-            <ac:spMk id="2" creationId="{BCBA4245-1DBF-41FE-BAC5-A54D8B833C20}"/>
-          </ac:spMkLst>
-        </pc:spChg>
-        <pc:spChg chg="del">
-          <ac:chgData name="IMI TORIO, Bryndell S." userId="9ac92bdc-9297-429a-9c1d-d92c5c31c7e1" providerId="ADAL" clId="{E70F2195-4369-414C-89DD-45E4502DC55A}" dt="2022-12-12T08:41:24.467" v="381" actId="478"/>
-          <ac:spMkLst>
-            <pc:docMk/>
-            <pc:sldMk cId="2478203474" sldId="265"/>
-            <ac:spMk id="3" creationId="{243C768A-C570-491D-9086-3065FA488693}"/>
-          </ac:spMkLst>
-        </pc:spChg>
-        <pc:spChg chg="del">
-          <ac:chgData name="IMI TORIO, Bryndell S." userId="9ac92bdc-9297-429a-9c1d-d92c5c31c7e1" providerId="ADAL" clId="{E70F2195-4369-414C-89DD-45E4502DC55A}" dt="2022-12-12T08:41:24.467" v="381" actId="478"/>
-          <ac:spMkLst>
-            <pc:docMk/>
-            <pc:sldMk cId="2478203474" sldId="265"/>
-            <ac:spMk id="6" creationId="{10980ADA-2E4E-486E-8708-96474C15FB65}"/>
-          </ac:spMkLst>
-        </pc:spChg>
-        <pc:spChg chg="del">
-          <ac:chgData name="IMI TORIO, Bryndell S." userId="9ac92bdc-9297-429a-9c1d-d92c5c31c7e1" providerId="ADAL" clId="{E70F2195-4369-414C-89DD-45E4502DC55A}" dt="2022-12-12T08:41:24.467" v="381" actId="478"/>
-          <ac:spMkLst>
-            <pc:docMk/>
-            <pc:sldMk cId="2478203474" sldId="265"/>
-            <ac:spMk id="7" creationId="{7845573C-965D-4C27-90A5-8621CC7A8C56}"/>
-          </ac:spMkLst>
-        </pc:spChg>
-        <pc:spChg chg="del">
-          <ac:chgData name="IMI TORIO, Bryndell S." userId="9ac92bdc-9297-429a-9c1d-d92c5c31c7e1" providerId="ADAL" clId="{E70F2195-4369-414C-89DD-45E4502DC55A}" dt="2022-12-12T08:41:24.467" v="381" actId="478"/>
-          <ac:spMkLst>
-            <pc:docMk/>
-            <pc:sldMk cId="2478203474" sldId="265"/>
-            <ac:spMk id="9" creationId="{6313C74A-DBFF-4DC6-9849-482928CEEE18}"/>
-          </ac:spMkLst>
-        </pc:spChg>
-        <pc:spChg chg="del">
-          <ac:chgData name="IMI TORIO, Bryndell S." userId="9ac92bdc-9297-429a-9c1d-d92c5c31c7e1" providerId="ADAL" clId="{E70F2195-4369-414C-89DD-45E4502DC55A}" dt="2022-12-12T08:41:24.467" v="381" actId="478"/>
-          <ac:spMkLst>
-            <pc:docMk/>
-            <pc:sldMk cId="2478203474" sldId="265"/>
-            <ac:spMk id="10" creationId="{8B24A795-731E-4403-9F3A-5BB06746CF6A}"/>
-          </ac:spMkLst>
-        </pc:spChg>
-        <pc:spChg chg="del">
-          <ac:chgData name="IMI TORIO, Bryndell S." userId="9ac92bdc-9297-429a-9c1d-d92c5c31c7e1" providerId="ADAL" clId="{E70F2195-4369-414C-89DD-45E4502DC55A}" dt="2022-12-12T08:41:26.829" v="382" actId="478"/>
-          <ac:spMkLst>
-            <pc:docMk/>
-            <pc:sldMk cId="2478203474" sldId="265"/>
-            <ac:spMk id="11" creationId="{6B0799A8-925D-425F-B736-6D3D7D44B7B2}"/>
-          </ac:spMkLst>
-        </pc:spChg>
-        <pc:spChg chg="del">
-          <ac:chgData name="IMI TORIO, Bryndell S." userId="9ac92bdc-9297-429a-9c1d-d92c5c31c7e1" providerId="ADAL" clId="{E70F2195-4369-414C-89DD-45E4502DC55A}" dt="2022-12-12T08:41:24.467" v="381" actId="478"/>
-          <ac:spMkLst>
-            <pc:docMk/>
-            <pc:sldMk cId="2478203474" sldId="265"/>
-            <ac:spMk id="12" creationId="{F44C8040-4373-414C-9446-473F1BCE51B0}"/>
-          </ac:spMkLst>
-        </pc:spChg>
-        <pc:spChg chg="add mod">
-          <ac:chgData name="IMI TORIO, Bryndell S." userId="9ac92bdc-9297-429a-9c1d-d92c5c31c7e1" providerId="ADAL" clId="{E70F2195-4369-414C-89DD-45E4502DC55A}" dt="2022-12-12T08:46:24.442" v="589" actId="5793"/>
-          <ac:spMkLst>
-            <pc:docMk/>
-            <pc:sldMk cId="2478203474" sldId="265"/>
-            <ac:spMk id="13" creationId="{21FFB878-3388-419E-B33D-11FF9DBA2556}"/>
-          </ac:spMkLst>
-        </pc:spChg>
-        <pc:spChg chg="mod">
-          <ac:chgData name="IMI TORIO, Bryndell S." userId="9ac92bdc-9297-429a-9c1d-d92c5c31c7e1" providerId="ADAL" clId="{E70F2195-4369-414C-89DD-45E4502DC55A}" dt="2022-12-12T08:46:19.140" v="587" actId="20577"/>
-          <ac:spMkLst>
-            <pc:docMk/>
-            <pc:sldMk cId="2478203474" sldId="265"/>
-            <ac:spMk id="259" creationId="{00000000-0000-0000-0000-000000000000}"/>
-          </ac:spMkLst>
-        </pc:spChg>
-      </pc:sldChg>
-      <pc:sldChg chg="delSp modSp add del mod">
-        <pc:chgData name="IMI TORIO, Bryndell S." userId="9ac92bdc-9297-429a-9c1d-d92c5c31c7e1" providerId="ADAL" clId="{E70F2195-4369-414C-89DD-45E4502DC55A}" dt="2022-12-12T09:12:11.980" v="1049" actId="47"/>
-        <pc:sldMkLst>
-          <pc:docMk/>
-          <pc:sldMk cId="3870654090" sldId="266"/>
-        </pc:sldMkLst>
-        <pc:spChg chg="mod">
-          <ac:chgData name="IMI TORIO, Bryndell S." userId="9ac92bdc-9297-429a-9c1d-d92c5c31c7e1" providerId="ADAL" clId="{E70F2195-4369-414C-89DD-45E4502DC55A}" dt="2022-12-12T08:58:07.391" v="625" actId="1076"/>
-          <ac:spMkLst>
-            <pc:docMk/>
-            <pc:sldMk cId="3870654090" sldId="266"/>
-            <ac:spMk id="255" creationId="{00000000-0000-0000-0000-000000000000}"/>
-          </ac:spMkLst>
-        </pc:spChg>
-        <pc:spChg chg="del">
-          <ac:chgData name="IMI TORIO, Bryndell S." userId="9ac92bdc-9297-429a-9c1d-d92c5c31c7e1" providerId="ADAL" clId="{E70F2195-4369-414C-89DD-45E4502DC55A}" dt="2022-12-12T08:57:11.048" v="591" actId="478"/>
-          <ac:spMkLst>
-            <pc:docMk/>
-            <pc:sldMk cId="3870654090" sldId="266"/>
-            <ac:spMk id="256" creationId="{00000000-0000-0000-0000-000000000000}"/>
-          </ac:spMkLst>
-        </pc:spChg>
-      </pc:sldChg>
-      <pc:sldChg chg="delSp modSp add del mod">
-        <pc:chgData name="IMI TORIO, Bryndell S." userId="9ac92bdc-9297-429a-9c1d-d92c5c31c7e1" providerId="ADAL" clId="{E70F2195-4369-414C-89DD-45E4502DC55A}" dt="2022-12-12T09:46:12.315" v="1321" actId="47"/>
-        <pc:sldMkLst>
-          <pc:docMk/>
-          <pc:sldMk cId="2449907356" sldId="267"/>
-        </pc:sldMkLst>
-        <pc:spChg chg="mod">
-          <ac:chgData name="IMI TORIO, Bryndell S." userId="9ac92bdc-9297-429a-9c1d-d92c5c31c7e1" providerId="ADAL" clId="{E70F2195-4369-414C-89DD-45E4502DC55A}" dt="2022-12-12T08:58:39.065" v="653" actId="20577"/>
-          <ac:spMkLst>
-            <pc:docMk/>
-            <pc:sldMk cId="2449907356" sldId="267"/>
-            <ac:spMk id="251" creationId="{00000000-0000-0000-0000-000000000000}"/>
-          </ac:spMkLst>
-        </pc:spChg>
-        <pc:spChg chg="mod">
-          <ac:chgData name="IMI TORIO, Bryndell S." userId="9ac92bdc-9297-429a-9c1d-d92c5c31c7e1" providerId="ADAL" clId="{E70F2195-4369-414C-89DD-45E4502DC55A}" dt="2022-12-12T09:45:51.608" v="1320" actId="20577"/>
-          <ac:spMkLst>
-            <pc:docMk/>
-            <pc:sldMk cId="2449907356" sldId="267"/>
-            <ac:spMk id="252" creationId="{00000000-0000-0000-0000-000000000000}"/>
-          </ac:spMkLst>
-        </pc:spChg>
-        <pc:picChg chg="del">
-          <ac:chgData name="IMI TORIO, Bryndell S." userId="9ac92bdc-9297-429a-9c1d-d92c5c31c7e1" providerId="ADAL" clId="{E70F2195-4369-414C-89DD-45E4502DC55A}" dt="2022-12-12T08:58:49.213" v="655" actId="478"/>
-          <ac:picMkLst>
-            <pc:docMk/>
-            <pc:sldMk cId="2449907356" sldId="267"/>
-            <ac:picMk id="253" creationId="{00000000-0000-0000-0000-000000000000}"/>
-          </ac:picMkLst>
-        </pc:picChg>
-        <pc:picChg chg="del">
-          <ac:chgData name="IMI TORIO, Bryndell S." userId="9ac92bdc-9297-429a-9c1d-d92c5c31c7e1" providerId="ADAL" clId="{E70F2195-4369-414C-89DD-45E4502DC55A}" dt="2022-12-12T08:58:49.843" v="656" actId="478"/>
-          <ac:picMkLst>
-            <pc:docMk/>
-            <pc:sldMk cId="2449907356" sldId="267"/>
-            <ac:picMk id="254" creationId="{00000000-0000-0000-0000-000000000000}"/>
-          </ac:picMkLst>
-        </pc:picChg>
-      </pc:sldChg>
-      <pc:sldChg chg="add modAnim">
-        <pc:chgData name="IMI TORIO, Bryndell S." userId="9ac92bdc-9297-429a-9c1d-d92c5c31c7e1" providerId="ADAL" clId="{E70F2195-4369-414C-89DD-45E4502DC55A}" dt="2022-12-12T09:38:40.181" v="1269"/>
-        <pc:sldMkLst>
-          <pc:docMk/>
-          <pc:sldMk cId="3575397427" sldId="268"/>
-        </pc:sldMkLst>
-      </pc:sldChg>
-      <pc:sldChg chg="addSp delSp modSp add del mod">
-        <pc:chgData name="IMI TORIO, Bryndell S." userId="9ac92bdc-9297-429a-9c1d-d92c5c31c7e1" providerId="ADAL" clId="{E70F2195-4369-414C-89DD-45E4502DC55A}" dt="2022-12-12T09:11:53.814" v="1047" actId="2696"/>
-        <pc:sldMkLst>
-          <pc:docMk/>
-          <pc:sldMk cId="4256195387" sldId="268"/>
-        </pc:sldMkLst>
-        <pc:spChg chg="add mod">
-          <ac:chgData name="IMI TORIO, Bryndell S." userId="9ac92bdc-9297-429a-9c1d-d92c5c31c7e1" providerId="ADAL" clId="{E70F2195-4369-414C-89DD-45E4502DC55A}" dt="2022-12-12T09:08:28.239" v="916" actId="1076"/>
-          <ac:spMkLst>
-            <pc:docMk/>
-            <pc:sldMk cId="4256195387" sldId="268"/>
-            <ac:spMk id="2" creationId="{E649D5A4-8A63-4316-9AB1-8D67CD48AF28}"/>
-          </ac:spMkLst>
-        </pc:spChg>
-        <pc:spChg chg="add mod">
-          <ac:chgData name="IMI TORIO, Bryndell S." userId="9ac92bdc-9297-429a-9c1d-d92c5c31c7e1" providerId="ADAL" clId="{E70F2195-4369-414C-89DD-45E4502DC55A}" dt="2022-12-12T09:09:14.837" v="928" actId="20577"/>
-          <ac:spMkLst>
-            <pc:docMk/>
-            <pc:sldMk cId="4256195387" sldId="268"/>
-            <ac:spMk id="3" creationId="{D08EC905-1046-4797-A19F-16BDF6B5A947}"/>
-          </ac:spMkLst>
-        </pc:spChg>
-        <pc:spChg chg="add mod ord">
-          <ac:chgData name="IMI TORIO, Bryndell S." userId="9ac92bdc-9297-429a-9c1d-d92c5c31c7e1" providerId="ADAL" clId="{E70F2195-4369-414C-89DD-45E4502DC55A}" dt="2022-12-12T09:08:28.239" v="916" actId="1076"/>
-          <ac:spMkLst>
-            <pc:docMk/>
-            <pc:sldMk cId="4256195387" sldId="268"/>
-            <ac:spMk id="5" creationId="{1D55CAF6-2C28-4DBE-B763-CF4B18C6ECBD}"/>
-          </ac:spMkLst>
-        </pc:spChg>
-        <pc:spChg chg="add mod ord">
-          <ac:chgData name="IMI TORIO, Bryndell S." userId="9ac92bdc-9297-429a-9c1d-d92c5c31c7e1" providerId="ADAL" clId="{E70F2195-4369-414C-89DD-45E4502DC55A}" dt="2022-12-12T09:08:28.239" v="916" actId="1076"/>
-          <ac:spMkLst>
-            <pc:docMk/>
-            <pc:sldMk cId="4256195387" sldId="268"/>
-            <ac:spMk id="6" creationId="{174BB642-DA86-4BA9-B804-82CA5A0DFF9E}"/>
-          </ac:spMkLst>
-        </pc:spChg>
-        <pc:spChg chg="add del mod ord">
-          <ac:chgData name="IMI TORIO, Bryndell S." userId="9ac92bdc-9297-429a-9c1d-d92c5c31c7e1" providerId="ADAL" clId="{E70F2195-4369-414C-89DD-45E4502DC55A}" dt="2022-12-12T09:03:30.781" v="740" actId="478"/>
-          <ac:spMkLst>
-            <pc:docMk/>
-            <pc:sldMk cId="4256195387" sldId="268"/>
-            <ac:spMk id="7" creationId="{DBDBF521-9E90-4955-A862-F3798E090A3A}"/>
-          </ac:spMkLst>
-        </pc:spChg>
-        <pc:spChg chg="add mod ord">
-          <ac:chgData name="IMI TORIO, Bryndell S." userId="9ac92bdc-9297-429a-9c1d-d92c5c31c7e1" providerId="ADAL" clId="{E70F2195-4369-414C-89DD-45E4502DC55A}" dt="2022-12-12T09:08:28.239" v="916" actId="1076"/>
-          <ac:spMkLst>
-            <pc:docMk/>
-            <pc:sldMk cId="4256195387" sldId="268"/>
-            <ac:spMk id="8" creationId="{14F67C74-FE7E-4B39-978C-13AB0854945E}"/>
-          </ac:spMkLst>
-        </pc:spChg>
-        <pc:spChg chg="add mod ord">
-          <ac:chgData name="IMI TORIO, Bryndell S." userId="9ac92bdc-9297-429a-9c1d-d92c5c31c7e1" providerId="ADAL" clId="{E70F2195-4369-414C-89DD-45E4502DC55A}" dt="2022-12-12T09:08:28.239" v="916" actId="1076"/>
-          <ac:spMkLst>
-            <pc:docMk/>
-            <pc:sldMk cId="4256195387" sldId="268"/>
-            <ac:spMk id="9" creationId="{14F3A5F1-8475-43C2-82C3-67B93B97052A}"/>
-          </ac:spMkLst>
-        </pc:spChg>
-        <pc:spChg chg="add mod">
-          <ac:chgData name="IMI TORIO, Bryndell S." userId="9ac92bdc-9297-429a-9c1d-d92c5c31c7e1" providerId="ADAL" clId="{E70F2195-4369-414C-89DD-45E4502DC55A}" dt="2022-12-12T09:10:13.383" v="952" actId="20577"/>
-          <ac:spMkLst>
-            <pc:docMk/>
-            <pc:sldMk cId="4256195387" sldId="268"/>
-            <ac:spMk id="12" creationId="{34914854-8A2D-4691-BA56-6F4736EF6D37}"/>
-          </ac:spMkLst>
-        </pc:spChg>
-        <pc:spChg chg="add mod">
-          <ac:chgData name="IMI TORIO, Bryndell S." userId="9ac92bdc-9297-429a-9c1d-d92c5c31c7e1" providerId="ADAL" clId="{E70F2195-4369-414C-89DD-45E4502DC55A}" dt="2022-12-12T09:10:33.996" v="972" actId="1076"/>
-          <ac:spMkLst>
-            <pc:docMk/>
-            <pc:sldMk cId="4256195387" sldId="268"/>
-            <ac:spMk id="14" creationId="{5E1750AA-FBC4-4E45-9722-69F8EEC8E0CA}"/>
-          </ac:spMkLst>
-        </pc:spChg>
-        <pc:spChg chg="add mod">
-          <ac:chgData name="IMI TORIO, Bryndell S." userId="9ac92bdc-9297-429a-9c1d-d92c5c31c7e1" providerId="ADAL" clId="{E70F2195-4369-414C-89DD-45E4502DC55A}" dt="2022-12-12T09:10:55.011" v="1000" actId="1076"/>
-          <ac:spMkLst>
-            <pc:docMk/>
-            <pc:sldMk cId="4256195387" sldId="268"/>
-            <ac:spMk id="16" creationId="{001A978D-4D63-4BC0-AC4C-91024AFDF58C}"/>
-          </ac:spMkLst>
-        </pc:spChg>
-        <pc:spChg chg="add mod ord">
-          <ac:chgData name="IMI TORIO, Bryndell S." userId="9ac92bdc-9297-429a-9c1d-d92c5c31c7e1" providerId="ADAL" clId="{E70F2195-4369-414C-89DD-45E4502DC55A}" dt="2022-12-12T09:08:28.239" v="916" actId="1076"/>
-          <ac:spMkLst>
-            <pc:docMk/>
-            <pc:sldMk cId="4256195387" sldId="268"/>
-            <ac:spMk id="17" creationId="{A2745C4E-1727-4DAB-BEB1-8F90732F4115}"/>
-          </ac:spMkLst>
-        </pc:spChg>
-        <pc:spChg chg="add mod">
-          <ac:chgData name="IMI TORIO, Bryndell S." userId="9ac92bdc-9297-429a-9c1d-d92c5c31c7e1" providerId="ADAL" clId="{E70F2195-4369-414C-89DD-45E4502DC55A}" dt="2022-12-12T09:11:12.044" v="1019" actId="14100"/>
-          <ac:spMkLst>
-            <pc:docMk/>
-            <pc:sldMk cId="4256195387" sldId="268"/>
-            <ac:spMk id="18" creationId="{CFE5310B-36E6-42EB-B671-F908B1D9F97A}"/>
-          </ac:spMkLst>
-        </pc:spChg>
-        <pc:spChg chg="add mod ord">
-          <ac:chgData name="IMI TORIO, Bryndell S." userId="9ac92bdc-9297-429a-9c1d-d92c5c31c7e1" providerId="ADAL" clId="{E70F2195-4369-414C-89DD-45E4502DC55A}" dt="2022-12-12T09:08:28.239" v="916" actId="1076"/>
-          <ac:spMkLst>
-            <pc:docMk/>
-            <pc:sldMk cId="4256195387" sldId="268"/>
-            <ac:spMk id="19" creationId="{147D66A3-9E8E-4818-8F29-B3DD5A7D834D}"/>
-          </ac:spMkLst>
-        </pc:spChg>
-        <pc:spChg chg="add mod">
-          <ac:chgData name="IMI TORIO, Bryndell S." userId="9ac92bdc-9297-429a-9c1d-d92c5c31c7e1" providerId="ADAL" clId="{E70F2195-4369-414C-89DD-45E4502DC55A}" dt="2022-12-12T09:11:31.637" v="1042" actId="1076"/>
-          <ac:spMkLst>
-            <pc:docMk/>
-            <pc:sldMk cId="4256195387" sldId="268"/>
-            <ac:spMk id="20" creationId="{8CB879BB-3714-4FDC-96EA-1E4ABB4C607B}"/>
-          </ac:spMkLst>
-        </pc:spChg>
-        <pc:spChg chg="mod">
-          <ac:chgData name="IMI TORIO, Bryndell S." userId="9ac92bdc-9297-429a-9c1d-d92c5c31c7e1" providerId="ADAL" clId="{E70F2195-4369-414C-89DD-45E4502DC55A}" dt="2022-12-12T08:59:12.134" v="682" actId="20577"/>
-          <ac:spMkLst>
-            <pc:docMk/>
-            <pc:sldMk cId="4256195387" sldId="268"/>
-            <ac:spMk id="251" creationId="{00000000-0000-0000-0000-000000000000}"/>
-          </ac:spMkLst>
-        </pc:spChg>
-        <pc:spChg chg="del">
-          <ac:chgData name="IMI TORIO, Bryndell S." userId="9ac92bdc-9297-429a-9c1d-d92c5c31c7e1" providerId="ADAL" clId="{E70F2195-4369-414C-89DD-45E4502DC55A}" dt="2022-12-12T08:59:21.855" v="683" actId="478"/>
-          <ac:spMkLst>
-            <pc:docMk/>
-            <pc:sldMk cId="4256195387" sldId="268"/>
-            <ac:spMk id="252" creationId="{00000000-0000-0000-0000-000000000000}"/>
-          </ac:spMkLst>
-        </pc:spChg>
-        <pc:cxnChg chg="add mod">
-          <ac:chgData name="IMI TORIO, Bryndell S." userId="9ac92bdc-9297-429a-9c1d-d92c5c31c7e1" providerId="ADAL" clId="{E70F2195-4369-414C-89DD-45E4502DC55A}" dt="2022-12-12T09:09:21.318" v="929" actId="14100"/>
-          <ac:cxnSpMkLst>
-            <pc:docMk/>
-            <pc:sldMk cId="4256195387" sldId="268"/>
-            <ac:cxnSpMk id="15" creationId="{0CFFD732-B87A-4797-9877-1F834C3DDE30}"/>
-          </ac:cxnSpMkLst>
-        </pc:cxnChg>
-        <pc:cxnChg chg="add mod">
-          <ac:chgData name="IMI TORIO, Bryndell S." userId="9ac92bdc-9297-429a-9c1d-d92c5c31c7e1" providerId="ADAL" clId="{E70F2195-4369-414C-89DD-45E4502DC55A}" dt="2022-12-12T09:09:41.494" v="932" actId="1076"/>
-          <ac:cxnSpMkLst>
-            <pc:docMk/>
-            <pc:sldMk cId="4256195387" sldId="268"/>
-            <ac:cxnSpMk id="24" creationId="{E8F23081-37CD-4F36-A812-5BAC4254A276}"/>
-          </ac:cxnSpMkLst>
-        </pc:cxnChg>
-        <pc:cxnChg chg="add mod">
-          <ac:chgData name="IMI TORIO, Bryndell S." userId="9ac92bdc-9297-429a-9c1d-d92c5c31c7e1" providerId="ADAL" clId="{E70F2195-4369-414C-89DD-45E4502DC55A}" dt="2022-12-12T09:11:43.138" v="1046" actId="14100"/>
-          <ac:cxnSpMkLst>
-            <pc:docMk/>
-            <pc:sldMk cId="4256195387" sldId="268"/>
-            <ac:cxnSpMk id="25" creationId="{BE06F20C-451A-4EC9-9B9C-89412784E581}"/>
-          </ac:cxnSpMkLst>
-        </pc:cxnChg>
-        <pc:cxnChg chg="add mod">
-          <ac:chgData name="IMI TORIO, Bryndell S." userId="9ac92bdc-9297-429a-9c1d-d92c5c31c7e1" providerId="ADAL" clId="{E70F2195-4369-414C-89DD-45E4502DC55A}" dt="2022-12-12T09:11:41.173" v="1045" actId="14100"/>
-          <ac:cxnSpMkLst>
-            <pc:docMk/>
-            <pc:sldMk cId="4256195387" sldId="268"/>
-            <ac:cxnSpMk id="26" creationId="{0C8A18BB-4CBE-4F13-A30D-F2EFDD0D01F6}"/>
-          </ac:cxnSpMkLst>
-        </pc:cxnChg>
-        <pc:cxnChg chg="add mod">
-          <ac:chgData name="IMI TORIO, Bryndell S." userId="9ac92bdc-9297-429a-9c1d-d92c5c31c7e1" providerId="ADAL" clId="{E70F2195-4369-414C-89DD-45E4502DC55A}" dt="2022-12-12T09:11:38.404" v="1044" actId="14100"/>
-          <ac:cxnSpMkLst>
-            <pc:docMk/>
-            <pc:sldMk cId="4256195387" sldId="268"/>
-            <ac:cxnSpMk id="27" creationId="{0EBC31EF-E280-404B-A4C4-144C078840CC}"/>
-          </ac:cxnSpMkLst>
-        </pc:cxnChg>
-        <pc:cxnChg chg="add mod">
-          <ac:chgData name="IMI TORIO, Bryndell S." userId="9ac92bdc-9297-429a-9c1d-d92c5c31c7e1" providerId="ADAL" clId="{E70F2195-4369-414C-89DD-45E4502DC55A}" dt="2022-12-12T09:11:36.069" v="1043" actId="14100"/>
-          <ac:cxnSpMkLst>
-            <pc:docMk/>
-            <pc:sldMk cId="4256195387" sldId="268"/>
-            <ac:cxnSpMk id="28" creationId="{7F2937B9-794B-4D72-A235-22525B3D76ED}"/>
-          </ac:cxnSpMkLst>
-        </pc:cxnChg>
-      </pc:sldChg>
-      <pc:sldChg chg="addSp modSp add mod modAnim">
-        <pc:chgData name="IMI TORIO, Bryndell S." userId="9ac92bdc-9297-429a-9c1d-d92c5c31c7e1" providerId="ADAL" clId="{E70F2195-4369-414C-89DD-45E4502DC55A}" dt="2022-12-12T09:47:31.158" v="1335"/>
-        <pc:sldMkLst>
-          <pc:docMk/>
-          <pc:sldMk cId="2940548046" sldId="269"/>
-        </pc:sldMkLst>
-        <pc:spChg chg="mod">
-          <ac:chgData name="IMI TORIO, Bryndell S." userId="9ac92bdc-9297-429a-9c1d-d92c5c31c7e1" providerId="ADAL" clId="{E70F2195-4369-414C-89DD-45E4502DC55A}" dt="2022-12-12T09:12:52.139" v="1062" actId="20577"/>
-          <ac:spMkLst>
-            <pc:docMk/>
-            <pc:sldMk cId="2940548046" sldId="269"/>
-            <ac:spMk id="251" creationId="{00000000-0000-0000-0000-000000000000}"/>
-          </ac:spMkLst>
-        </pc:spChg>
-        <pc:spChg chg="mod">
-          <ac:chgData name="IMI TORIO, Bryndell S." userId="9ac92bdc-9297-429a-9c1d-d92c5c31c7e1" providerId="ADAL" clId="{E70F2195-4369-414C-89DD-45E4502DC55A}" dt="2022-12-12T09:13:21.628" v="1077" actId="14100"/>
-          <ac:spMkLst>
-            <pc:docMk/>
-            <pc:sldMk cId="2940548046" sldId="269"/>
-            <ac:spMk id="252" creationId="{00000000-0000-0000-0000-000000000000}"/>
-          </ac:spMkLst>
-        </pc:spChg>
-        <pc:picChg chg="add mod">
-          <ac:chgData name="IMI TORIO, Bryndell S." userId="9ac92bdc-9297-429a-9c1d-d92c5c31c7e1" providerId="ADAL" clId="{E70F2195-4369-414C-89DD-45E4502DC55A}" dt="2022-12-12T09:13:19.145" v="1076" actId="1076"/>
-          <ac:picMkLst>
-            <pc:docMk/>
-            <pc:sldMk cId="2940548046" sldId="269"/>
-            <ac:picMk id="4" creationId="{6A3DA4A2-8113-4A4B-AFA9-C6926DF513C8}"/>
-          </ac:picMkLst>
-        </pc:picChg>
-      </pc:sldChg>
-      <pc:sldChg chg="addSp delSp modSp add mod modAnim">
-        <pc:chgData name="IMI TORIO, Bryndell S." userId="9ac92bdc-9297-429a-9c1d-d92c5c31c7e1" providerId="ADAL" clId="{E70F2195-4369-414C-89DD-45E4502DC55A}" dt="2022-12-12T09:28:32.803" v="1256"/>
-        <pc:sldMkLst>
-          <pc:docMk/>
-          <pc:sldMk cId="853409886" sldId="270"/>
-        </pc:sldMkLst>
-        <pc:spChg chg="add mod">
-          <ac:chgData name="IMI TORIO, Bryndell S." userId="9ac92bdc-9297-429a-9c1d-d92c5c31c7e1" providerId="ADAL" clId="{E70F2195-4369-414C-89DD-45E4502DC55A}" dt="2022-12-12T09:13:59.540" v="1089" actId="1076"/>
-          <ac:spMkLst>
-            <pc:docMk/>
-            <pc:sldMk cId="853409886" sldId="270"/>
-            <ac:spMk id="5" creationId="{1DFCDCC2-9B92-482D-A948-3C9BAF60C993}"/>
-          </ac:spMkLst>
-        </pc:spChg>
-        <pc:spChg chg="add mod">
-          <ac:chgData name="IMI TORIO, Bryndell S." userId="9ac92bdc-9297-429a-9c1d-d92c5c31c7e1" providerId="ADAL" clId="{E70F2195-4369-414C-89DD-45E4502DC55A}" dt="2022-12-12T09:13:59.540" v="1089" actId="1076"/>
-          <ac:spMkLst>
-            <pc:docMk/>
-            <pc:sldMk cId="853409886" sldId="270"/>
-            <ac:spMk id="6" creationId="{C659BD6A-2C5E-4FF5-A826-29354FDCC39D}"/>
-          </ac:spMkLst>
-        </pc:spChg>
-        <pc:spChg chg="add mod">
-          <ac:chgData name="IMI TORIO, Bryndell S." userId="9ac92bdc-9297-429a-9c1d-d92c5c31c7e1" providerId="ADAL" clId="{E70F2195-4369-414C-89DD-45E4502DC55A}" dt="2022-12-12T09:13:59.540" v="1089" actId="1076"/>
-          <ac:spMkLst>
-            <pc:docMk/>
-            <pc:sldMk cId="853409886" sldId="270"/>
-            <ac:spMk id="7" creationId="{22024EB0-3536-46CF-B056-4D1C06D031EC}"/>
-          </ac:spMkLst>
-        </pc:spChg>
-        <pc:spChg chg="add mod">
-          <ac:chgData name="IMI TORIO, Bryndell S." userId="9ac92bdc-9297-429a-9c1d-d92c5c31c7e1" providerId="ADAL" clId="{E70F2195-4369-414C-89DD-45E4502DC55A}" dt="2022-12-12T09:13:59.540" v="1089" actId="1076"/>
-          <ac:spMkLst>
-            <pc:docMk/>
-            <pc:sldMk cId="853409886" sldId="270"/>
-            <ac:spMk id="8" creationId="{C78E14DA-F60B-44B1-A64A-5AF47C4BFAF0}"/>
-          </ac:spMkLst>
-        </pc:spChg>
-        <pc:spChg chg="add mod">
-          <ac:chgData name="IMI TORIO, Bryndell S." userId="9ac92bdc-9297-429a-9c1d-d92c5c31c7e1" providerId="ADAL" clId="{E70F2195-4369-414C-89DD-45E4502DC55A}" dt="2022-12-12T09:13:59.540" v="1089" actId="1076"/>
-          <ac:spMkLst>
-            <pc:docMk/>
-            <pc:sldMk cId="853409886" sldId="270"/>
-            <ac:spMk id="9" creationId="{CD5FAC25-EF30-413F-A001-BE4BD362837B}"/>
-          </ac:spMkLst>
-        </pc:spChg>
-        <pc:spChg chg="add mod">
-          <ac:chgData name="IMI TORIO, Bryndell S." userId="9ac92bdc-9297-429a-9c1d-d92c5c31c7e1" providerId="ADAL" clId="{E70F2195-4369-414C-89DD-45E4502DC55A}" dt="2022-12-12T09:13:59.540" v="1089" actId="1076"/>
-          <ac:spMkLst>
-            <pc:docMk/>
-            <pc:sldMk cId="853409886" sldId="270"/>
-            <ac:spMk id="10" creationId="{5A848C48-4B56-4A0A-BEB8-3B4BA1812107}"/>
-          </ac:spMkLst>
-        </pc:spChg>
-        <pc:spChg chg="add mod">
-          <ac:chgData name="IMI TORIO, Bryndell S." userId="9ac92bdc-9297-429a-9c1d-d92c5c31c7e1" providerId="ADAL" clId="{E70F2195-4369-414C-89DD-45E4502DC55A}" dt="2022-12-12T09:13:59.540" v="1089" actId="1076"/>
-          <ac:spMkLst>
-            <pc:docMk/>
-            <pc:sldMk cId="853409886" sldId="270"/>
-            <ac:spMk id="11" creationId="{2D163225-6E11-448F-A737-BD5866D4399F}"/>
-          </ac:spMkLst>
-        </pc:spChg>
-        <pc:spChg chg="mod">
-          <ac:chgData name="IMI TORIO, Bryndell S." userId="9ac92bdc-9297-429a-9c1d-d92c5c31c7e1" providerId="ADAL" clId="{E70F2195-4369-414C-89DD-45E4502DC55A}" dt="2022-12-12T09:13:38.982" v="1085" actId="20577"/>
-          <ac:spMkLst>
-            <pc:docMk/>
-            <pc:sldMk cId="853409886" sldId="270"/>
-            <ac:spMk id="251" creationId="{00000000-0000-0000-0000-000000000000}"/>
-          </ac:spMkLst>
-        </pc:spChg>
-        <pc:spChg chg="mod">
-          <ac:chgData name="IMI TORIO, Bryndell S." userId="9ac92bdc-9297-429a-9c1d-d92c5c31c7e1" providerId="ADAL" clId="{E70F2195-4369-414C-89DD-45E4502DC55A}" dt="2022-12-12T09:13:46.491" v="1086"/>
-          <ac:spMkLst>
-            <pc:docMk/>
-            <pc:sldMk cId="853409886" sldId="270"/>
-            <ac:spMk id="252" creationId="{00000000-0000-0000-0000-000000000000}"/>
-          </ac:spMkLst>
-        </pc:spChg>
-        <pc:picChg chg="del">
-          <ac:chgData name="IMI TORIO, Bryndell S." userId="9ac92bdc-9297-429a-9c1d-d92c5c31c7e1" providerId="ADAL" clId="{E70F2195-4369-414C-89DD-45E4502DC55A}" dt="2022-12-12T09:13:56.513" v="1087" actId="478"/>
-          <ac:picMkLst>
-            <pc:docMk/>
-            <pc:sldMk cId="853409886" sldId="270"/>
-            <ac:picMk id="4" creationId="{6A3DA4A2-8113-4A4B-AFA9-C6926DF513C8}"/>
-          </ac:picMkLst>
-        </pc:picChg>
-      </pc:sldChg>
-      <pc:sldChg chg="addSp delSp modSp add mod ord modAnim">
-        <pc:chgData name="IMI TORIO, Bryndell S." userId="9ac92bdc-9297-429a-9c1d-d92c5c31c7e1" providerId="ADAL" clId="{E70F2195-4369-414C-89DD-45E4502DC55A}" dt="2022-12-12T10:13:28.836" v="1782" actId="14100"/>
-        <pc:sldMkLst>
-          <pc:docMk/>
-          <pc:sldMk cId="1133884213" sldId="271"/>
-        </pc:sldMkLst>
-        <pc:spChg chg="del">
-          <ac:chgData name="IMI TORIO, Bryndell S." userId="9ac92bdc-9297-429a-9c1d-d92c5c31c7e1" providerId="ADAL" clId="{E70F2195-4369-414C-89DD-45E4502DC55A}" dt="2022-12-12T09:14:17.839" v="1092" actId="478"/>
-          <ac:spMkLst>
-            <pc:docMk/>
-            <pc:sldMk cId="1133884213" sldId="271"/>
-            <ac:spMk id="2" creationId="{E649D5A4-8A63-4316-9AB1-8D67CD48AF28}"/>
-          </ac:spMkLst>
-        </pc:spChg>
-        <pc:spChg chg="del">
-          <ac:chgData name="IMI TORIO, Bryndell S." userId="9ac92bdc-9297-429a-9c1d-d92c5c31c7e1" providerId="ADAL" clId="{E70F2195-4369-414C-89DD-45E4502DC55A}" dt="2022-12-12T09:14:17.839" v="1092" actId="478"/>
-          <ac:spMkLst>
-            <pc:docMk/>
-            <pc:sldMk cId="1133884213" sldId="271"/>
-            <ac:spMk id="3" creationId="{D08EC905-1046-4797-A19F-16BDF6B5A947}"/>
-          </ac:spMkLst>
-        </pc:spChg>
-        <pc:spChg chg="del">
-          <ac:chgData name="IMI TORIO, Bryndell S." userId="9ac92bdc-9297-429a-9c1d-d92c5c31c7e1" providerId="ADAL" clId="{E70F2195-4369-414C-89DD-45E4502DC55A}" dt="2022-12-12T09:14:17.839" v="1092" actId="478"/>
-          <ac:spMkLst>
-            <pc:docMk/>
-            <pc:sldMk cId="1133884213" sldId="271"/>
-            <ac:spMk id="5" creationId="{1D55CAF6-2C28-4DBE-B763-CF4B18C6ECBD}"/>
-          </ac:spMkLst>
-        </pc:spChg>
-        <pc:spChg chg="del">
-          <ac:chgData name="IMI TORIO, Bryndell S." userId="9ac92bdc-9297-429a-9c1d-d92c5c31c7e1" providerId="ADAL" clId="{E70F2195-4369-414C-89DD-45E4502DC55A}" dt="2022-12-12T09:14:17.839" v="1092" actId="478"/>
-          <ac:spMkLst>
-            <pc:docMk/>
-            <pc:sldMk cId="1133884213" sldId="271"/>
-            <ac:spMk id="6" creationId="{174BB642-DA86-4BA9-B804-82CA5A0DFF9E}"/>
-          </ac:spMkLst>
-        </pc:spChg>
-        <pc:spChg chg="del">
-          <ac:chgData name="IMI TORIO, Bryndell S." userId="9ac92bdc-9297-429a-9c1d-d92c5c31c7e1" providerId="ADAL" clId="{E70F2195-4369-414C-89DD-45E4502DC55A}" dt="2022-12-12T09:14:17.839" v="1092" actId="478"/>
-          <ac:spMkLst>
-            <pc:docMk/>
-            <pc:sldMk cId="1133884213" sldId="271"/>
-            <ac:spMk id="8" creationId="{14F67C74-FE7E-4B39-978C-13AB0854945E}"/>
-          </ac:spMkLst>
-        </pc:spChg>
-        <pc:spChg chg="del">
-          <ac:chgData name="IMI TORIO, Bryndell S." userId="9ac92bdc-9297-429a-9c1d-d92c5c31c7e1" providerId="ADAL" clId="{E70F2195-4369-414C-89DD-45E4502DC55A}" dt="2022-12-12T09:14:17.839" v="1092" actId="478"/>
-          <ac:spMkLst>
-            <pc:docMk/>
-            <pc:sldMk cId="1133884213" sldId="271"/>
-            <ac:spMk id="9" creationId="{14F3A5F1-8475-43C2-82C3-67B93B97052A}"/>
-          </ac:spMkLst>
-        </pc:spChg>
-        <pc:spChg chg="del">
-          <ac:chgData name="IMI TORIO, Bryndell S." userId="9ac92bdc-9297-429a-9c1d-d92c5c31c7e1" providerId="ADAL" clId="{E70F2195-4369-414C-89DD-45E4502DC55A}" dt="2022-12-12T09:14:17.839" v="1092" actId="478"/>
-          <ac:spMkLst>
-            <pc:docMk/>
-            <pc:sldMk cId="1133884213" sldId="271"/>
-            <ac:spMk id="12" creationId="{34914854-8A2D-4691-BA56-6F4736EF6D37}"/>
-          </ac:spMkLst>
-        </pc:spChg>
-        <pc:spChg chg="del">
-          <ac:chgData name="IMI TORIO, Bryndell S." userId="9ac92bdc-9297-429a-9c1d-d92c5c31c7e1" providerId="ADAL" clId="{E70F2195-4369-414C-89DD-45E4502DC55A}" dt="2022-12-12T09:14:17.839" v="1092" actId="478"/>
-          <ac:spMkLst>
-            <pc:docMk/>
-            <pc:sldMk cId="1133884213" sldId="271"/>
-            <ac:spMk id="14" creationId="{5E1750AA-FBC4-4E45-9722-69F8EEC8E0CA}"/>
-          </ac:spMkLst>
-        </pc:spChg>
-        <pc:spChg chg="del">
-          <ac:chgData name="IMI TORIO, Bryndell S." userId="9ac92bdc-9297-429a-9c1d-d92c5c31c7e1" providerId="ADAL" clId="{E70F2195-4369-414C-89DD-45E4502DC55A}" dt="2022-12-12T09:14:17.839" v="1092" actId="478"/>
-          <ac:spMkLst>
-            <pc:docMk/>
-            <pc:sldMk cId="1133884213" sldId="271"/>
-            <ac:spMk id="16" creationId="{001A978D-4D63-4BC0-AC4C-91024AFDF58C}"/>
-          </ac:spMkLst>
-        </pc:spChg>
-        <pc:spChg chg="del">
-          <ac:chgData name="IMI TORIO, Bryndell S." userId="9ac92bdc-9297-429a-9c1d-d92c5c31c7e1" providerId="ADAL" clId="{E70F2195-4369-414C-89DD-45E4502DC55A}" dt="2022-12-12T09:14:17.839" v="1092" actId="478"/>
-          <ac:spMkLst>
-            <pc:docMk/>
-            <pc:sldMk cId="1133884213" sldId="271"/>
-            <ac:spMk id="17" creationId="{A2745C4E-1727-4DAB-BEB1-8F90732F4115}"/>
-          </ac:spMkLst>
-        </pc:spChg>
-        <pc:spChg chg="del">
-          <ac:chgData name="IMI TORIO, Bryndell S." userId="9ac92bdc-9297-429a-9c1d-d92c5c31c7e1" providerId="ADAL" clId="{E70F2195-4369-414C-89DD-45E4502DC55A}" dt="2022-12-12T09:14:17.839" v="1092" actId="478"/>
-          <ac:spMkLst>
-            <pc:docMk/>
-            <pc:sldMk cId="1133884213" sldId="271"/>
-            <ac:spMk id="18" creationId="{CFE5310B-36E6-42EB-B671-F908B1D9F97A}"/>
-          </ac:spMkLst>
-        </pc:spChg>
-        <pc:spChg chg="del">
-          <ac:chgData name="IMI TORIO, Bryndell S." userId="9ac92bdc-9297-429a-9c1d-d92c5c31c7e1" providerId="ADAL" clId="{E70F2195-4369-414C-89DD-45E4502DC55A}" dt="2022-12-12T09:14:17.839" v="1092" actId="478"/>
-          <ac:spMkLst>
-            <pc:docMk/>
-            <pc:sldMk cId="1133884213" sldId="271"/>
-            <ac:spMk id="19" creationId="{147D66A3-9E8E-4818-8F29-B3DD5A7D834D}"/>
-          </ac:spMkLst>
-        </pc:spChg>
-        <pc:spChg chg="del">
-          <ac:chgData name="IMI TORIO, Bryndell S." userId="9ac92bdc-9297-429a-9c1d-d92c5c31c7e1" providerId="ADAL" clId="{E70F2195-4369-414C-89DD-45E4502DC55A}" dt="2022-12-12T09:14:17.839" v="1092" actId="478"/>
-          <ac:spMkLst>
-            <pc:docMk/>
-            <pc:sldMk cId="1133884213" sldId="271"/>
-            <ac:spMk id="20" creationId="{8CB879BB-3714-4FDC-96EA-1E4ABB4C607B}"/>
-          </ac:spMkLst>
-        </pc:spChg>
-        <pc:spChg chg="add mod">
-          <ac:chgData name="IMI TORIO, Bryndell S." userId="9ac92bdc-9297-429a-9c1d-d92c5c31c7e1" providerId="ADAL" clId="{E70F2195-4369-414C-89DD-45E4502DC55A}" dt="2022-12-12T10:13:28.836" v="1782" actId="14100"/>
-          <ac:spMkLst>
-            <pc:docMk/>
-            <pc:sldMk cId="1133884213" sldId="271"/>
-            <ac:spMk id="22" creationId="{3C8CFE7E-37AE-4C1E-8F6A-A6EE8C95E39D}"/>
-          </ac:spMkLst>
-        </pc:spChg>
-        <pc:spChg chg="mod">
-          <ac:chgData name="IMI TORIO, Bryndell S." userId="9ac92bdc-9297-429a-9c1d-d92c5c31c7e1" providerId="ADAL" clId="{E70F2195-4369-414C-89DD-45E4502DC55A}" dt="2022-12-12T09:40:12.077" v="1284" actId="20577"/>
-          <ac:spMkLst>
-            <pc:docMk/>
-            <pc:sldMk cId="1133884213" sldId="271"/>
-            <ac:spMk id="251" creationId="{00000000-0000-0000-0000-000000000000}"/>
-          </ac:spMkLst>
-        </pc:spChg>
-        <pc:cxnChg chg="del mod">
-          <ac:chgData name="IMI TORIO, Bryndell S." userId="9ac92bdc-9297-429a-9c1d-d92c5c31c7e1" providerId="ADAL" clId="{E70F2195-4369-414C-89DD-45E4502DC55A}" dt="2022-12-12T09:14:17.839" v="1092" actId="478"/>
-          <ac:cxnSpMkLst>
-            <pc:docMk/>
-            <pc:sldMk cId="1133884213" sldId="271"/>
-            <ac:cxnSpMk id="15" creationId="{0CFFD732-B87A-4797-9877-1F834C3DDE30}"/>
-          </ac:cxnSpMkLst>
-        </pc:cxnChg>
-        <pc:cxnChg chg="del">
-          <ac:chgData name="IMI TORIO, Bryndell S." userId="9ac92bdc-9297-429a-9c1d-d92c5c31c7e1" providerId="ADAL" clId="{E70F2195-4369-414C-89DD-45E4502DC55A}" dt="2022-12-12T09:14:17.839" v="1092" actId="478"/>
-          <ac:cxnSpMkLst>
-            <pc:docMk/>
-            <pc:sldMk cId="1133884213" sldId="271"/>
-            <ac:cxnSpMk id="24" creationId="{E8F23081-37CD-4F36-A812-5BAC4254A276}"/>
-          </ac:cxnSpMkLst>
-        </pc:cxnChg>
-        <pc:cxnChg chg="del">
-          <ac:chgData name="IMI TORIO, Bryndell S." userId="9ac92bdc-9297-429a-9c1d-d92c5c31c7e1" providerId="ADAL" clId="{E70F2195-4369-414C-89DD-45E4502DC55A}" dt="2022-12-12T09:14:17.839" v="1092" actId="478"/>
-          <ac:cxnSpMkLst>
-            <pc:docMk/>
-            <pc:sldMk cId="1133884213" sldId="271"/>
-            <ac:cxnSpMk id="25" creationId="{BE06F20C-451A-4EC9-9B9C-89412784E581}"/>
-          </ac:cxnSpMkLst>
-        </pc:cxnChg>
-        <pc:cxnChg chg="del">
-          <ac:chgData name="IMI TORIO, Bryndell S." userId="9ac92bdc-9297-429a-9c1d-d92c5c31c7e1" providerId="ADAL" clId="{E70F2195-4369-414C-89DD-45E4502DC55A}" dt="2022-12-12T09:14:17.839" v="1092" actId="478"/>
-          <ac:cxnSpMkLst>
-            <pc:docMk/>
-            <pc:sldMk cId="1133884213" sldId="271"/>
-            <ac:cxnSpMk id="26" creationId="{0C8A18BB-4CBE-4F13-A30D-F2EFDD0D01F6}"/>
-          </ac:cxnSpMkLst>
-        </pc:cxnChg>
-        <pc:cxnChg chg="del">
-          <ac:chgData name="IMI TORIO, Bryndell S." userId="9ac92bdc-9297-429a-9c1d-d92c5c31c7e1" providerId="ADAL" clId="{E70F2195-4369-414C-89DD-45E4502DC55A}" dt="2022-12-12T09:14:17.839" v="1092" actId="478"/>
-          <ac:cxnSpMkLst>
-            <pc:docMk/>
-            <pc:sldMk cId="1133884213" sldId="271"/>
-            <ac:cxnSpMk id="27" creationId="{0EBC31EF-E280-404B-A4C4-144C078840CC}"/>
-          </ac:cxnSpMkLst>
-        </pc:cxnChg>
-        <pc:cxnChg chg="del">
-          <ac:chgData name="IMI TORIO, Bryndell S." userId="9ac92bdc-9297-429a-9c1d-d92c5c31c7e1" providerId="ADAL" clId="{E70F2195-4369-414C-89DD-45E4502DC55A}" dt="2022-12-12T09:14:17.839" v="1092" actId="478"/>
-          <ac:cxnSpMkLst>
-            <pc:docMk/>
-            <pc:sldMk cId="1133884213" sldId="271"/>
-            <ac:cxnSpMk id="28" creationId="{7F2937B9-794B-4D72-A235-22525B3D76ED}"/>
-          </ac:cxnSpMkLst>
-        </pc:cxnChg>
-      </pc:sldChg>
-      <pc:sldChg chg="modSp add mod modAnim">
-        <pc:chgData name="IMI TORIO, Bryndell S." userId="9ac92bdc-9297-429a-9c1d-d92c5c31c7e1" providerId="ADAL" clId="{E70F2195-4369-414C-89DD-45E4502DC55A}" dt="2022-12-15T01:10:23.512" v="7703" actId="20577"/>
-        <pc:sldMkLst>
-          <pc:docMk/>
-          <pc:sldMk cId="4202069611" sldId="272"/>
-        </pc:sldMkLst>
-        <pc:spChg chg="mod">
-          <ac:chgData name="IMI TORIO, Bryndell S." userId="9ac92bdc-9297-429a-9c1d-d92c5c31c7e1" providerId="ADAL" clId="{E70F2195-4369-414C-89DD-45E4502DC55A}" dt="2022-12-15T01:10:23.512" v="7703" actId="20577"/>
-          <ac:spMkLst>
-            <pc:docMk/>
-            <pc:sldMk cId="4202069611" sldId="272"/>
-            <ac:spMk id="22" creationId="{3C8CFE7E-37AE-4C1E-8F6A-A6EE8C95E39D}"/>
-          </ac:spMkLst>
-        </pc:spChg>
-        <pc:spChg chg="mod">
-          <ac:chgData name="IMI TORIO, Bryndell S." userId="9ac92bdc-9297-429a-9c1d-d92c5c31c7e1" providerId="ADAL" clId="{E70F2195-4369-414C-89DD-45E4502DC55A}" dt="2022-12-12T09:14:58.434" v="1137" actId="20577"/>
-          <ac:spMkLst>
-            <pc:docMk/>
-            <pc:sldMk cId="4202069611" sldId="272"/>
-            <ac:spMk id="251" creationId="{00000000-0000-0000-0000-000000000000}"/>
-          </ac:spMkLst>
-        </pc:spChg>
-      </pc:sldChg>
-      <pc:sldChg chg="addSp delSp modSp add mod modAnim">
-        <pc:chgData name="IMI TORIO, Bryndell S." userId="9ac92bdc-9297-429a-9c1d-d92c5c31c7e1" providerId="ADAL" clId="{E70F2195-4369-414C-89DD-45E4502DC55A}" dt="2022-12-14T09:41:06.617" v="5799"/>
-        <pc:sldMkLst>
-          <pc:docMk/>
-          <pc:sldMk cId="724643194" sldId="273"/>
-        </pc:sldMkLst>
-        <pc:spChg chg="add mod">
-          <ac:chgData name="IMI TORIO, Bryndell S." userId="9ac92bdc-9297-429a-9c1d-d92c5c31c7e1" providerId="ADAL" clId="{E70F2195-4369-414C-89DD-45E4502DC55A}" dt="2022-12-14T09:28:45.088" v="4682"/>
-          <ac:spMkLst>
-            <pc:docMk/>
-            <pc:sldMk cId="724643194" sldId="273"/>
-            <ac:spMk id="5" creationId="{664A213E-E4A6-40A3-8023-3B48FBAF1E04}"/>
-          </ac:spMkLst>
-        </pc:spChg>
-        <pc:spChg chg="del">
-          <ac:chgData name="IMI TORIO, Bryndell S." userId="9ac92bdc-9297-429a-9c1d-d92c5c31c7e1" providerId="ADAL" clId="{E70F2195-4369-414C-89DD-45E4502DC55A}" dt="2022-12-12T09:15:25.634" v="1143" actId="478"/>
-          <ac:spMkLst>
-            <pc:docMk/>
-            <pc:sldMk cId="724643194" sldId="273"/>
-            <ac:spMk id="22" creationId="{3C8CFE7E-37AE-4C1E-8F6A-A6EE8C95E39D}"/>
-          </ac:spMkLst>
-        </pc:spChg>
-        <pc:spChg chg="mod">
-          <ac:chgData name="IMI TORIO, Bryndell S." userId="9ac92bdc-9297-429a-9c1d-d92c5c31c7e1" providerId="ADAL" clId="{E70F2195-4369-414C-89DD-45E4502DC55A}" dt="2022-12-12T09:15:49.146" v="1192" actId="20577"/>
-          <ac:spMkLst>
-            <pc:docMk/>
-            <pc:sldMk cId="724643194" sldId="273"/>
-            <ac:spMk id="251" creationId="{00000000-0000-0000-0000-000000000000}"/>
-          </ac:spMkLst>
-        </pc:spChg>
-        <pc:graphicFrameChg chg="add mod modGraphic">
-          <ac:chgData name="IMI TORIO, Bryndell S." userId="9ac92bdc-9297-429a-9c1d-d92c5c31c7e1" providerId="ADAL" clId="{E70F2195-4369-414C-89DD-45E4502DC55A}" dt="2022-12-14T09:27:57.913" v="4677" actId="20577"/>
-          <ac:graphicFrameMkLst>
-            <pc:docMk/>
-            <pc:sldMk cId="724643194" sldId="273"/>
-            <ac:graphicFrameMk id="2" creationId="{2709C386-EF8B-4B64-B773-6F64CAA4DF3D}"/>
-          </ac:graphicFrameMkLst>
-        </pc:graphicFrameChg>
-      </pc:sldChg>
-      <pc:sldChg chg="modSp add mod addAnim delAnim modAnim">
-        <pc:chgData name="IMI TORIO, Bryndell S." userId="9ac92bdc-9297-429a-9c1d-d92c5c31c7e1" providerId="ADAL" clId="{E70F2195-4369-414C-89DD-45E4502DC55A}" dt="2022-12-14T09:38:47.035" v="5774"/>
-        <pc:sldMkLst>
-          <pc:docMk/>
-          <pc:sldMk cId="3796247230" sldId="274"/>
-        </pc:sldMkLst>
-        <pc:spChg chg="mod">
-          <ac:chgData name="IMI TORIO, Bryndell S." userId="9ac92bdc-9297-429a-9c1d-d92c5c31c7e1" providerId="ADAL" clId="{E70F2195-4369-414C-89DD-45E4502DC55A}" dt="2022-12-14T09:37:31.384" v="5772" actId="20577"/>
-          <ac:spMkLst>
-            <pc:docMk/>
-            <pc:sldMk cId="3796247230" sldId="274"/>
-            <ac:spMk id="5" creationId="{664A213E-E4A6-40A3-8023-3B48FBAF1E04}"/>
-          </ac:spMkLst>
-        </pc:spChg>
-      </pc:sldChg>
-      <pc:sldChg chg="modSp add mod modAnim">
-        <pc:chgData name="IMI TORIO, Bryndell S." userId="9ac92bdc-9297-429a-9c1d-d92c5c31c7e1" providerId="ADAL" clId="{E70F2195-4369-414C-89DD-45E4502DC55A}" dt="2022-12-14T09:25:57.061" v="4659" actId="20577"/>
-        <pc:sldMkLst>
-          <pc:docMk/>
-          <pc:sldMk cId="4030225703" sldId="275"/>
-        </pc:sldMkLst>
-        <pc:spChg chg="mod">
-          <ac:chgData name="IMI TORIO, Bryndell S." userId="9ac92bdc-9297-429a-9c1d-d92c5c31c7e1" providerId="ADAL" clId="{E70F2195-4369-414C-89DD-45E4502DC55A}" dt="2022-12-14T09:25:57.061" v="4659" actId="20577"/>
-          <ac:spMkLst>
-            <pc:docMk/>
-            <pc:sldMk cId="4030225703" sldId="275"/>
-            <ac:spMk id="5" creationId="{664A213E-E4A6-40A3-8023-3B48FBAF1E04}"/>
-          </ac:spMkLst>
-        </pc:spChg>
-      </pc:sldChg>
-      <pc:sldChg chg="modSp add modAnim">
-        <pc:chgData name="IMI TORIO, Bryndell S." userId="9ac92bdc-9297-429a-9c1d-d92c5c31c7e1" providerId="ADAL" clId="{E70F2195-4369-414C-89DD-45E4502DC55A}" dt="2022-12-14T09:21:46.512" v="4056" actId="20577"/>
-        <pc:sldMkLst>
-          <pc:docMk/>
-          <pc:sldMk cId="1292350669" sldId="276"/>
-        </pc:sldMkLst>
-        <pc:spChg chg="mod">
-          <ac:chgData name="IMI TORIO, Bryndell S." userId="9ac92bdc-9297-429a-9c1d-d92c5c31c7e1" providerId="ADAL" clId="{E70F2195-4369-414C-89DD-45E4502DC55A}" dt="2022-12-14T09:21:46.512" v="4056" actId="20577"/>
-          <ac:spMkLst>
-            <pc:docMk/>
-            <pc:sldMk cId="1292350669" sldId="276"/>
-            <ac:spMk id="5" creationId="{664A213E-E4A6-40A3-8023-3B48FBAF1E04}"/>
-          </ac:spMkLst>
-        </pc:spChg>
-      </pc:sldChg>
-      <pc:sldChg chg="add del">
-        <pc:chgData name="IMI TORIO, Bryndell S." userId="9ac92bdc-9297-429a-9c1d-d92c5c31c7e1" providerId="ADAL" clId="{E70F2195-4369-414C-89DD-45E4502DC55A}" dt="2022-12-14T09:10:02.929" v="3065"/>
-        <pc:sldMkLst>
-          <pc:docMk/>
-          <pc:sldMk cId="3542360553" sldId="276"/>
-        </pc:sldMkLst>
-      </pc:sldChg>
-      <pc:sldChg chg="modSp add mod modAnim">
-        <pc:chgData name="IMI TORIO, Bryndell S." userId="9ac92bdc-9297-429a-9c1d-d92c5c31c7e1" providerId="ADAL" clId="{E70F2195-4369-414C-89DD-45E4502DC55A}" dt="2022-12-14T10:07:49.101" v="6977" actId="20577"/>
-        <pc:sldMkLst>
-          <pc:docMk/>
-          <pc:sldMk cId="1504256388" sldId="277"/>
-        </pc:sldMkLst>
-        <pc:spChg chg="mod">
-          <ac:chgData name="IMI TORIO, Bryndell S." userId="9ac92bdc-9297-429a-9c1d-d92c5c31c7e1" providerId="ADAL" clId="{E70F2195-4369-414C-89DD-45E4502DC55A}" dt="2022-12-14T10:07:49.101" v="6977" actId="20577"/>
-          <ac:spMkLst>
-            <pc:docMk/>
-            <pc:sldMk cId="1504256388" sldId="277"/>
-            <ac:spMk id="5" creationId="{664A213E-E4A6-40A3-8023-3B48FBAF1E04}"/>
-          </ac:spMkLst>
-        </pc:spChg>
-      </pc:sldChg>
-      <pc:sldChg chg="modSp add modAnim">
-        <pc:chgData name="IMI TORIO, Bryndell S." userId="9ac92bdc-9297-429a-9c1d-d92c5c31c7e1" providerId="ADAL" clId="{E70F2195-4369-414C-89DD-45E4502DC55A}" dt="2022-12-14T09:46:35.835" v="6365" actId="20577"/>
-        <pc:sldMkLst>
-          <pc:docMk/>
-          <pc:sldMk cId="2200638735" sldId="278"/>
-        </pc:sldMkLst>
-        <pc:spChg chg="mod">
-          <ac:chgData name="IMI TORIO, Bryndell S." userId="9ac92bdc-9297-429a-9c1d-d92c5c31c7e1" providerId="ADAL" clId="{E70F2195-4369-414C-89DD-45E4502DC55A}" dt="2022-12-14T09:46:35.835" v="6365" actId="20577"/>
-          <ac:spMkLst>
-            <pc:docMk/>
-            <pc:sldMk cId="2200638735" sldId="278"/>
-            <ac:spMk id="5" creationId="{664A213E-E4A6-40A3-8023-3B48FBAF1E04}"/>
-          </ac:spMkLst>
-        </pc:spChg>
-      </pc:sldChg>
-      <pc:sldChg chg="modSp add modAnim">
-        <pc:chgData name="IMI TORIO, Bryndell S." userId="9ac92bdc-9297-429a-9c1d-d92c5c31c7e1" providerId="ADAL" clId="{E70F2195-4369-414C-89DD-45E4502DC55A}" dt="2022-12-14T09:48:43.939" v="6620" actId="20577"/>
-        <pc:sldMkLst>
-          <pc:docMk/>
-          <pc:sldMk cId="1145446047" sldId="279"/>
-        </pc:sldMkLst>
-        <pc:spChg chg="mod">
-          <ac:chgData name="IMI TORIO, Bryndell S." userId="9ac92bdc-9297-429a-9c1d-d92c5c31c7e1" providerId="ADAL" clId="{E70F2195-4369-414C-89DD-45E4502DC55A}" dt="2022-12-14T09:48:43.939" v="6620" actId="20577"/>
-          <ac:spMkLst>
-            <pc:docMk/>
-            <pc:sldMk cId="1145446047" sldId="279"/>
-            <ac:spMk id="5" creationId="{664A213E-E4A6-40A3-8023-3B48FBAF1E04}"/>
-          </ac:spMkLst>
-        </pc:spChg>
-      </pc:sldChg>
-      <pc:sldChg chg="addSp delSp modSp add mod modAnim">
-        <pc:chgData name="IMI TORIO, Bryndell S." userId="9ac92bdc-9297-429a-9c1d-d92c5c31c7e1" providerId="ADAL" clId="{E70F2195-4369-414C-89DD-45E4502DC55A}" dt="2022-12-14T10:03:07.170" v="6976" actId="20577"/>
-        <pc:sldMkLst>
-          <pc:docMk/>
-          <pc:sldMk cId="954034188" sldId="280"/>
-        </pc:sldMkLst>
-        <pc:spChg chg="mod">
-          <ac:chgData name="IMI TORIO, Bryndell S." userId="9ac92bdc-9297-429a-9c1d-d92c5c31c7e1" providerId="ADAL" clId="{E70F2195-4369-414C-89DD-45E4502DC55A}" dt="2022-12-14T10:03:07.170" v="6976" actId="20577"/>
-          <ac:spMkLst>
-            <pc:docMk/>
-            <pc:sldMk cId="954034188" sldId="280"/>
-            <ac:spMk id="5" creationId="{664A213E-E4A6-40A3-8023-3B48FBAF1E04}"/>
-          </ac:spMkLst>
-        </pc:spChg>
-        <pc:spChg chg="mod">
-          <ac:chgData name="IMI TORIO, Bryndell S." userId="9ac92bdc-9297-429a-9c1d-d92c5c31c7e1" providerId="ADAL" clId="{E70F2195-4369-414C-89DD-45E4502DC55A}" dt="2022-12-14T09:49:42.196" v="6667" actId="20577"/>
-          <ac:spMkLst>
-            <pc:docMk/>
-            <pc:sldMk cId="954034188" sldId="280"/>
-            <ac:spMk id="251" creationId="{00000000-0000-0000-0000-000000000000}"/>
-          </ac:spMkLst>
-        </pc:spChg>
-        <pc:picChg chg="add del mod">
-          <ac:chgData name="IMI TORIO, Bryndell S." userId="9ac92bdc-9297-429a-9c1d-d92c5c31c7e1" providerId="ADAL" clId="{E70F2195-4369-414C-89DD-45E4502DC55A}" dt="2022-12-14T09:59:16.210" v="6689" actId="478"/>
-          <ac:picMkLst>
-            <pc:docMk/>
-            <pc:sldMk cId="954034188" sldId="280"/>
-            <ac:picMk id="3" creationId="{077438B4-5648-4625-ACBF-CFFC17AB4571}"/>
-          </ac:picMkLst>
-        </pc:picChg>
-        <pc:picChg chg="add del">
-          <ac:chgData name="IMI TORIO, Bryndell S." userId="9ac92bdc-9297-429a-9c1d-d92c5c31c7e1" providerId="ADAL" clId="{E70F2195-4369-414C-89DD-45E4502DC55A}" dt="2022-12-14T09:59:49.834" v="6714" actId="478"/>
-          <ac:picMkLst>
-            <pc:docMk/>
-            <pc:sldMk cId="954034188" sldId="280"/>
-            <ac:picMk id="6" creationId="{2A4DF6BC-BC46-4A99-A39D-E106FFE97C04}"/>
-          </ac:picMkLst>
-        </pc:picChg>
-      </pc:sldChg>
-      <pc:sldChg chg="modSp add mod modAnim">
-        <pc:chgData name="IMI TORIO, Bryndell S." userId="9ac92bdc-9297-429a-9c1d-d92c5c31c7e1" providerId="ADAL" clId="{E70F2195-4369-414C-89DD-45E4502DC55A}" dt="2022-12-15T01:09:40.453" v="7580" actId="20577"/>
-        <pc:sldMkLst>
-          <pc:docMk/>
-          <pc:sldMk cId="2434592601" sldId="281"/>
-        </pc:sldMkLst>
-        <pc:spChg chg="mod">
-          <ac:chgData name="IMI TORIO, Bryndell S." userId="9ac92bdc-9297-429a-9c1d-d92c5c31c7e1" providerId="ADAL" clId="{E70F2195-4369-414C-89DD-45E4502DC55A}" dt="2022-12-15T01:09:40.453" v="7580" actId="20577"/>
-          <ac:spMkLst>
-            <pc:docMk/>
-            <pc:sldMk cId="2434592601" sldId="281"/>
-            <ac:spMk id="22" creationId="{3C8CFE7E-37AE-4C1E-8F6A-A6EE8C95E39D}"/>
-          </ac:spMkLst>
-        </pc:spChg>
-        <pc:spChg chg="mod">
-          <ac:chgData name="IMI TORIO, Bryndell S." userId="9ac92bdc-9297-429a-9c1d-d92c5c31c7e1" providerId="ADAL" clId="{E70F2195-4369-414C-89DD-45E4502DC55A}" dt="2022-12-15T01:09:34.293" v="7578" actId="20577"/>
-          <ac:spMkLst>
-            <pc:docMk/>
-            <pc:sldMk cId="2434592601" sldId="281"/>
-            <ac:spMk id="251" creationId="{00000000-0000-0000-0000-000000000000}"/>
-          </ac:spMkLst>
-        </pc:spChg>
-      </pc:sldChg>
-      <pc:sldMasterChg chg="del delSldLayout">
-        <pc:chgData name="IMI TORIO, Bryndell S." userId="9ac92bdc-9297-429a-9c1d-d92c5c31c7e1" providerId="ADAL" clId="{E70F2195-4369-414C-89DD-45E4502DC55A}" dt="2022-12-12T09:15:10.421" v="1140" actId="47"/>
-        <pc:sldMasterMkLst>
-          <pc:docMk/>
-          <pc:sldMasterMk cId="0" sldId="2147483687"/>
-        </pc:sldMasterMkLst>
-        <pc:sldLayoutChg chg="del">
-          <pc:chgData name="IMI TORIO, Bryndell S." userId="9ac92bdc-9297-429a-9c1d-d92c5c31c7e1" providerId="ADAL" clId="{E70F2195-4369-414C-89DD-45E4502DC55A}" dt="2022-12-12T09:15:10.421" v="1140" actId="47"/>
-          <pc:sldLayoutMkLst>
-            <pc:docMk/>
-            <pc:sldMasterMk cId="0" sldId="2147483687"/>
-            <pc:sldLayoutMk cId="0" sldId="2147483688"/>
-          </pc:sldLayoutMkLst>
-        </pc:sldLayoutChg>
-        <pc:sldLayoutChg chg="del">
-          <pc:chgData name="IMI TORIO, Bryndell S." userId="9ac92bdc-9297-429a-9c1d-d92c5c31c7e1" providerId="ADAL" clId="{E70F2195-4369-414C-89DD-45E4502DC55A}" dt="2022-12-12T09:15:10.421" v="1140" actId="47"/>
-          <pc:sldLayoutMkLst>
-            <pc:docMk/>
-            <pc:sldMasterMk cId="0" sldId="2147483687"/>
-            <pc:sldLayoutMk cId="0" sldId="2147483689"/>
-          </pc:sldLayoutMkLst>
-        </pc:sldLayoutChg>
-        <pc:sldLayoutChg chg="del">
-          <pc:chgData name="IMI TORIO, Bryndell S." userId="9ac92bdc-9297-429a-9c1d-d92c5c31c7e1" providerId="ADAL" clId="{E70F2195-4369-414C-89DD-45E4502DC55A}" dt="2022-12-12T09:15:10.421" v="1140" actId="47"/>
-          <pc:sldLayoutMkLst>
-            <pc:docMk/>
-            <pc:sldMasterMk cId="0" sldId="2147483687"/>
-            <pc:sldLayoutMk cId="0" sldId="2147483690"/>
-          </pc:sldLayoutMkLst>
-        </pc:sldLayoutChg>
-        <pc:sldLayoutChg chg="del">
-          <pc:chgData name="IMI TORIO, Bryndell S." userId="9ac92bdc-9297-429a-9c1d-d92c5c31c7e1" providerId="ADAL" clId="{E70F2195-4369-414C-89DD-45E4502DC55A}" dt="2022-12-12T09:15:10.421" v="1140" actId="47"/>
-          <pc:sldLayoutMkLst>
-            <pc:docMk/>
-            <pc:sldMasterMk cId="0" sldId="2147483687"/>
-            <pc:sldLayoutMk cId="0" sldId="2147483691"/>
-          </pc:sldLayoutMkLst>
-        </pc:sldLayoutChg>
-        <pc:sldLayoutChg chg="del">
-          <pc:chgData name="IMI TORIO, Bryndell S." userId="9ac92bdc-9297-429a-9c1d-d92c5c31c7e1" providerId="ADAL" clId="{E70F2195-4369-414C-89DD-45E4502DC55A}" dt="2022-12-12T09:15:10.421" v="1140" actId="47"/>
-          <pc:sldLayoutMkLst>
-            <pc:docMk/>
-            <pc:sldMasterMk cId="0" sldId="2147483687"/>
-            <pc:sldLayoutMk cId="0" sldId="2147483692"/>
-          </pc:sldLayoutMkLst>
-        </pc:sldLayoutChg>
-        <pc:sldLayoutChg chg="del">
-          <pc:chgData name="IMI TORIO, Bryndell S." userId="9ac92bdc-9297-429a-9c1d-d92c5c31c7e1" providerId="ADAL" clId="{E70F2195-4369-414C-89DD-45E4502DC55A}" dt="2022-12-12T09:15:10.421" v="1140" actId="47"/>
-          <pc:sldLayoutMkLst>
-            <pc:docMk/>
-            <pc:sldMasterMk cId="0" sldId="2147483687"/>
-            <pc:sldLayoutMk cId="0" sldId="2147483693"/>
-          </pc:sldLayoutMkLst>
-        </pc:sldLayoutChg>
-        <pc:sldLayoutChg chg="del">
-          <pc:chgData name="IMI TORIO, Bryndell S." userId="9ac92bdc-9297-429a-9c1d-d92c5c31c7e1" providerId="ADAL" clId="{E70F2195-4369-414C-89DD-45E4502DC55A}" dt="2022-12-12T09:15:10.421" v="1140" actId="47"/>
-          <pc:sldLayoutMkLst>
-            <pc:docMk/>
-            <pc:sldMasterMk cId="0" sldId="2147483687"/>
-            <pc:sldLayoutMk cId="0" sldId="2147483694"/>
-          </pc:sldLayoutMkLst>
-        </pc:sldLayoutChg>
-        <pc:sldLayoutChg chg="del">
-          <pc:chgData name="IMI TORIO, Bryndell S." userId="9ac92bdc-9297-429a-9c1d-d92c5c31c7e1" providerId="ADAL" clId="{E70F2195-4369-414C-89DD-45E4502DC55A}" dt="2022-12-12T09:15:10.421" v="1140" actId="47"/>
-          <pc:sldLayoutMkLst>
-            <pc:docMk/>
-            <pc:sldMasterMk cId="0" sldId="2147483687"/>
-            <pc:sldLayoutMk cId="0" sldId="2147483695"/>
-          </pc:sldLayoutMkLst>
-        </pc:sldLayoutChg>
-        <pc:sldLayoutChg chg="del">
-          <pc:chgData name="IMI TORIO, Bryndell S." userId="9ac92bdc-9297-429a-9c1d-d92c5c31c7e1" providerId="ADAL" clId="{E70F2195-4369-414C-89DD-45E4502DC55A}" dt="2022-12-12T09:15:10.421" v="1140" actId="47"/>
-          <pc:sldLayoutMkLst>
-            <pc:docMk/>
-            <pc:sldMasterMk cId="0" sldId="2147483687"/>
-            <pc:sldLayoutMk cId="0" sldId="2147483696"/>
-          </pc:sldLayoutMkLst>
-        </pc:sldLayoutChg>
-        <pc:sldLayoutChg chg="del">
-          <pc:chgData name="IMI TORIO, Bryndell S." userId="9ac92bdc-9297-429a-9c1d-d92c5c31c7e1" providerId="ADAL" clId="{E70F2195-4369-414C-89DD-45E4502DC55A}" dt="2022-12-12T09:15:10.421" v="1140" actId="47"/>
-          <pc:sldLayoutMkLst>
-            <pc:docMk/>
-            <pc:sldMasterMk cId="0" sldId="2147483687"/>
-            <pc:sldLayoutMk cId="0" sldId="2147483697"/>
-          </pc:sldLayoutMkLst>
-        </pc:sldLayoutChg>
-        <pc:sldLayoutChg chg="del">
-          <pc:chgData name="IMI TORIO, Bryndell S." userId="9ac92bdc-9297-429a-9c1d-d92c5c31c7e1" providerId="ADAL" clId="{E70F2195-4369-414C-89DD-45E4502DC55A}" dt="2022-12-12T09:15:10.421" v="1140" actId="47"/>
-          <pc:sldLayoutMkLst>
-            <pc:docMk/>
-            <pc:sldMasterMk cId="0" sldId="2147483687"/>
-            <pc:sldLayoutMk cId="0" sldId="2147483698"/>
-          </pc:sldLayoutMkLst>
-        </pc:sldLayoutChg>
-        <pc:sldLayoutChg chg="del">
-          <pc:chgData name="IMI TORIO, Bryndell S." userId="9ac92bdc-9297-429a-9c1d-d92c5c31c7e1" providerId="ADAL" clId="{E70F2195-4369-414C-89DD-45E4502DC55A}" dt="2022-12-12T09:15:10.421" v="1140" actId="47"/>
-          <pc:sldLayoutMkLst>
-            <pc:docMk/>
-            <pc:sldMasterMk cId="0" sldId="2147483687"/>
-            <pc:sldLayoutMk cId="0" sldId="2147483699"/>
-          </pc:sldLayoutMkLst>
-        </pc:sldLayoutChg>
-      </pc:sldMasterChg>
-    </pc:docChg>
-  </pc:docChgLst>
-</pc:chgInfo>
 </file>
 
 <file path=ppt/slideLayouts/slideLayout1.xml><?xml version="1.0" encoding="utf-8"?>
@@ -16456,8 +15279,8 @@
         </p:nvSpPr>
         <p:spPr>
           <a:xfrm>
-            <a:off x="287948" y="1364670"/>
-            <a:ext cx="9322044" cy="3970318"/>
+            <a:off x="214588" y="1118486"/>
+            <a:ext cx="9693000" cy="6063198"/>
           </a:xfrm>
           <a:prstGeom prst="rect">
             <a:avLst/>
@@ -16469,6 +15292,228 @@
             <a:spAutoFit/>
           </a:bodyPr>
           <a:lstStyle/>
+          <a:p>
+            <a:pPr>
+              <a:lnSpc>
+                <a:spcPct val="100000"/>
+              </a:lnSpc>
+              <a:buClr>
+                <a:srgbClr val="000000"/>
+              </a:buClr>
+            </a:pPr>
+            <a:r>
+              <a:rPr lang="en-PH" b="1" spc="-1" dirty="0">
+                <a:solidFill>
+                  <a:srgbClr val="000000"/>
+                </a:solidFill>
+                <a:latin typeface="Trebuchet MS" panose="020B0603020202020204" pitchFamily="34" charset="0"/>
+              </a:rPr>
+              <a:t>Naming</a:t>
+            </a:r>
+          </a:p>
+          <a:p>
+            <a:pPr>
+              <a:lnSpc>
+                <a:spcPct val="100000"/>
+              </a:lnSpc>
+              <a:buClr>
+                <a:srgbClr val="000000"/>
+              </a:buClr>
+            </a:pPr>
+            <a:endParaRPr lang="en-PH" spc="-1" dirty="0">
+              <a:solidFill>
+                <a:srgbClr val="000000"/>
+              </a:solidFill>
+              <a:latin typeface="Trebuchet MS" panose="020B0603020202020204" pitchFamily="34" charset="0"/>
+            </a:endParaRPr>
+          </a:p>
+          <a:p>
+            <a:pPr>
+              <a:lnSpc>
+                <a:spcPct val="100000"/>
+              </a:lnSpc>
+              <a:buClr>
+                <a:srgbClr val="000000"/>
+              </a:buClr>
+            </a:pPr>
+            <a:r>
+              <a:rPr lang="en-PH" spc="-1" dirty="0">
+                <a:solidFill>
+                  <a:srgbClr val="000000"/>
+                </a:solidFill>
+                <a:latin typeface="Trebuchet MS" panose="020B0603020202020204" pitchFamily="34" charset="0"/>
+              </a:rPr>
+              <a:t>When naming your functions in PowerShell, use a Pascal case name with an approved verb and singular noun. I also recommend prefixing the noun. </a:t>
+            </a:r>
+          </a:p>
+          <a:p>
+            <a:pPr>
+              <a:lnSpc>
+                <a:spcPct val="100000"/>
+              </a:lnSpc>
+              <a:buClr>
+                <a:srgbClr val="000000"/>
+              </a:buClr>
+            </a:pPr>
+            <a:endParaRPr lang="en-PH" spc="-1" dirty="0">
+              <a:solidFill>
+                <a:srgbClr val="000000"/>
+              </a:solidFill>
+              <a:latin typeface="Trebuchet MS" panose="020B0603020202020204" pitchFamily="34" charset="0"/>
+            </a:endParaRPr>
+          </a:p>
+          <a:p>
+            <a:pPr>
+              <a:lnSpc>
+                <a:spcPct val="100000"/>
+              </a:lnSpc>
+              <a:buClr>
+                <a:srgbClr val="000000"/>
+              </a:buClr>
+            </a:pPr>
+            <a:r>
+              <a:rPr lang="en-PH" spc="-1" dirty="0">
+                <a:solidFill>
+                  <a:srgbClr val="000000"/>
+                </a:solidFill>
+                <a:latin typeface="Trebuchet MS" panose="020B0603020202020204" pitchFamily="34" charset="0"/>
+              </a:rPr>
+              <a:t>For example: </a:t>
+            </a:r>
+            <a:r>
+              <a:rPr lang="en-PH" i="1" spc="-1" dirty="0">
+                <a:solidFill>
+                  <a:srgbClr val="000000"/>
+                </a:solidFill>
+                <a:latin typeface="Trebuchet MS" panose="020B0603020202020204" pitchFamily="34" charset="0"/>
+              </a:rPr>
+              <a:t>&lt;</a:t>
+            </a:r>
+            <a:r>
+              <a:rPr lang="en-PH" i="1" spc="-1" dirty="0" err="1">
+                <a:solidFill>
+                  <a:srgbClr val="000000"/>
+                </a:solidFill>
+                <a:latin typeface="Trebuchet MS" panose="020B0603020202020204" pitchFamily="34" charset="0"/>
+              </a:rPr>
+              <a:t>ApprovedVerb</a:t>
+            </a:r>
+            <a:r>
+              <a:rPr lang="en-PH" i="1" spc="-1" dirty="0">
+                <a:solidFill>
+                  <a:srgbClr val="000000"/>
+                </a:solidFill>
+                <a:latin typeface="Trebuchet MS" panose="020B0603020202020204" pitchFamily="34" charset="0"/>
+              </a:rPr>
+              <a:t>&gt;-&lt;Prefix&gt;&lt;</a:t>
+            </a:r>
+            <a:r>
+              <a:rPr lang="en-PH" i="1" spc="-1" dirty="0" err="1">
+                <a:solidFill>
+                  <a:srgbClr val="000000"/>
+                </a:solidFill>
+                <a:latin typeface="Trebuchet MS" panose="020B0603020202020204" pitchFamily="34" charset="0"/>
+              </a:rPr>
+              <a:t>SingularNoun</a:t>
+            </a:r>
+            <a:r>
+              <a:rPr lang="en-PH" i="1" spc="-1" dirty="0">
+                <a:solidFill>
+                  <a:srgbClr val="000000"/>
+                </a:solidFill>
+                <a:latin typeface="Trebuchet MS" panose="020B0603020202020204" pitchFamily="34" charset="0"/>
+              </a:rPr>
+              <a:t>&gt;</a:t>
+            </a:r>
+          </a:p>
+          <a:p>
+            <a:pPr>
+              <a:lnSpc>
+                <a:spcPct val="100000"/>
+              </a:lnSpc>
+              <a:buClr>
+                <a:srgbClr val="000000"/>
+              </a:buClr>
+            </a:pPr>
+            <a:endParaRPr lang="en-PH" b="1" spc="-1" dirty="0">
+              <a:solidFill>
+                <a:srgbClr val="000000"/>
+              </a:solidFill>
+              <a:latin typeface="Trebuchet MS" panose="020B0603020202020204" pitchFamily="34" charset="0"/>
+            </a:endParaRPr>
+          </a:p>
+          <a:p>
+            <a:pPr marL="285750" indent="-285750">
+              <a:lnSpc>
+                <a:spcPct val="100000"/>
+              </a:lnSpc>
+              <a:buClr>
+                <a:srgbClr val="000000"/>
+              </a:buClr>
+              <a:buFont typeface="Wingdings" panose="05000000000000000000" pitchFamily="2" charset="2"/>
+              <a:buChar char="§"/>
+            </a:pPr>
+            <a:r>
+              <a:rPr lang="en-PH" spc="-1" dirty="0" err="1">
+                <a:solidFill>
+                  <a:srgbClr val="000000"/>
+                </a:solidFill>
+                <a:latin typeface="Trebuchet MS" panose="020B0603020202020204" pitchFamily="34" charset="0"/>
+              </a:rPr>
+              <a:t>PascalCasing</a:t>
+            </a:r>
+            <a:endParaRPr lang="en-PH" spc="-1" dirty="0">
+              <a:solidFill>
+                <a:srgbClr val="000000"/>
+              </a:solidFill>
+              <a:latin typeface="Trebuchet MS" panose="020B0603020202020204" pitchFamily="34" charset="0"/>
+            </a:endParaRPr>
+          </a:p>
+          <a:p>
+            <a:pPr marL="285750" indent="-285750">
+              <a:lnSpc>
+                <a:spcPct val="100000"/>
+              </a:lnSpc>
+              <a:buClr>
+                <a:srgbClr val="000000"/>
+              </a:buClr>
+              <a:buFont typeface="Wingdings" panose="05000000000000000000" pitchFamily="2" charset="2"/>
+              <a:buChar char="§"/>
+            </a:pPr>
+            <a:r>
+              <a:rPr lang="en-PH" spc="-1" dirty="0" err="1">
+                <a:solidFill>
+                  <a:srgbClr val="000000"/>
+                </a:solidFill>
+                <a:latin typeface="Trebuchet MS" panose="020B0603020202020204" pitchFamily="34" charset="0"/>
+              </a:rPr>
+              <a:t>camelCasing</a:t>
+            </a:r>
+            <a:endParaRPr lang="en-PH" spc="-1" dirty="0">
+              <a:solidFill>
+                <a:srgbClr val="000000"/>
+              </a:solidFill>
+              <a:latin typeface="Trebuchet MS" panose="020B0603020202020204" pitchFamily="34" charset="0"/>
+            </a:endParaRPr>
+          </a:p>
+          <a:p>
+            <a:pPr marL="285750" indent="-285750">
+              <a:lnSpc>
+                <a:spcPct val="100000"/>
+              </a:lnSpc>
+              <a:buClr>
+                <a:srgbClr val="000000"/>
+              </a:buClr>
+              <a:buFont typeface="Wingdings" panose="05000000000000000000" pitchFamily="2" charset="2"/>
+              <a:buChar char="§"/>
+            </a:pPr>
+            <a:endParaRPr lang="en-PH" b="1" spc="-1" dirty="0">
+              <a:solidFill>
+                <a:srgbClr val="000000"/>
+              </a:solidFill>
+              <a:latin typeface="Trebuchet MS" panose="020B0603020202020204" pitchFamily="34" charset="0"/>
+            </a:endParaRPr>
+          </a:p>
           <a:p>
             <a:pPr>
               <a:lnSpc>
@@ -16487,28 +15532,6 @@
               </a:rPr>
               <a:t>Basic Function</a:t>
             </a:r>
-            <a:endParaRPr lang="en-PH" sz="1800" b="1" strike="noStrike" spc="-1" dirty="0">
-              <a:solidFill>
-                <a:srgbClr val="000000"/>
-              </a:solidFill>
-              <a:latin typeface="Trebuchet MS" panose="020B0603020202020204" pitchFamily="34" charset="0"/>
-            </a:endParaRPr>
-          </a:p>
-          <a:p>
-            <a:pPr>
-              <a:lnSpc>
-                <a:spcPct val="100000"/>
-              </a:lnSpc>
-              <a:buClr>
-                <a:srgbClr val="000000"/>
-              </a:buClr>
-            </a:pPr>
-            <a:endParaRPr lang="en-PH" b="1" spc="-1" dirty="0">
-              <a:solidFill>
-                <a:srgbClr val="000000"/>
-              </a:solidFill>
-              <a:latin typeface="Trebuchet MS" panose="020B0603020202020204" pitchFamily="34" charset="0"/>
-            </a:endParaRPr>
           </a:p>
           <a:p>
             <a:pPr>
@@ -16520,13 +15543,22 @@
               </a:buClr>
             </a:pPr>
             <a:r>
-              <a:rPr lang="en-PH" sz="1800" strike="noStrike" spc="-1" dirty="0">
+              <a:rPr lang="en-PH" sz="1400" spc="-1" dirty="0">
                 <a:solidFill>
                   <a:srgbClr val="000000"/>
                 </a:solidFill>
                 <a:latin typeface="Trebuchet MS" panose="020B0603020202020204" pitchFamily="34" charset="0"/>
               </a:rPr>
-              <a:t>Print-Text {</a:t>
+              <a:t>f</a:t>
+            </a:r>
+            <a:r>
+              <a:rPr lang="en-PH" sz="1400" strike="noStrike" spc="-1" dirty="0">
+                <a:solidFill>
+                  <a:srgbClr val="000000"/>
+                </a:solidFill>
+                <a:latin typeface="Trebuchet MS" panose="020B0603020202020204" pitchFamily="34" charset="0"/>
+              </a:rPr>
+              <a:t>unction Print-Text {</a:t>
             </a:r>
           </a:p>
           <a:p>
@@ -16539,7 +15571,7 @@
               </a:buClr>
             </a:pPr>
             <a:r>
-              <a:rPr lang="en-PH" spc="-1" dirty="0">
+              <a:rPr lang="en-PH" sz="1400" spc="-1" dirty="0">
                 <a:solidFill>
                   <a:srgbClr val="000000"/>
                 </a:solidFill>
@@ -16558,7 +15590,7 @@
               </a:buClr>
             </a:pPr>
             <a:r>
-              <a:rPr lang="en-PH" sz="1800" strike="noStrike" spc="-1" dirty="0">
+              <a:rPr lang="en-PH" sz="1400" strike="noStrike" spc="-1" dirty="0">
                 <a:solidFill>
                   <a:srgbClr val="000000"/>
                 </a:solidFill>
@@ -16577,7 +15609,7 @@
               </a:buClr>
             </a:pPr>
             <a:r>
-              <a:rPr lang="en-PH" spc="-1" dirty="0">
+              <a:rPr lang="en-PH" sz="1400" spc="-1" dirty="0">
                 <a:solidFill>
                   <a:srgbClr val="000000"/>
                 </a:solidFill>
@@ -16596,7 +15628,7 @@
               </a:buClr>
             </a:pPr>
             <a:r>
-              <a:rPr lang="en-PH" spc="-1" dirty="0">
+              <a:rPr lang="en-PH" sz="1400" spc="-1" dirty="0">
                 <a:solidFill>
                   <a:srgbClr val="000000"/>
                 </a:solidFill>
@@ -16605,7 +15637,7 @@
               <a:t>				echo “Checked!”</a:t>
             </a:r>
             <a:br>
-              <a:rPr lang="en-PH" spc="-1" dirty="0">
+              <a:rPr lang="en-PH" sz="1400" spc="-1" dirty="0">
                 <a:solidFill>
                   <a:srgbClr val="000000"/>
                 </a:solidFill>
@@ -16613,30 +15645,13 @@
               </a:rPr>
             </a:br>
             <a:r>
-              <a:rPr lang="en-PH" spc="-1" dirty="0">
+              <a:rPr lang="en-PH" sz="1400" spc="-1" dirty="0">
                 <a:solidFill>
                   <a:srgbClr val="000000"/>
                 </a:solidFill>
                 <a:latin typeface="Trebuchet MS" panose="020B0603020202020204" pitchFamily="34" charset="0"/>
               </a:rPr>
-              <a:t>			} else {</a:t>
-            </a:r>
-            <a:br>
-              <a:rPr lang="en-PH" spc="-1" dirty="0">
-                <a:solidFill>
-                  <a:srgbClr val="000000"/>
-                </a:solidFill>
-                <a:latin typeface="Trebuchet MS" panose="020B0603020202020204" pitchFamily="34" charset="0"/>
-              </a:rPr>
-            </a:br>
-            <a:r>
-              <a:rPr lang="en-PH" spc="-1" dirty="0">
-                <a:solidFill>
-                  <a:srgbClr val="000000"/>
-                </a:solidFill>
-                <a:latin typeface="Trebuchet MS" panose="020B0603020202020204" pitchFamily="34" charset="0"/>
-              </a:rPr>
-              <a:t>				echo “ You entered: $Name”</a:t>
+              <a:t>			} </a:t>
             </a:r>
           </a:p>
           <a:p>
@@ -16649,7 +15664,43 @@
               </a:buClr>
             </a:pPr>
             <a:r>
-              <a:rPr lang="en-PH" spc="-1" dirty="0">
+              <a:rPr lang="en-PH" sz="1400" spc="-1" dirty="0">
+                <a:solidFill>
+                  <a:srgbClr val="000000"/>
+                </a:solidFill>
+                <a:latin typeface="Trebuchet MS" panose="020B0603020202020204" pitchFamily="34" charset="0"/>
+              </a:rPr>
+              <a:t>			else {</a:t>
+            </a:r>
+            <a:br>
+              <a:rPr lang="en-PH" sz="1400" spc="-1" dirty="0">
+                <a:solidFill>
+                  <a:srgbClr val="000000"/>
+                </a:solidFill>
+                <a:latin typeface="Trebuchet MS" panose="020B0603020202020204" pitchFamily="34" charset="0"/>
+              </a:rPr>
+            </a:br>
+            <a:r>
+              <a:rPr lang="en-PH" sz="1400" spc="-1" dirty="0">
+                <a:solidFill>
+                  <a:srgbClr val="000000"/>
+                </a:solidFill>
+                <a:latin typeface="Trebuchet MS" panose="020B0603020202020204" pitchFamily="34" charset="0"/>
+              </a:rPr>
+              <a:t>				echo “ You entered: $Name”</a:t>
+            </a:r>
+          </a:p>
+          <a:p>
+            <a:pPr>
+              <a:lnSpc>
+                <a:spcPct val="100000"/>
+              </a:lnSpc>
+              <a:buClr>
+                <a:srgbClr val="000000"/>
+              </a:buClr>
+            </a:pPr>
+            <a:r>
+              <a:rPr lang="en-PH" sz="1400" spc="-1" dirty="0">
                 <a:solidFill>
                   <a:srgbClr val="000000"/>
                 </a:solidFill>
@@ -16658,7 +15709,7 @@
               <a:t>			}</a:t>
             </a:r>
             <a:br>
-              <a:rPr lang="en-PH" sz="1800" strike="noStrike" spc="-1" dirty="0">
+              <a:rPr lang="en-PH" sz="1400" strike="noStrike" spc="-1" dirty="0">
                 <a:solidFill>
                   <a:srgbClr val="000000"/>
                 </a:solidFill>
@@ -16666,7 +15717,7 @@
               </a:rPr>
             </a:br>
             <a:r>
-              <a:rPr lang="en-PH" sz="1800" strike="noStrike" spc="-1" dirty="0">
+              <a:rPr lang="en-PH" sz="1400" strike="noStrike" spc="-1" dirty="0">
                 <a:solidFill>
                   <a:srgbClr val="000000"/>
                 </a:solidFill>
@@ -16675,7 +15726,7 @@
               <a:t>		}</a:t>
             </a:r>
             <a:br>
-              <a:rPr lang="en-PH" sz="1800" strike="noStrike" spc="-1" dirty="0">
+              <a:rPr lang="en-PH" sz="1400" strike="noStrike" spc="-1" dirty="0">
                 <a:solidFill>
                   <a:srgbClr val="000000"/>
                 </a:solidFill>
@@ -16683,7 +15734,7 @@
               </a:rPr>
             </a:br>
             <a:r>
-              <a:rPr lang="en-PH" sz="1800" strike="noStrike" spc="-1" dirty="0">
+              <a:rPr lang="en-PH" sz="1400" strike="noStrike" spc="-1" dirty="0">
                 <a:solidFill>
                   <a:srgbClr val="000000"/>
                 </a:solidFill>
@@ -16691,7 +15742,7 @@
               </a:rPr>
               <a:t>}</a:t>
             </a:r>
-            <a:endParaRPr lang="en-PH" spc="-1" dirty="0">
+            <a:endParaRPr lang="en-PH" sz="1400" spc="-1" dirty="0">
               <a:latin typeface="Trebuchet MS" panose="020B0603020202020204" pitchFamily="34" charset="0"/>
             </a:endParaRPr>
           </a:p>
@@ -16775,7 +15826,7 @@
                                         <p:tgtEl>
                                           <p:spTgt spid="5">
                                             <p:txEl>
-                                              <p:pRg st="2" end="2"/>
+                                              <p:pRg st="10" end="10"/>
                                             </p:txEl>
                                           </p:spTgt>
                                         </p:tgtEl>
@@ -16793,7 +15844,7 @@
                                         <p:tgtEl>
                                           <p:spTgt spid="5">
                                             <p:txEl>
-                                              <p:pRg st="2" end="2"/>
+                                              <p:pRg st="10" end="10"/>
                                             </p:txEl>
                                           </p:spTgt>
                                         </p:tgtEl>
@@ -16836,7 +15887,7 @@
                                         <p:tgtEl>
                                           <p:spTgt spid="5">
                                             <p:txEl>
-                                              <p:pRg st="0" end="0"/>
+                                              <p:pRg st="9" end="9"/>
                                             </p:txEl>
                                           </p:spTgt>
                                         </p:tgtEl>
@@ -16854,7 +15905,7 @@
                                         <p:tgtEl>
                                           <p:spTgt spid="5">
                                             <p:txEl>
-                                              <p:pRg st="0" end="0"/>
+                                              <p:pRg st="9" end="9"/>
                                             </p:txEl>
                                           </p:spTgt>
                                         </p:tgtEl>
@@ -16897,7 +15948,7 @@
                                         <p:tgtEl>
                                           <p:spTgt spid="5">
                                             <p:txEl>
-                                              <p:pRg st="3" end="3"/>
+                                              <p:pRg st="0" end="0"/>
                                             </p:txEl>
                                           </p:spTgt>
                                         </p:tgtEl>
@@ -16915,7 +15966,7 @@
                                         <p:tgtEl>
                                           <p:spTgt spid="5">
                                             <p:txEl>
-                                              <p:pRg st="3" end="3"/>
+                                              <p:pRg st="0" end="0"/>
                                             </p:txEl>
                                           </p:spTgt>
                                         </p:tgtEl>
@@ -16958,7 +16009,7 @@
                                         <p:tgtEl>
                                           <p:spTgt spid="5">
                                             <p:txEl>
-                                              <p:pRg st="4" end="4"/>
+                                              <p:pRg st="2" end="2"/>
                                             </p:txEl>
                                           </p:spTgt>
                                         </p:tgtEl>
@@ -16976,7 +16027,7 @@
                                         <p:tgtEl>
                                           <p:spTgt spid="5">
                                             <p:txEl>
-                                              <p:pRg st="4" end="4"/>
+                                              <p:pRg st="2" end="2"/>
                                             </p:txEl>
                                           </p:spTgt>
                                         </p:tgtEl>
@@ -17019,7 +16070,7 @@
                                         <p:tgtEl>
                                           <p:spTgt spid="5">
                                             <p:txEl>
-                                              <p:pRg st="5" end="5"/>
+                                              <p:pRg st="4" end="4"/>
                                             </p:txEl>
                                           </p:spTgt>
                                         </p:tgtEl>
@@ -17037,7 +16088,7 @@
                                         <p:tgtEl>
                                           <p:spTgt spid="5">
                                             <p:txEl>
-                                              <p:pRg st="5" end="5"/>
+                                              <p:pRg st="4" end="4"/>
                                             </p:txEl>
                                           </p:spTgt>
                                         </p:tgtEl>
@@ -17174,6 +16225,372 @@
                       </p:childTnLst>
                     </p:cTn>
                   </p:par>
+                  <p:par>
+                    <p:cTn id="38" fill="hold">
+                      <p:stCondLst>
+                        <p:cond delay="indefinite"/>
+                      </p:stCondLst>
+                      <p:childTnLst>
+                        <p:par>
+                          <p:cTn id="39" fill="hold">
+                            <p:stCondLst>
+                              <p:cond delay="0"/>
+                            </p:stCondLst>
+                            <p:childTnLst>
+                              <p:par>
+                                <p:cTn id="40" presetID="10" presetClass="entr" presetSubtype="0" fill="hold" nodeType="clickEffect">
+                                  <p:stCondLst>
+                                    <p:cond delay="0"/>
+                                  </p:stCondLst>
+                                  <p:childTnLst>
+                                    <p:set>
+                                      <p:cBhvr>
+                                        <p:cTn id="41" dur="1" fill="hold">
+                                          <p:stCondLst>
+                                            <p:cond delay="0"/>
+                                          </p:stCondLst>
+                                        </p:cTn>
+                                        <p:tgtEl>
+                                          <p:spTgt spid="5">
+                                            <p:txEl>
+                                              <p:pRg st="11" end="11"/>
+                                            </p:txEl>
+                                          </p:spTgt>
+                                        </p:tgtEl>
+                                        <p:attrNameLst>
+                                          <p:attrName>style.visibility</p:attrName>
+                                        </p:attrNameLst>
+                                      </p:cBhvr>
+                                      <p:to>
+                                        <p:strVal val="visible"/>
+                                      </p:to>
+                                    </p:set>
+                                    <p:animEffect transition="in" filter="fade">
+                                      <p:cBhvr>
+                                        <p:cTn id="42" dur="500"/>
+                                        <p:tgtEl>
+                                          <p:spTgt spid="5">
+                                            <p:txEl>
+                                              <p:pRg st="11" end="11"/>
+                                            </p:txEl>
+                                          </p:spTgt>
+                                        </p:tgtEl>
+                                      </p:cBhvr>
+                                    </p:animEffect>
+                                  </p:childTnLst>
+                                </p:cTn>
+                              </p:par>
+                            </p:childTnLst>
+                          </p:cTn>
+                        </p:par>
+                      </p:childTnLst>
+                    </p:cTn>
+                  </p:par>
+                  <p:par>
+                    <p:cTn id="43" fill="hold">
+                      <p:stCondLst>
+                        <p:cond delay="indefinite"/>
+                      </p:stCondLst>
+                      <p:childTnLst>
+                        <p:par>
+                          <p:cTn id="44" fill="hold">
+                            <p:stCondLst>
+                              <p:cond delay="0"/>
+                            </p:stCondLst>
+                            <p:childTnLst>
+                              <p:par>
+                                <p:cTn id="45" presetID="10" presetClass="entr" presetSubtype="0" fill="hold" nodeType="clickEffect">
+                                  <p:stCondLst>
+                                    <p:cond delay="0"/>
+                                  </p:stCondLst>
+                                  <p:childTnLst>
+                                    <p:set>
+                                      <p:cBhvr>
+                                        <p:cTn id="46" dur="1" fill="hold">
+                                          <p:stCondLst>
+                                            <p:cond delay="0"/>
+                                          </p:stCondLst>
+                                        </p:cTn>
+                                        <p:tgtEl>
+                                          <p:spTgt spid="5">
+                                            <p:txEl>
+                                              <p:pRg st="12" end="12"/>
+                                            </p:txEl>
+                                          </p:spTgt>
+                                        </p:tgtEl>
+                                        <p:attrNameLst>
+                                          <p:attrName>style.visibility</p:attrName>
+                                        </p:attrNameLst>
+                                      </p:cBhvr>
+                                      <p:to>
+                                        <p:strVal val="visible"/>
+                                      </p:to>
+                                    </p:set>
+                                    <p:animEffect transition="in" filter="fade">
+                                      <p:cBhvr>
+                                        <p:cTn id="47" dur="500"/>
+                                        <p:tgtEl>
+                                          <p:spTgt spid="5">
+                                            <p:txEl>
+                                              <p:pRg st="12" end="12"/>
+                                            </p:txEl>
+                                          </p:spTgt>
+                                        </p:tgtEl>
+                                      </p:cBhvr>
+                                    </p:animEffect>
+                                  </p:childTnLst>
+                                </p:cTn>
+                              </p:par>
+                            </p:childTnLst>
+                          </p:cTn>
+                        </p:par>
+                      </p:childTnLst>
+                    </p:cTn>
+                  </p:par>
+                  <p:par>
+                    <p:cTn id="48" fill="hold">
+                      <p:stCondLst>
+                        <p:cond delay="indefinite"/>
+                      </p:stCondLst>
+                      <p:childTnLst>
+                        <p:par>
+                          <p:cTn id="49" fill="hold">
+                            <p:stCondLst>
+                              <p:cond delay="0"/>
+                            </p:stCondLst>
+                            <p:childTnLst>
+                              <p:par>
+                                <p:cTn id="50" presetID="10" presetClass="entr" presetSubtype="0" fill="hold" nodeType="clickEffect">
+                                  <p:stCondLst>
+                                    <p:cond delay="0"/>
+                                  </p:stCondLst>
+                                  <p:childTnLst>
+                                    <p:set>
+                                      <p:cBhvr>
+                                        <p:cTn id="51" dur="1" fill="hold">
+                                          <p:stCondLst>
+                                            <p:cond delay="0"/>
+                                          </p:stCondLst>
+                                        </p:cTn>
+                                        <p:tgtEl>
+                                          <p:spTgt spid="5">
+                                            <p:txEl>
+                                              <p:pRg st="13" end="13"/>
+                                            </p:txEl>
+                                          </p:spTgt>
+                                        </p:tgtEl>
+                                        <p:attrNameLst>
+                                          <p:attrName>style.visibility</p:attrName>
+                                        </p:attrNameLst>
+                                      </p:cBhvr>
+                                      <p:to>
+                                        <p:strVal val="visible"/>
+                                      </p:to>
+                                    </p:set>
+                                    <p:animEffect transition="in" filter="fade">
+                                      <p:cBhvr>
+                                        <p:cTn id="52" dur="500"/>
+                                        <p:tgtEl>
+                                          <p:spTgt spid="5">
+                                            <p:txEl>
+                                              <p:pRg st="13" end="13"/>
+                                            </p:txEl>
+                                          </p:spTgt>
+                                        </p:tgtEl>
+                                      </p:cBhvr>
+                                    </p:animEffect>
+                                  </p:childTnLst>
+                                </p:cTn>
+                              </p:par>
+                            </p:childTnLst>
+                          </p:cTn>
+                        </p:par>
+                      </p:childTnLst>
+                    </p:cTn>
+                  </p:par>
+                  <p:par>
+                    <p:cTn id="53" fill="hold">
+                      <p:stCondLst>
+                        <p:cond delay="indefinite"/>
+                      </p:stCondLst>
+                      <p:childTnLst>
+                        <p:par>
+                          <p:cTn id="54" fill="hold">
+                            <p:stCondLst>
+                              <p:cond delay="0"/>
+                            </p:stCondLst>
+                            <p:childTnLst>
+                              <p:par>
+                                <p:cTn id="55" presetID="10" presetClass="entr" presetSubtype="0" fill="hold" nodeType="clickEffect">
+                                  <p:stCondLst>
+                                    <p:cond delay="0"/>
+                                  </p:stCondLst>
+                                  <p:childTnLst>
+                                    <p:set>
+                                      <p:cBhvr>
+                                        <p:cTn id="56" dur="1" fill="hold">
+                                          <p:stCondLst>
+                                            <p:cond delay="0"/>
+                                          </p:stCondLst>
+                                        </p:cTn>
+                                        <p:tgtEl>
+                                          <p:spTgt spid="5">
+                                            <p:txEl>
+                                              <p:pRg st="14" end="14"/>
+                                            </p:txEl>
+                                          </p:spTgt>
+                                        </p:tgtEl>
+                                        <p:attrNameLst>
+                                          <p:attrName>style.visibility</p:attrName>
+                                        </p:attrNameLst>
+                                      </p:cBhvr>
+                                      <p:to>
+                                        <p:strVal val="visible"/>
+                                      </p:to>
+                                    </p:set>
+                                    <p:animEffect transition="in" filter="fade">
+                                      <p:cBhvr>
+                                        <p:cTn id="57" dur="500"/>
+                                        <p:tgtEl>
+                                          <p:spTgt spid="5">
+                                            <p:txEl>
+                                              <p:pRg st="14" end="14"/>
+                                            </p:txEl>
+                                          </p:spTgt>
+                                        </p:tgtEl>
+                                      </p:cBhvr>
+                                    </p:animEffect>
+                                  </p:childTnLst>
+                                </p:cTn>
+                              </p:par>
+                            </p:childTnLst>
+                          </p:cTn>
+                        </p:par>
+                      </p:childTnLst>
+                    </p:cTn>
+                  </p:par>
+                  <p:par>
+                    <p:cTn id="58" fill="hold">
+                      <p:stCondLst>
+                        <p:cond delay="indefinite"/>
+                      </p:stCondLst>
+                      <p:childTnLst>
+                        <p:par>
+                          <p:cTn id="59" fill="hold">
+                            <p:stCondLst>
+                              <p:cond delay="0"/>
+                            </p:stCondLst>
+                            <p:childTnLst>
+                              <p:par>
+                                <p:cTn id="60" presetID="10" presetClass="entr" presetSubtype="0" fill="hold" nodeType="clickEffect">
+                                  <p:stCondLst>
+                                    <p:cond delay="0"/>
+                                  </p:stCondLst>
+                                  <p:childTnLst>
+                                    <p:set>
+                                      <p:cBhvr>
+                                        <p:cTn id="61" dur="1" fill="hold">
+                                          <p:stCondLst>
+                                            <p:cond delay="0"/>
+                                          </p:stCondLst>
+                                        </p:cTn>
+                                        <p:tgtEl>
+                                          <p:spTgt spid="5">
+                                            <p:txEl>
+                                              <p:pRg st="15" end="15"/>
+                                            </p:txEl>
+                                          </p:spTgt>
+                                        </p:tgtEl>
+                                        <p:attrNameLst>
+                                          <p:attrName>style.visibility</p:attrName>
+                                        </p:attrNameLst>
+                                      </p:cBhvr>
+                                      <p:to>
+                                        <p:strVal val="visible"/>
+                                      </p:to>
+                                    </p:set>
+                                    <p:animEffect transition="in" filter="fade">
+                                      <p:cBhvr>
+                                        <p:cTn id="62" dur="500"/>
+                                        <p:tgtEl>
+                                          <p:spTgt spid="5">
+                                            <p:txEl>
+                                              <p:pRg st="15" end="15"/>
+                                            </p:txEl>
+                                          </p:spTgt>
+                                        </p:tgtEl>
+                                      </p:cBhvr>
+                                    </p:animEffect>
+                                  </p:childTnLst>
+                                </p:cTn>
+                              </p:par>
+                            </p:childTnLst>
+                          </p:cTn>
+                        </p:par>
+                      </p:childTnLst>
+                    </p:cTn>
+                  </p:par>
+                  <p:par>
+                    <p:cTn id="63" fill="hold">
+                      <p:stCondLst>
+                        <p:cond delay="indefinite"/>
+                      </p:stCondLst>
+                      <p:childTnLst>
+                        <p:par>
+                          <p:cTn id="64" fill="hold">
+                            <p:stCondLst>
+                              <p:cond delay="0"/>
+                            </p:stCondLst>
+                            <p:childTnLst>
+                              <p:par>
+                                <p:cTn id="65" presetID="10" presetClass="entr" presetSubtype="0" fill="hold" nodeType="clickEffect">
+                                  <p:stCondLst>
+                                    <p:cond delay="0"/>
+                                  </p:stCondLst>
+                                  <p:childTnLst>
+                                    <p:set>
+                                      <p:cBhvr>
+                                        <p:cTn id="66" dur="1" fill="hold">
+                                          <p:stCondLst>
+                                            <p:cond delay="0"/>
+                                          </p:stCondLst>
+                                        </p:cTn>
+                                        <p:tgtEl>
+                                          <p:spTgt spid="5">
+                                            <p:txEl>
+                                              <p:pRg st="16" end="16"/>
+                                            </p:txEl>
+                                          </p:spTgt>
+                                        </p:tgtEl>
+                                        <p:attrNameLst>
+                                          <p:attrName>style.visibility</p:attrName>
+                                        </p:attrNameLst>
+                                      </p:cBhvr>
+                                      <p:to>
+                                        <p:strVal val="visible"/>
+                                      </p:to>
+                                    </p:set>
+                                    <p:animEffect transition="in" filter="fade">
+                                      <p:cBhvr>
+                                        <p:cTn id="67" dur="500"/>
+                                        <p:tgtEl>
+                                          <p:spTgt spid="5">
+                                            <p:txEl>
+                                              <p:pRg st="16" end="16"/>
+                                            </p:txEl>
+                                          </p:spTgt>
+                                        </p:tgtEl>
+                                      </p:cBhvr>
+                                    </p:animEffect>
+                                  </p:childTnLst>
+                                </p:cTn>
+                              </p:par>
+                            </p:childTnLst>
+                          </p:cTn>
+                        </p:par>
+                      </p:childTnLst>
+                    </p:cTn>
+                  </p:par>
                 </p:childTnLst>
               </p:cTn>
               <p:prevCondLst>
@@ -17218,7 +16635,7 @@
       </p:grpSpPr>
       <p:sp>
         <p:nvSpPr>
-          <p:cNvPr id="263" name="PlaceHolder 1"/>
+          <p:cNvPr id="251" name="PlaceHolder 1"/>
           <p:cNvSpPr>
             <a:spLocks noGrp="1"/>
           </p:cNvSpPr>
@@ -17228,8 +16645,8 @@
         </p:nvSpPr>
         <p:spPr>
           <a:xfrm>
-            <a:off x="681120" y="365040"/>
-            <a:ext cx="8544600" cy="758520"/>
+            <a:off x="214588" y="442689"/>
+            <a:ext cx="8544600" cy="479021"/>
           </a:xfrm>
           <a:prstGeom prst="rect">
             <a:avLst/>
@@ -17252,15 +16669,15 @@
               <a:buNone/>
             </a:pPr>
             <a:r>
-              <a:rPr lang="en-US" sz="2400" b="1" strike="noStrike" spc="-1">
+              <a:rPr lang="en-US" sz="2400" b="1" strike="noStrike" spc="-1" dirty="0">
                 <a:solidFill>
                   <a:srgbClr val="FFFFFF"/>
                 </a:solidFill>
                 <a:latin typeface="Calibri"/>
               </a:rPr>
-              <a:t>G. Building your own custom terminal</a:t>
+              <a:t>Building your own custom terminal</a:t>
             </a:r>
-            <a:endParaRPr lang="en-PH" sz="2400" b="0" strike="noStrike" spc="-1">
+            <a:endParaRPr lang="en-PH" sz="2400" b="0" strike="noStrike" spc="-1" dirty="0">
               <a:latin typeface="Arial"/>
             </a:endParaRPr>
           </a:p>
@@ -17268,30 +16685,29 @@
       </p:sp>
       <p:sp>
         <p:nvSpPr>
-          <p:cNvPr id="264" name="PlaceHolder 2"/>
-          <p:cNvSpPr>
-            <a:spLocks noGrp="1"/>
-          </p:cNvSpPr>
-          <p:nvPr>
-            <p:ph/>
-          </p:nvPr>
+          <p:cNvPr id="5" name="TextBox 4">
+            <a:extLst>
+              <a:ext uri="{FF2B5EF4-FFF2-40B4-BE49-F238E27FC236}">
+                <a16:creationId xmlns:a16="http://schemas.microsoft.com/office/drawing/2014/main" id="{664A213E-E4A6-40A3-8023-3B48FBAF1E04}"/>
+              </a:ext>
+            </a:extLst>
+          </p:cNvPr>
+          <p:cNvSpPr txBox="1"/>
+          <p:nvPr/>
         </p:nvSpPr>
         <p:spPr>
           <a:xfrm>
-            <a:off x="681120" y="1340640"/>
-            <a:ext cx="8544600" cy="4835160"/>
+            <a:off x="214588" y="1118486"/>
+            <a:ext cx="9322044" cy="369332"/>
           </a:xfrm>
           <a:prstGeom prst="rect">
             <a:avLst/>
           </a:prstGeom>
           <a:noFill/>
-          <a:ln w="0">
-            <a:noFill/>
-          </a:ln>
         </p:spPr>
         <p:txBody>
-          <a:bodyPr lIns="90000" tIns="45000" rIns="90000" bIns="45000" anchor="t">
-            <a:noAutofit/>
+          <a:bodyPr wrap="square">
+            <a:spAutoFit/>
           </a:bodyPr>
           <a:lstStyle/>
           <a:p>
@@ -17299,70 +16715,28 @@
               <a:lnSpc>
                 <a:spcPct val="100000"/>
               </a:lnSpc>
-              <a:buNone/>
+              <a:buClr>
+                <a:srgbClr val="000000"/>
+              </a:buClr>
             </a:pPr>
-            <a:endParaRPr lang="en-PH" sz="1700" b="0" strike="noStrike" spc="-1">
-              <a:latin typeface="Arial"/>
-            </a:endParaRPr>
-          </a:p>
-          <a:p>
-            <a:pPr>
-              <a:lnSpc>
-                <a:spcPct val="100000"/>
-              </a:lnSpc>
-              <a:buNone/>
-            </a:pPr>
-            <a:endParaRPr lang="en-PH" sz="1700" b="0" strike="noStrike" spc="-1">
-              <a:latin typeface="Arial"/>
-            </a:endParaRPr>
-          </a:p>
-          <a:p>
-            <a:pPr>
-              <a:lnSpc>
-                <a:spcPct val="100000"/>
-              </a:lnSpc>
-              <a:buNone/>
-              <a:tabLst>
-                <a:tab pos="0" algn="l"/>
-              </a:tabLst>
-            </a:pPr>
-            <a:endParaRPr lang="en-PH" sz="1700" b="0" strike="noStrike" spc="-1">
-              <a:latin typeface="Arial"/>
-            </a:endParaRPr>
-          </a:p>
-          <a:p>
-            <a:pPr>
-              <a:lnSpc>
-                <a:spcPct val="100000"/>
-              </a:lnSpc>
-              <a:buNone/>
-              <a:tabLst>
-                <a:tab pos="0" algn="l"/>
-              </a:tabLst>
-            </a:pPr>
-            <a:endParaRPr lang="en-PH" sz="1700" b="0" strike="noStrike" spc="-1">
-              <a:latin typeface="Arial"/>
-            </a:endParaRPr>
-          </a:p>
-          <a:p>
-            <a:pPr>
-              <a:lnSpc>
-                <a:spcPct val="100000"/>
-              </a:lnSpc>
-              <a:buNone/>
-              <a:tabLst>
-                <a:tab pos="0" algn="l"/>
-              </a:tabLst>
-            </a:pPr>
-            <a:endParaRPr lang="en-PH" sz="1700" b="0" strike="noStrike" spc="-1">
-              <a:latin typeface="Arial"/>
+            <a:endParaRPr lang="en-PH" sz="1800" strike="noStrike" spc="-1" dirty="0">
+              <a:solidFill>
+                <a:srgbClr val="000000"/>
+              </a:solidFill>
+              <a:latin typeface="Trebuchet MS" panose="020B0603020202020204" pitchFamily="34" charset="0"/>
             </a:endParaRPr>
           </a:p>
         </p:txBody>
       </p:sp>
       <p:pic>
         <p:nvPicPr>
-          <p:cNvPr id="265" name="Picture 6"/>
+          <p:cNvPr id="6" name="Picture 6">
+            <a:extLst>
+              <a:ext uri="{FF2B5EF4-FFF2-40B4-BE49-F238E27FC236}">
+                <a16:creationId xmlns:a16="http://schemas.microsoft.com/office/drawing/2014/main" id="{DA8327EE-0B8D-4BFD-97C8-A7D30857E0F9}"/>
+              </a:ext>
+            </a:extLst>
+          </p:cNvPr>
           <p:cNvPicPr/>
           <p:nvPr/>
         </p:nvPicPr>
@@ -17384,6 +16758,708 @@
         </p:spPr>
       </p:pic>
     </p:spTree>
+    <p:extLst>
+      <p:ext uri="{BB962C8B-B14F-4D97-AF65-F5344CB8AC3E}">
+        <p14:creationId xmlns:p14="http://schemas.microsoft.com/office/powerpoint/2010/main" val="1076579506"/>
+      </p:ext>
+    </p:extLst>
+  </p:cSld>
+  <p:clrMapOvr>
+    <a:masterClrMapping/>
+  </p:clrMapOvr>
+  <p:timing>
+    <p:tnLst>
+      <p:par>
+        <p:cTn id="1" dur="indefinite" restart="never" nodeType="tmRoot">
+          <p:childTnLst>
+            <p:seq concurrent="1" nextAc="seek">
+              <p:cTn id="2" dur="indefinite" nodeType="mainSeq">
+                <p:childTnLst>
+                  <p:par>
+                    <p:cTn id="3" fill="hold">
+                      <p:stCondLst>
+                        <p:cond delay="indefinite"/>
+                      </p:stCondLst>
+                      <p:childTnLst>
+                        <p:par>
+                          <p:cTn id="4" fill="hold">
+                            <p:stCondLst>
+                              <p:cond delay="0"/>
+                            </p:stCondLst>
+                            <p:childTnLst>
+                              <p:par>
+                                <p:cTn id="5" presetID="10" presetClass="entr" presetSubtype="0" fill="hold" nodeType="clickEffect" nodePh="1">
+                                  <p:stCondLst>
+                                    <p:cond delay="0"/>
+                                  </p:stCondLst>
+                                  <p:endCondLst>
+                                    <p:cond evt="begin" delay="0">
+                                      <p:tn val="5"/>
+                                    </p:cond>
+                                  </p:endCondLst>
+                                  <p:childTnLst>
+                                    <p:set>
+                                      <p:cBhvr>
+                                        <p:cTn id="6" dur="1" fill="hold">
+                                          <p:stCondLst>
+                                            <p:cond delay="0"/>
+                                          </p:stCondLst>
+                                        </p:cTn>
+                                        <p:tgtEl>
+                                          <p:spTgt spid="5">
+                                            <p:txEl>
+                                              <p:pRg st="0" end="0"/>
+                                            </p:txEl>
+                                          </p:spTgt>
+                                        </p:tgtEl>
+                                        <p:attrNameLst>
+                                          <p:attrName>style.visibility</p:attrName>
+                                        </p:attrNameLst>
+                                      </p:cBhvr>
+                                      <p:to>
+                                        <p:strVal val="visible"/>
+                                      </p:to>
+                                    </p:set>
+                                    <p:animEffect transition="in" filter="fade">
+                                      <p:cBhvr>
+                                        <p:cTn id="7" dur="500"/>
+                                        <p:tgtEl>
+                                          <p:spTgt spid="5">
+                                            <p:txEl>
+                                              <p:pRg st="0" end="0"/>
+                                            </p:txEl>
+                                          </p:spTgt>
+                                        </p:tgtEl>
+                                      </p:cBhvr>
+                                    </p:animEffect>
+                                  </p:childTnLst>
+                                </p:cTn>
+                              </p:par>
+                            </p:childTnLst>
+                          </p:cTn>
+                        </p:par>
+                      </p:childTnLst>
+                    </p:cTn>
+                  </p:par>
+                </p:childTnLst>
+              </p:cTn>
+              <p:prevCondLst>
+                <p:cond evt="onPrev" delay="0">
+                  <p:tgtEl>
+                    <p:sldTgt/>
+                  </p:tgtEl>
+                </p:cond>
+              </p:prevCondLst>
+              <p:nextCondLst>
+                <p:cond evt="onNext" delay="0">
+                  <p:tgtEl>
+                    <p:sldTgt/>
+                  </p:tgtEl>
+                </p:cond>
+              </p:nextCondLst>
+            </p:seq>
+          </p:childTnLst>
+        </p:cTn>
+      </p:par>
+    </p:tnLst>
+  </p:timing>
+</p:sld>
+</file>
+
+<file path=ppt/slides/slide18.xml><?xml version="1.0" encoding="utf-8"?>
+<p:sld xmlns:a="http://schemas.openxmlformats.org/drawingml/2006/main" xmlns:r="http://schemas.openxmlformats.org/officeDocument/2006/relationships" xmlns:p="http://schemas.openxmlformats.org/presentationml/2006/main">
+  <p:cSld>
+    <p:spTree>
+      <p:nvGrpSpPr>
+        <p:cNvPr id="1" name=""/>
+        <p:cNvGrpSpPr/>
+        <p:nvPr/>
+      </p:nvGrpSpPr>
+      <p:grpSpPr>
+        <a:xfrm>
+          <a:off x="0" y="0"/>
+          <a:ext cx="0" cy="0"/>
+          <a:chOff x="0" y="0"/>
+          <a:chExt cx="0" cy="0"/>
+        </a:xfrm>
+      </p:grpSpPr>
+      <p:sp>
+        <p:nvSpPr>
+          <p:cNvPr id="251" name="PlaceHolder 1"/>
+          <p:cNvSpPr>
+            <a:spLocks noGrp="1"/>
+          </p:cNvSpPr>
+          <p:nvPr>
+            <p:ph type="title"/>
+          </p:nvPr>
+        </p:nvSpPr>
+        <p:spPr>
+          <a:xfrm>
+            <a:off x="214588" y="442689"/>
+            <a:ext cx="8544600" cy="479021"/>
+          </a:xfrm>
+          <a:prstGeom prst="rect">
+            <a:avLst/>
+          </a:prstGeom>
+          <a:noFill/>
+          <a:ln w="0">
+            <a:noFill/>
+          </a:ln>
+        </p:spPr>
+        <p:txBody>
+          <a:bodyPr lIns="90000" tIns="45000" rIns="90000" bIns="45000" anchor="t">
+            <a:noAutofit/>
+          </a:bodyPr>
+          <a:lstStyle/>
+          <a:p>
+            <a:pPr>
+              <a:lnSpc>
+                <a:spcPct val="100000"/>
+              </a:lnSpc>
+              <a:buNone/>
+            </a:pPr>
+            <a:r>
+              <a:rPr lang="en-US" sz="2400" b="1" strike="noStrike" spc="-1" dirty="0">
+                <a:solidFill>
+                  <a:srgbClr val="FFFFFF"/>
+                </a:solidFill>
+                <a:latin typeface="Calibri"/>
+              </a:rPr>
+              <a:t>Summary</a:t>
+            </a:r>
+            <a:endParaRPr lang="en-PH" sz="2400" b="0" strike="noStrike" spc="-1" dirty="0">
+              <a:latin typeface="Arial"/>
+            </a:endParaRPr>
+          </a:p>
+        </p:txBody>
+      </p:sp>
+      <p:sp>
+        <p:nvSpPr>
+          <p:cNvPr id="3" name="TextBox 2">
+            <a:extLst>
+              <a:ext uri="{FF2B5EF4-FFF2-40B4-BE49-F238E27FC236}">
+                <a16:creationId xmlns:a16="http://schemas.microsoft.com/office/drawing/2014/main" id="{DEF2ECB4-4934-4E2D-A877-E7BC1353183B}"/>
+              </a:ext>
+            </a:extLst>
+          </p:cNvPr>
+          <p:cNvSpPr txBox="1"/>
+          <p:nvPr/>
+        </p:nvSpPr>
+        <p:spPr>
+          <a:xfrm>
+            <a:off x="214588" y="1118486"/>
+            <a:ext cx="9693000" cy="2585323"/>
+          </a:xfrm>
+          <a:prstGeom prst="rect">
+            <a:avLst/>
+          </a:prstGeom>
+          <a:noFill/>
+        </p:spPr>
+        <p:txBody>
+          <a:bodyPr wrap="square">
+            <a:spAutoFit/>
+          </a:bodyPr>
+          <a:lstStyle/>
+          <a:p>
+            <a:pPr>
+              <a:lnSpc>
+                <a:spcPct val="100000"/>
+              </a:lnSpc>
+              <a:buClr>
+                <a:srgbClr val="000000"/>
+              </a:buClr>
+            </a:pPr>
+            <a:endParaRPr lang="en-PH" spc="-1" dirty="0">
+              <a:solidFill>
+                <a:srgbClr val="000000"/>
+              </a:solidFill>
+              <a:latin typeface="Trebuchet MS" panose="020B0603020202020204" pitchFamily="34" charset="0"/>
+            </a:endParaRPr>
+          </a:p>
+          <a:p>
+            <a:pPr>
+              <a:lnSpc>
+                <a:spcPct val="100000"/>
+              </a:lnSpc>
+              <a:buClr>
+                <a:srgbClr val="000000"/>
+              </a:buClr>
+            </a:pPr>
+            <a:endParaRPr lang="en-PH" spc="-1" dirty="0">
+              <a:solidFill>
+                <a:srgbClr val="000000"/>
+              </a:solidFill>
+              <a:latin typeface="Trebuchet MS" panose="020B0603020202020204" pitchFamily="34" charset="0"/>
+            </a:endParaRPr>
+          </a:p>
+          <a:p>
+            <a:pPr marL="285750" indent="-285750">
+              <a:lnSpc>
+                <a:spcPct val="100000"/>
+              </a:lnSpc>
+              <a:buClr>
+                <a:srgbClr val="000000"/>
+              </a:buClr>
+              <a:buFont typeface="Wingdings" panose="05000000000000000000" pitchFamily="2" charset="2"/>
+              <a:buChar char="v"/>
+            </a:pPr>
+            <a:r>
+              <a:rPr lang="en-PH" spc="-1" dirty="0">
+                <a:solidFill>
+                  <a:srgbClr val="000000"/>
+                </a:solidFill>
+                <a:latin typeface="Trebuchet MS" panose="020B0603020202020204" pitchFamily="34" charset="0"/>
+              </a:rPr>
+              <a:t>Setup PowerShell</a:t>
+            </a:r>
+            <a:br>
+              <a:rPr lang="en-PH" spc="-1" dirty="0">
+                <a:solidFill>
+                  <a:srgbClr val="000000"/>
+                </a:solidFill>
+                <a:latin typeface="Trebuchet MS" panose="020B0603020202020204" pitchFamily="34" charset="0"/>
+              </a:rPr>
+            </a:br>
+            <a:endParaRPr lang="en-PH" spc="-1" dirty="0">
+              <a:solidFill>
+                <a:srgbClr val="000000"/>
+              </a:solidFill>
+              <a:latin typeface="Trebuchet MS" panose="020B0603020202020204" pitchFamily="34" charset="0"/>
+            </a:endParaRPr>
+          </a:p>
+          <a:p>
+            <a:pPr marL="285750" indent="-285750">
+              <a:lnSpc>
+                <a:spcPct val="100000"/>
+              </a:lnSpc>
+              <a:buClr>
+                <a:srgbClr val="000000"/>
+              </a:buClr>
+              <a:buFont typeface="Wingdings" panose="05000000000000000000" pitchFamily="2" charset="2"/>
+              <a:buChar char="v"/>
+            </a:pPr>
+            <a:r>
+              <a:rPr lang="en-PH" spc="-1" dirty="0">
+                <a:solidFill>
+                  <a:srgbClr val="000000"/>
+                </a:solidFill>
+                <a:latin typeface="Trebuchet MS" panose="020B0603020202020204" pitchFamily="34" charset="0"/>
+              </a:rPr>
+              <a:t>Useful PS commands</a:t>
+            </a:r>
+            <a:br>
+              <a:rPr lang="en-PH" spc="-1" dirty="0">
+                <a:solidFill>
+                  <a:srgbClr val="000000"/>
+                </a:solidFill>
+                <a:latin typeface="Trebuchet MS" panose="020B0603020202020204" pitchFamily="34" charset="0"/>
+              </a:rPr>
+            </a:br>
+            <a:endParaRPr lang="en-PH" spc="-1" dirty="0">
+              <a:solidFill>
+                <a:srgbClr val="000000"/>
+              </a:solidFill>
+              <a:latin typeface="Trebuchet MS" panose="020B0603020202020204" pitchFamily="34" charset="0"/>
+            </a:endParaRPr>
+          </a:p>
+          <a:p>
+            <a:pPr marL="285750" indent="-285750">
+              <a:lnSpc>
+                <a:spcPct val="100000"/>
+              </a:lnSpc>
+              <a:buClr>
+                <a:srgbClr val="000000"/>
+              </a:buClr>
+              <a:buFont typeface="Wingdings" panose="05000000000000000000" pitchFamily="2" charset="2"/>
+              <a:buChar char="v"/>
+            </a:pPr>
+            <a:r>
+              <a:rPr lang="en-PH" spc="-1" dirty="0">
+                <a:solidFill>
+                  <a:srgbClr val="000000"/>
+                </a:solidFill>
+                <a:latin typeface="Trebuchet MS" panose="020B0603020202020204" pitchFamily="34" charset="0"/>
+              </a:rPr>
+              <a:t>Building our own custom functions</a:t>
+            </a:r>
+          </a:p>
+          <a:p>
+            <a:pPr marL="285750" indent="-285750">
+              <a:lnSpc>
+                <a:spcPct val="100000"/>
+              </a:lnSpc>
+              <a:buClr>
+                <a:srgbClr val="000000"/>
+              </a:buClr>
+              <a:buFont typeface="Wingdings" panose="05000000000000000000" pitchFamily="2" charset="2"/>
+              <a:buChar char="v"/>
+            </a:pPr>
+            <a:endParaRPr lang="en-PH" spc="-1" dirty="0">
+              <a:solidFill>
+                <a:srgbClr val="000000"/>
+              </a:solidFill>
+              <a:latin typeface="Trebuchet MS" panose="020B0603020202020204" pitchFamily="34" charset="0"/>
+            </a:endParaRPr>
+          </a:p>
+          <a:p>
+            <a:pPr>
+              <a:lnSpc>
+                <a:spcPct val="100000"/>
+              </a:lnSpc>
+              <a:buClr>
+                <a:srgbClr val="000000"/>
+              </a:buClr>
+            </a:pPr>
+            <a:endParaRPr lang="en-PH" sz="1800" b="0" strike="noStrike" spc="-1" dirty="0">
+              <a:solidFill>
+                <a:srgbClr val="000000"/>
+              </a:solidFill>
+              <a:latin typeface="Trebuchet MS" panose="020B0603020202020204" pitchFamily="34" charset="0"/>
+            </a:endParaRPr>
+          </a:p>
+        </p:txBody>
+      </p:sp>
+    </p:spTree>
+    <p:extLst>
+      <p:ext uri="{BB962C8B-B14F-4D97-AF65-F5344CB8AC3E}">
+        <p14:creationId xmlns:p14="http://schemas.microsoft.com/office/powerpoint/2010/main" val="556791918"/>
+      </p:ext>
+    </p:extLst>
+  </p:cSld>
+  <p:clrMapOvr>
+    <a:masterClrMapping/>
+  </p:clrMapOvr>
+  <p:timing>
+    <p:tnLst>
+      <p:par>
+        <p:cTn id="1" dur="indefinite" restart="never" nodeType="tmRoot">
+          <p:childTnLst>
+            <p:seq concurrent="1" nextAc="seek">
+              <p:cTn id="2" dur="indefinite" nodeType="mainSeq">
+                <p:childTnLst>
+                  <p:par>
+                    <p:cTn id="3" fill="hold">
+                      <p:stCondLst>
+                        <p:cond delay="indefinite"/>
+                      </p:stCondLst>
+                      <p:childTnLst>
+                        <p:par>
+                          <p:cTn id="4" fill="hold">
+                            <p:stCondLst>
+                              <p:cond delay="0"/>
+                            </p:stCondLst>
+                            <p:childTnLst>
+                              <p:par>
+                                <p:cTn id="5" presetID="10" presetClass="entr" presetSubtype="0" fill="hold" nodeType="clickEffect">
+                                  <p:stCondLst>
+                                    <p:cond delay="0"/>
+                                  </p:stCondLst>
+                                  <p:childTnLst>
+                                    <p:set>
+                                      <p:cBhvr>
+                                        <p:cTn id="6" dur="1" fill="hold">
+                                          <p:stCondLst>
+                                            <p:cond delay="0"/>
+                                          </p:stCondLst>
+                                        </p:cTn>
+                                        <p:tgtEl>
+                                          <p:spTgt spid="3">
+                                            <p:txEl>
+                                              <p:pRg st="2" end="2"/>
+                                            </p:txEl>
+                                          </p:spTgt>
+                                        </p:tgtEl>
+                                        <p:attrNameLst>
+                                          <p:attrName>style.visibility</p:attrName>
+                                        </p:attrNameLst>
+                                      </p:cBhvr>
+                                      <p:to>
+                                        <p:strVal val="visible"/>
+                                      </p:to>
+                                    </p:set>
+                                    <p:animEffect transition="in" filter="fade">
+                                      <p:cBhvr>
+                                        <p:cTn id="7" dur="500"/>
+                                        <p:tgtEl>
+                                          <p:spTgt spid="3">
+                                            <p:txEl>
+                                              <p:pRg st="2" end="2"/>
+                                            </p:txEl>
+                                          </p:spTgt>
+                                        </p:tgtEl>
+                                      </p:cBhvr>
+                                    </p:animEffect>
+                                  </p:childTnLst>
+                                </p:cTn>
+                              </p:par>
+                            </p:childTnLst>
+                          </p:cTn>
+                        </p:par>
+                      </p:childTnLst>
+                    </p:cTn>
+                  </p:par>
+                  <p:par>
+                    <p:cTn id="8" fill="hold">
+                      <p:stCondLst>
+                        <p:cond delay="indefinite"/>
+                      </p:stCondLst>
+                      <p:childTnLst>
+                        <p:par>
+                          <p:cTn id="9" fill="hold">
+                            <p:stCondLst>
+                              <p:cond delay="0"/>
+                            </p:stCondLst>
+                            <p:childTnLst>
+                              <p:par>
+                                <p:cTn id="10" presetID="10" presetClass="entr" presetSubtype="0" fill="hold" nodeType="clickEffect">
+                                  <p:stCondLst>
+                                    <p:cond delay="0"/>
+                                  </p:stCondLst>
+                                  <p:childTnLst>
+                                    <p:set>
+                                      <p:cBhvr>
+                                        <p:cTn id="11" dur="1" fill="hold">
+                                          <p:stCondLst>
+                                            <p:cond delay="0"/>
+                                          </p:stCondLst>
+                                        </p:cTn>
+                                        <p:tgtEl>
+                                          <p:spTgt spid="3">
+                                            <p:txEl>
+                                              <p:pRg st="3" end="3"/>
+                                            </p:txEl>
+                                          </p:spTgt>
+                                        </p:tgtEl>
+                                        <p:attrNameLst>
+                                          <p:attrName>style.visibility</p:attrName>
+                                        </p:attrNameLst>
+                                      </p:cBhvr>
+                                      <p:to>
+                                        <p:strVal val="visible"/>
+                                      </p:to>
+                                    </p:set>
+                                    <p:animEffect transition="in" filter="fade">
+                                      <p:cBhvr>
+                                        <p:cTn id="12" dur="500"/>
+                                        <p:tgtEl>
+                                          <p:spTgt spid="3">
+                                            <p:txEl>
+                                              <p:pRg st="3" end="3"/>
+                                            </p:txEl>
+                                          </p:spTgt>
+                                        </p:tgtEl>
+                                      </p:cBhvr>
+                                    </p:animEffect>
+                                  </p:childTnLst>
+                                </p:cTn>
+                              </p:par>
+                            </p:childTnLst>
+                          </p:cTn>
+                        </p:par>
+                      </p:childTnLst>
+                    </p:cTn>
+                  </p:par>
+                  <p:par>
+                    <p:cTn id="13" fill="hold">
+                      <p:stCondLst>
+                        <p:cond delay="indefinite"/>
+                      </p:stCondLst>
+                      <p:childTnLst>
+                        <p:par>
+                          <p:cTn id="14" fill="hold">
+                            <p:stCondLst>
+                              <p:cond delay="0"/>
+                            </p:stCondLst>
+                            <p:childTnLst>
+                              <p:par>
+                                <p:cTn id="15" presetID="10" presetClass="entr" presetSubtype="0" fill="hold" nodeType="clickEffect">
+                                  <p:stCondLst>
+                                    <p:cond delay="0"/>
+                                  </p:stCondLst>
+                                  <p:childTnLst>
+                                    <p:set>
+                                      <p:cBhvr>
+                                        <p:cTn id="16" dur="1" fill="hold">
+                                          <p:stCondLst>
+                                            <p:cond delay="0"/>
+                                          </p:stCondLst>
+                                        </p:cTn>
+                                        <p:tgtEl>
+                                          <p:spTgt spid="3">
+                                            <p:txEl>
+                                              <p:pRg st="4" end="4"/>
+                                            </p:txEl>
+                                          </p:spTgt>
+                                        </p:tgtEl>
+                                        <p:attrNameLst>
+                                          <p:attrName>style.visibility</p:attrName>
+                                        </p:attrNameLst>
+                                      </p:cBhvr>
+                                      <p:to>
+                                        <p:strVal val="visible"/>
+                                      </p:to>
+                                    </p:set>
+                                    <p:animEffect transition="in" filter="fade">
+                                      <p:cBhvr>
+                                        <p:cTn id="17" dur="500"/>
+                                        <p:tgtEl>
+                                          <p:spTgt spid="3">
+                                            <p:txEl>
+                                              <p:pRg st="4" end="4"/>
+                                            </p:txEl>
+                                          </p:spTgt>
+                                        </p:tgtEl>
+                                      </p:cBhvr>
+                                    </p:animEffect>
+                                  </p:childTnLst>
+                                </p:cTn>
+                              </p:par>
+                            </p:childTnLst>
+                          </p:cTn>
+                        </p:par>
+                      </p:childTnLst>
+                    </p:cTn>
+                  </p:par>
+                </p:childTnLst>
+              </p:cTn>
+              <p:prevCondLst>
+                <p:cond evt="onPrev" delay="0">
+                  <p:tgtEl>
+                    <p:sldTgt/>
+                  </p:tgtEl>
+                </p:cond>
+              </p:prevCondLst>
+              <p:nextCondLst>
+                <p:cond evt="onNext" delay="0">
+                  <p:tgtEl>
+                    <p:sldTgt/>
+                  </p:tgtEl>
+                </p:cond>
+              </p:nextCondLst>
+            </p:seq>
+          </p:childTnLst>
+        </p:cTn>
+      </p:par>
+    </p:tnLst>
+  </p:timing>
+</p:sld>
+</file>
+
+<file path=ppt/slides/slide19.xml><?xml version="1.0" encoding="utf-8"?>
+<p:sld xmlns:a="http://schemas.openxmlformats.org/drawingml/2006/main" xmlns:r="http://schemas.openxmlformats.org/officeDocument/2006/relationships" xmlns:p="http://schemas.openxmlformats.org/presentationml/2006/main">
+  <p:cSld>
+    <p:spTree>
+      <p:nvGrpSpPr>
+        <p:cNvPr id="1" name=""/>
+        <p:cNvGrpSpPr/>
+        <p:nvPr/>
+      </p:nvGrpSpPr>
+      <p:grpSpPr>
+        <a:xfrm>
+          <a:off x="0" y="0"/>
+          <a:ext cx="0" cy="0"/>
+          <a:chOff x="0" y="0"/>
+          <a:chExt cx="0" cy="0"/>
+        </a:xfrm>
+      </p:grpSpPr>
+      <p:sp>
+        <p:nvSpPr>
+          <p:cNvPr id="264" name="PlaceHolder 2"/>
+          <p:cNvSpPr>
+            <a:spLocks noGrp="1"/>
+          </p:cNvSpPr>
+          <p:nvPr>
+            <p:ph/>
+          </p:nvPr>
+        </p:nvSpPr>
+        <p:spPr>
+          <a:xfrm>
+            <a:off x="345329" y="1907929"/>
+            <a:ext cx="6468709" cy="3068517"/>
+          </a:xfrm>
+          <a:prstGeom prst="rect">
+            <a:avLst/>
+          </a:prstGeom>
+          <a:noFill/>
+          <a:ln w="0">
+            <a:noFill/>
+          </a:ln>
+        </p:spPr>
+        <p:txBody>
+          <a:bodyPr lIns="90000" tIns="45000" rIns="90000" bIns="45000" anchor="t">
+            <a:noAutofit/>
+          </a:bodyPr>
+          <a:lstStyle/>
+          <a:p>
+            <a:pPr>
+              <a:lnSpc>
+                <a:spcPct val="100000"/>
+              </a:lnSpc>
+              <a:buNone/>
+              <a:tabLst>
+                <a:tab pos="0" algn="l"/>
+              </a:tabLst>
+            </a:pPr>
+            <a:r>
+              <a:rPr lang="en-US" sz="3200" i="0" u="none" strike="noStrike" dirty="0">
+                <a:solidFill>
+                  <a:srgbClr val="000000"/>
+                </a:solidFill>
+                <a:effectLst/>
+                <a:latin typeface="Trebuchet MS" panose="020B0603020202020204" pitchFamily="34" charset="0"/>
+              </a:rPr>
+              <a:t>“Programming is a skill best acquired by practice and example rather than from books.” </a:t>
+            </a:r>
+            <a:endParaRPr lang="en-US" sz="3200" b="1" dirty="0">
+              <a:solidFill>
+                <a:srgbClr val="000000"/>
+              </a:solidFill>
+              <a:latin typeface="Trebuchet MS" panose="020B0603020202020204" pitchFamily="34" charset="0"/>
+            </a:endParaRPr>
+          </a:p>
+          <a:p>
+            <a:pPr algn="r">
+              <a:lnSpc>
+                <a:spcPct val="100000"/>
+              </a:lnSpc>
+              <a:buNone/>
+              <a:tabLst>
+                <a:tab pos="0" algn="l"/>
+              </a:tabLst>
+            </a:pPr>
+            <a:r>
+              <a:rPr lang="en-US" sz="3200" b="1" i="0" u="none" strike="noStrike" dirty="0">
+                <a:solidFill>
+                  <a:srgbClr val="000000"/>
+                </a:solidFill>
+                <a:effectLst/>
+                <a:latin typeface="Trebuchet MS" panose="020B0603020202020204" pitchFamily="34" charset="0"/>
+              </a:rPr>
+              <a:t>Alan Turing</a:t>
+            </a:r>
+          </a:p>
+          <a:p>
+            <a:pPr>
+              <a:lnSpc>
+                <a:spcPct val="100000"/>
+              </a:lnSpc>
+              <a:buNone/>
+              <a:tabLst>
+                <a:tab pos="0" algn="l"/>
+              </a:tabLst>
+            </a:pPr>
+            <a:endParaRPr lang="en-PH" sz="4000" b="0" strike="noStrike" spc="-1" dirty="0">
+              <a:latin typeface="Trebuchet MS" panose="020B0603020202020204" pitchFamily="34" charset="0"/>
+            </a:endParaRPr>
+          </a:p>
+        </p:txBody>
+      </p:sp>
+    </p:spTree>
+    <p:extLst>
+      <p:ext uri="{BB962C8B-B14F-4D97-AF65-F5344CB8AC3E}">
+        <p14:creationId xmlns:p14="http://schemas.microsoft.com/office/powerpoint/2010/main" val="2891127504"/>
+      </p:ext>
+    </p:extLst>
   </p:cSld>
   <p:clrMapOvr>
     <a:masterClrMapping/>
@@ -18405,7 +18481,7 @@
                 <a:latin typeface="Calibri" panose="020F0502020204030204" pitchFamily="34" charset="0"/>
                 <a:cs typeface="Calibri" panose="020F0502020204030204" pitchFamily="34" charset="0"/>
               </a:rPr>
-              <a:t>PowerShell is a task automation and configuration management program from Microsoft, consisting of a command-line shell and the associated scripting language. Initially, a Windows component only, known as Windows PowerShell, it was made open-source and cross-platform on 18 August 2016 with the introduction of PowerShell Core. The former is build on the .NET Framework and the latter on </a:t>
+              <a:t>PowerShell is a task automation and configuration management program from Microsoft, consisting of a command-line shell and the associated scripting language. Initially, a Windows component only, known as Windows PowerShell, it was made open-source and cross-platform on 18 August 2016 with the introduction of PowerShell Core. The former is built on the .NET Framework and the latter on </a:t>
             </a:r>
             <a:r>
               <a:rPr lang="en-US" sz="1700" b="0" strike="noStrike" spc="-1" dirty="0" err="1">
@@ -18677,13 +18753,13 @@
               <a:buNone/>
             </a:pPr>
             <a:r>
-              <a:rPr lang="en-US" sz="2400" b="1" strike="noStrike" spc="-1" dirty="0">
+              <a:rPr lang="en-US" sz="2400" b="1" spc="-1" dirty="0">
                 <a:solidFill>
                   <a:srgbClr val="FFFFFF"/>
                 </a:solidFill>
                 <a:latin typeface="Calibri"/>
               </a:rPr>
-              <a:t>Shells</a:t>
+              <a:t>Operating System</a:t>
             </a:r>
             <a:endParaRPr lang="en-PH" sz="2400" b="0" strike="noStrike" spc="-1" dirty="0">
               <a:latin typeface="Arial"/>
@@ -18724,20 +18800,104 @@
               <a:lnSpc>
                 <a:spcPct val="100000"/>
               </a:lnSpc>
-              <a:buFont typeface="Arial" panose="020B0604020202020204" pitchFamily="34" charset="0"/>
+              <a:tabLst>
+                <a:tab pos="0" algn="l"/>
+              </a:tabLst>
+            </a:pPr>
+            <a:r>
+              <a:rPr lang="en-US" sz="1700" spc="-1" dirty="0">
+                <a:latin typeface="Trebuchet MS" panose="020B0603020202020204" pitchFamily="34" charset="0"/>
+              </a:rPr>
+              <a:t>Hardware</a:t>
+            </a:r>
+          </a:p>
+          <a:p>
+            <a:pPr marL="457200" lvl="1" indent="0" algn="just">
+              <a:lnSpc>
+                <a:spcPct val="100000"/>
+              </a:lnSpc>
               <a:buNone/>
               <a:tabLst>
                 <a:tab pos="0" algn="l"/>
               </a:tabLst>
             </a:pPr>
             <a:r>
+              <a:rPr lang="en-US" sz="1300" spc="-1" dirty="0">
+                <a:latin typeface="Trebuchet MS" panose="020B0603020202020204" pitchFamily="34" charset="0"/>
+              </a:rPr>
+              <a:t>Computer Hardware includes the physical parts of a computer, such as the case, central processing unit, random access memory, monitor, mouse, keyboard, computer data storage, graphics card, speakers and motherboard.</a:t>
+            </a:r>
+            <a:endParaRPr lang="en-US" sz="1700" spc="-1" dirty="0">
+              <a:latin typeface="Trebuchet MS" panose="020B0603020202020204" pitchFamily="34" charset="0"/>
+            </a:endParaRPr>
+          </a:p>
+          <a:p>
+            <a:pPr algn="just">
+              <a:lnSpc>
+                <a:spcPct val="100000"/>
+              </a:lnSpc>
+              <a:tabLst>
+                <a:tab pos="0" algn="l"/>
+              </a:tabLst>
+            </a:pPr>
+            <a:r>
               <a:rPr lang="en-US" sz="1700" spc="-1" dirty="0">
-                <a:latin typeface="Arial"/>
+                <a:latin typeface="Trebuchet MS" panose="020B0603020202020204" pitchFamily="34" charset="0"/>
               </a:rPr>
-              <a:t>		a Shell is a computer program that exposes an operating system's services to a human user or other programs. In general, operating system shells use either a command-line-interface(CLI) or graphical user interface(GUI).</a:t>
+              <a:t>Kernel	</a:t>
             </a:r>
-            <a:endParaRPr lang="en-PH" sz="1700" spc="-1" dirty="0">
-              <a:latin typeface="Arial"/>
+          </a:p>
+          <a:p>
+            <a:pPr marL="457200" lvl="1" indent="0" algn="just">
+              <a:lnSpc>
+                <a:spcPct val="100000"/>
+              </a:lnSpc>
+              <a:buNone/>
+              <a:tabLst>
+                <a:tab pos="0" algn="l"/>
+              </a:tabLst>
+            </a:pPr>
+            <a:r>
+              <a:rPr lang="en-US" sz="1300" spc="-1" dirty="0">
+                <a:latin typeface="Trebuchet MS" panose="020B0603020202020204" pitchFamily="34" charset="0"/>
+              </a:rPr>
+              <a:t>The kernel is a computer program at the core of a computer’s operating system and generally has complete control over everything in the system.</a:t>
+            </a:r>
+          </a:p>
+          <a:p>
+            <a:pPr algn="just">
+              <a:lnSpc>
+                <a:spcPct val="100000"/>
+              </a:lnSpc>
+              <a:tabLst>
+                <a:tab pos="0" algn="l"/>
+              </a:tabLst>
+            </a:pPr>
+            <a:r>
+              <a:rPr lang="en-US" sz="1700" spc="-1" dirty="0">
+                <a:latin typeface="Trebuchet MS" panose="020B0603020202020204" pitchFamily="34" charset="0"/>
+              </a:rPr>
+              <a:t>Shell</a:t>
+            </a:r>
+          </a:p>
+          <a:p>
+            <a:pPr marL="457200" lvl="1" indent="0" algn="just">
+              <a:lnSpc>
+                <a:spcPct val="100000"/>
+              </a:lnSpc>
+              <a:buNone/>
+              <a:tabLst>
+                <a:tab pos="0" algn="l"/>
+              </a:tabLst>
+            </a:pPr>
+            <a:r>
+              <a:rPr lang="en-US" sz="1300" spc="-1" dirty="0">
+                <a:latin typeface="Trebuchet MS" panose="020B0603020202020204" pitchFamily="34" charset="0"/>
+              </a:rPr>
+              <a:t>a Shell is a computer program that exposes an operating system's services to a human user or other programs. In general, operating system shells use either a command-line-interface(CLI) or graphical user interface(GUI).</a:t>
+            </a:r>
+            <a:endParaRPr lang="en-PH" sz="1300" spc="-1" dirty="0">
+              <a:latin typeface="Trebuchet MS" panose="020B0603020202020204" pitchFamily="34" charset="0"/>
             </a:endParaRPr>
           </a:p>
         </p:txBody>
@@ -19018,22 +19178,17 @@
           <p:nvPr/>
         </p:nvSpPr>
         <p:spPr>
-          <a:xfrm rot="3061079">
-            <a:off x="6258044" y="2414757"/>
-            <a:ext cx="753533" cy="609600"/>
+          <a:xfrm rot="5400000">
+            <a:off x="7410612" y="2236230"/>
+            <a:ext cx="629057" cy="609600"/>
           </a:xfrm>
           <a:prstGeom prst="rightArrow">
             <a:avLst/>
           </a:prstGeom>
-          <a:solidFill>
-            <a:schemeClr val="accent4">
-              <a:lumMod val="50000"/>
-              <a:lumOff val="50000"/>
-            </a:schemeClr>
-          </a:solidFill>
+          <a:noFill/>
           <a:ln>
             <a:solidFill>
-              <a:srgbClr val="B56917"/>
+              <a:schemeClr val="tx1"/>
             </a:solidFill>
           </a:ln>
         </p:spPr>
@@ -19068,34 +19223,58 @@
       </p:sp>
       <p:sp>
         <p:nvSpPr>
-          <p:cNvPr id="11" name="TextBox 10">
+          <p:cNvPr id="2" name="Rectangle: Rounded Corners 1">
             <a:extLst>
               <a:ext uri="{FF2B5EF4-FFF2-40B4-BE49-F238E27FC236}">
-                <a16:creationId xmlns:a16="http://schemas.microsoft.com/office/drawing/2014/main" id="{2D163225-6E11-448F-A737-BD5866D4399F}"/>
+                <a16:creationId xmlns:a16="http://schemas.microsoft.com/office/drawing/2014/main" id="{7508C968-653E-425D-8FDF-A39A6F692C93}"/>
               </a:ext>
             </a:extLst>
           </p:cNvPr>
-          <p:cNvSpPr txBox="1"/>
+          <p:cNvSpPr/>
           <p:nvPr/>
         </p:nvSpPr>
         <p:spPr>
           <a:xfrm>
-            <a:off x="5533527" y="1578032"/>
-            <a:ext cx="1248931" cy="830997"/>
+            <a:off x="6505795" y="1257259"/>
+            <a:ext cx="2438693" cy="969240"/>
           </a:xfrm>
-          <a:prstGeom prst="rect">
+          <a:prstGeom prst="roundRect">
             <a:avLst/>
           </a:prstGeom>
           <a:noFill/>
+          <a:ln>
+            <a:solidFill>
+              <a:schemeClr val="tx1"/>
+            </a:solidFill>
+          </a:ln>
         </p:spPr>
+        <p:style>
+          <a:lnRef idx="2">
+            <a:schemeClr val="accent1">
+              <a:shade val="50000"/>
+            </a:schemeClr>
+          </a:lnRef>
+          <a:fillRef idx="1">
+            <a:schemeClr val="accent1"/>
+          </a:fillRef>
+          <a:effectRef idx="0">
+            <a:schemeClr val="accent1"/>
+          </a:effectRef>
+          <a:fontRef idx="minor">
+            <a:schemeClr val="lt1"/>
+          </a:fontRef>
+        </p:style>
         <p:txBody>
-          <a:bodyPr wrap="square" rtlCol="0">
-            <a:spAutoFit/>
-          </a:bodyPr>
+          <a:bodyPr rtlCol="0" anchor="ctr"/>
           <a:lstStyle/>
           <a:p>
+            <a:pPr algn="ctr"/>
             <a:r>
-              <a:rPr lang="en-PH" sz="2400" b="1" dirty="0"/>
+              <a:rPr lang="en-PH" sz="1800" b="1" dirty="0">
+                <a:solidFill>
+                  <a:schemeClr val="tx1"/>
+                </a:solidFill>
+              </a:rPr>
               <a:t>USER INPUT</a:t>
             </a:r>
           </a:p>
@@ -19337,7 +19516,7 @@
                             </p:stCondLst>
                             <p:childTnLst>
                               <p:par>
-                                <p:cTn id="23" presetID="14" presetClass="entr" presetSubtype="10" fill="hold" grpId="0" nodeType="afterEffect">
+                                <p:cTn id="23" presetID="10" presetClass="entr" presetSubtype="0" fill="hold" grpId="0" nodeType="afterEffect">
                                   <p:stCondLst>
                                     <p:cond delay="0"/>
                                   </p:stCondLst>
@@ -19360,7 +19539,7 @@
                                         <p:strVal val="visible"/>
                                       </p:to>
                                     </p:set>
-                                    <p:animEffect transition="in" filter="randombar(horizontal)">
+                                    <p:animEffect transition="in" filter="fade">
                                       <p:cBhvr>
                                         <p:cTn id="25" dur="500"/>
                                         <p:tgtEl>
@@ -19371,21 +19550,30 @@
                                   </p:childTnLst>
                                 </p:cTn>
                               </p:par>
+                            </p:childTnLst>
+                          </p:cTn>
+                        </p:par>
+                        <p:par>
+                          <p:cTn id="26" fill="hold">
+                            <p:stCondLst>
+                              <p:cond delay="6500"/>
+                            </p:stCondLst>
+                            <p:childTnLst>
                               <p:par>
-                                <p:cTn id="26" presetID="14" presetClass="entr" presetSubtype="10" fill="hold" grpId="0" nodeType="withEffect">
+                                <p:cTn id="27" presetID="10" presetClass="entr" presetSubtype="0" fill="hold" grpId="0" nodeType="afterEffect">
                                   <p:stCondLst>
                                     <p:cond delay="0"/>
                                   </p:stCondLst>
                                   <p:childTnLst>
                                     <p:set>
                                       <p:cBhvr>
-                                        <p:cTn id="27" dur="1" fill="hold">
+                                        <p:cTn id="28" dur="1" fill="hold">
                                           <p:stCondLst>
                                             <p:cond delay="0"/>
                                           </p:stCondLst>
                                         </p:cTn>
                                         <p:tgtEl>
-                                          <p:spTgt spid="11"/>
+                                          <p:spTgt spid="2"/>
                                         </p:tgtEl>
                                         <p:attrNameLst>
                                           <p:attrName>style.visibility</p:attrName>
@@ -19395,11 +19583,11 @@
                                         <p:strVal val="visible"/>
                                       </p:to>
                                     </p:set>
-                                    <p:animEffect transition="in" filter="randombar(horizontal)">
+                                    <p:animEffect transition="in" filter="fade">
                                       <p:cBhvr>
-                                        <p:cTn id="28" dur="500"/>
+                                        <p:cTn id="29" dur="500"/>
                                         <p:tgtEl>
-                                          <p:spTgt spid="11"/>
+                                          <p:spTgt spid="2"/>
                                         </p:tgtEl>
                                       </p:cBhvr>
                                     </p:animEffect>
@@ -19413,26 +19601,26 @@
                     </p:cTn>
                   </p:par>
                   <p:par>
-                    <p:cTn id="29" fill="hold">
+                    <p:cTn id="30" fill="hold">
                       <p:stCondLst>
                         <p:cond delay="indefinite"/>
                       </p:stCondLst>
                       <p:childTnLst>
                         <p:par>
-                          <p:cTn id="30" fill="hold">
+                          <p:cTn id="31" fill="hold">
                             <p:stCondLst>
                               <p:cond delay="0"/>
                             </p:stCondLst>
                             <p:childTnLst>
                               <p:par>
-                                <p:cTn id="31" presetID="10" presetClass="entr" presetSubtype="0" fill="hold" nodeType="clickEffect">
+                                <p:cTn id="32" presetID="10" presetClass="entr" presetSubtype="0" fill="hold" nodeType="clickEffect">
                                   <p:stCondLst>
                                     <p:cond delay="0"/>
                                   </p:stCondLst>
                                   <p:childTnLst>
                                     <p:set>
                                       <p:cBhvr>
-                                        <p:cTn id="32" dur="1" fill="hold">
+                                        <p:cTn id="33" dur="1" fill="hold">
                                           <p:stCondLst>
                                             <p:cond delay="0"/>
                                           </p:stCondLst>
@@ -19454,11 +19642,316 @@
                                     </p:set>
                                     <p:animEffect transition="in" filter="fade">
                                       <p:cBhvr>
-                                        <p:cTn id="33" dur="500"/>
+                                        <p:cTn id="34" dur="500"/>
                                         <p:tgtEl>
                                           <p:spTgt spid="252">
                                             <p:txEl>
                                               <p:pRg st="0" end="0"/>
+                                            </p:txEl>
+                                          </p:spTgt>
+                                        </p:tgtEl>
+                                      </p:cBhvr>
+                                    </p:animEffect>
+                                  </p:childTnLst>
+                                </p:cTn>
+                              </p:par>
+                            </p:childTnLst>
+                          </p:cTn>
+                        </p:par>
+                      </p:childTnLst>
+                    </p:cTn>
+                  </p:par>
+                  <p:par>
+                    <p:cTn id="35" fill="hold">
+                      <p:stCondLst>
+                        <p:cond delay="indefinite"/>
+                      </p:stCondLst>
+                      <p:childTnLst>
+                        <p:par>
+                          <p:cTn id="36" fill="hold">
+                            <p:stCondLst>
+                              <p:cond delay="0"/>
+                            </p:stCondLst>
+                            <p:childTnLst>
+                              <p:par>
+                                <p:cTn id="37" presetID="10" presetClass="entr" presetSubtype="0" fill="hold" nodeType="clickEffect">
+                                  <p:stCondLst>
+                                    <p:cond delay="0"/>
+                                  </p:stCondLst>
+                                  <p:childTnLst>
+                                    <p:set>
+                                      <p:cBhvr>
+                                        <p:cTn id="38" dur="1" fill="hold">
+                                          <p:stCondLst>
+                                            <p:cond delay="0"/>
+                                          </p:stCondLst>
+                                        </p:cTn>
+                                        <p:tgtEl>
+                                          <p:spTgt spid="252">
+                                            <p:txEl>
+                                              <p:pRg st="1" end="1"/>
+                                            </p:txEl>
+                                          </p:spTgt>
+                                        </p:tgtEl>
+                                        <p:attrNameLst>
+                                          <p:attrName>style.visibility</p:attrName>
+                                        </p:attrNameLst>
+                                      </p:cBhvr>
+                                      <p:to>
+                                        <p:strVal val="visible"/>
+                                      </p:to>
+                                    </p:set>
+                                    <p:animEffect transition="in" filter="fade">
+                                      <p:cBhvr>
+                                        <p:cTn id="39" dur="500"/>
+                                        <p:tgtEl>
+                                          <p:spTgt spid="252">
+                                            <p:txEl>
+                                              <p:pRg st="1" end="1"/>
+                                            </p:txEl>
+                                          </p:spTgt>
+                                        </p:tgtEl>
+                                      </p:cBhvr>
+                                    </p:animEffect>
+                                  </p:childTnLst>
+                                </p:cTn>
+                              </p:par>
+                            </p:childTnLst>
+                          </p:cTn>
+                        </p:par>
+                      </p:childTnLst>
+                    </p:cTn>
+                  </p:par>
+                  <p:par>
+                    <p:cTn id="40" fill="hold">
+                      <p:stCondLst>
+                        <p:cond delay="indefinite"/>
+                      </p:stCondLst>
+                      <p:childTnLst>
+                        <p:par>
+                          <p:cTn id="41" fill="hold">
+                            <p:stCondLst>
+                              <p:cond delay="0"/>
+                            </p:stCondLst>
+                            <p:childTnLst>
+                              <p:par>
+                                <p:cTn id="42" presetID="10" presetClass="entr" presetSubtype="0" fill="hold" nodeType="clickEffect">
+                                  <p:stCondLst>
+                                    <p:cond delay="0"/>
+                                  </p:stCondLst>
+                                  <p:childTnLst>
+                                    <p:set>
+                                      <p:cBhvr>
+                                        <p:cTn id="43" dur="1" fill="hold">
+                                          <p:stCondLst>
+                                            <p:cond delay="0"/>
+                                          </p:stCondLst>
+                                        </p:cTn>
+                                        <p:tgtEl>
+                                          <p:spTgt spid="252">
+                                            <p:txEl>
+                                              <p:pRg st="2" end="2"/>
+                                            </p:txEl>
+                                          </p:spTgt>
+                                        </p:tgtEl>
+                                        <p:attrNameLst>
+                                          <p:attrName>style.visibility</p:attrName>
+                                        </p:attrNameLst>
+                                      </p:cBhvr>
+                                      <p:to>
+                                        <p:strVal val="visible"/>
+                                      </p:to>
+                                    </p:set>
+                                    <p:animEffect transition="in" filter="fade">
+                                      <p:cBhvr>
+                                        <p:cTn id="44" dur="500"/>
+                                        <p:tgtEl>
+                                          <p:spTgt spid="252">
+                                            <p:txEl>
+                                              <p:pRg st="2" end="2"/>
+                                            </p:txEl>
+                                          </p:spTgt>
+                                        </p:tgtEl>
+                                      </p:cBhvr>
+                                    </p:animEffect>
+                                  </p:childTnLst>
+                                </p:cTn>
+                              </p:par>
+                            </p:childTnLst>
+                          </p:cTn>
+                        </p:par>
+                      </p:childTnLst>
+                    </p:cTn>
+                  </p:par>
+                  <p:par>
+                    <p:cTn id="45" fill="hold">
+                      <p:stCondLst>
+                        <p:cond delay="indefinite"/>
+                      </p:stCondLst>
+                      <p:childTnLst>
+                        <p:par>
+                          <p:cTn id="46" fill="hold">
+                            <p:stCondLst>
+                              <p:cond delay="0"/>
+                            </p:stCondLst>
+                            <p:childTnLst>
+                              <p:par>
+                                <p:cTn id="47" presetID="10" presetClass="entr" presetSubtype="0" fill="hold" nodeType="clickEffect">
+                                  <p:stCondLst>
+                                    <p:cond delay="0"/>
+                                  </p:stCondLst>
+                                  <p:childTnLst>
+                                    <p:set>
+                                      <p:cBhvr>
+                                        <p:cTn id="48" dur="1" fill="hold">
+                                          <p:stCondLst>
+                                            <p:cond delay="0"/>
+                                          </p:stCondLst>
+                                        </p:cTn>
+                                        <p:tgtEl>
+                                          <p:spTgt spid="252">
+                                            <p:txEl>
+                                              <p:pRg st="3" end="3"/>
+                                            </p:txEl>
+                                          </p:spTgt>
+                                        </p:tgtEl>
+                                        <p:attrNameLst>
+                                          <p:attrName>style.visibility</p:attrName>
+                                        </p:attrNameLst>
+                                      </p:cBhvr>
+                                      <p:to>
+                                        <p:strVal val="visible"/>
+                                      </p:to>
+                                    </p:set>
+                                    <p:animEffect transition="in" filter="fade">
+                                      <p:cBhvr>
+                                        <p:cTn id="49" dur="500"/>
+                                        <p:tgtEl>
+                                          <p:spTgt spid="252">
+                                            <p:txEl>
+                                              <p:pRg st="3" end="3"/>
+                                            </p:txEl>
+                                          </p:spTgt>
+                                        </p:tgtEl>
+                                      </p:cBhvr>
+                                    </p:animEffect>
+                                  </p:childTnLst>
+                                </p:cTn>
+                              </p:par>
+                            </p:childTnLst>
+                          </p:cTn>
+                        </p:par>
+                      </p:childTnLst>
+                    </p:cTn>
+                  </p:par>
+                  <p:par>
+                    <p:cTn id="50" fill="hold">
+                      <p:stCondLst>
+                        <p:cond delay="indefinite"/>
+                      </p:stCondLst>
+                      <p:childTnLst>
+                        <p:par>
+                          <p:cTn id="51" fill="hold">
+                            <p:stCondLst>
+                              <p:cond delay="0"/>
+                            </p:stCondLst>
+                            <p:childTnLst>
+                              <p:par>
+                                <p:cTn id="52" presetID="10" presetClass="entr" presetSubtype="0" fill="hold" nodeType="clickEffect">
+                                  <p:stCondLst>
+                                    <p:cond delay="0"/>
+                                  </p:stCondLst>
+                                  <p:childTnLst>
+                                    <p:set>
+                                      <p:cBhvr>
+                                        <p:cTn id="53" dur="1" fill="hold">
+                                          <p:stCondLst>
+                                            <p:cond delay="0"/>
+                                          </p:stCondLst>
+                                        </p:cTn>
+                                        <p:tgtEl>
+                                          <p:spTgt spid="252">
+                                            <p:txEl>
+                                              <p:pRg st="4" end="4"/>
+                                            </p:txEl>
+                                          </p:spTgt>
+                                        </p:tgtEl>
+                                        <p:attrNameLst>
+                                          <p:attrName>style.visibility</p:attrName>
+                                        </p:attrNameLst>
+                                      </p:cBhvr>
+                                      <p:to>
+                                        <p:strVal val="visible"/>
+                                      </p:to>
+                                    </p:set>
+                                    <p:animEffect transition="in" filter="fade">
+                                      <p:cBhvr>
+                                        <p:cTn id="54" dur="500"/>
+                                        <p:tgtEl>
+                                          <p:spTgt spid="252">
+                                            <p:txEl>
+                                              <p:pRg st="4" end="4"/>
+                                            </p:txEl>
+                                          </p:spTgt>
+                                        </p:tgtEl>
+                                      </p:cBhvr>
+                                    </p:animEffect>
+                                  </p:childTnLst>
+                                </p:cTn>
+                              </p:par>
+                            </p:childTnLst>
+                          </p:cTn>
+                        </p:par>
+                      </p:childTnLst>
+                    </p:cTn>
+                  </p:par>
+                  <p:par>
+                    <p:cTn id="55" fill="hold">
+                      <p:stCondLst>
+                        <p:cond delay="indefinite"/>
+                      </p:stCondLst>
+                      <p:childTnLst>
+                        <p:par>
+                          <p:cTn id="56" fill="hold">
+                            <p:stCondLst>
+                              <p:cond delay="0"/>
+                            </p:stCondLst>
+                            <p:childTnLst>
+                              <p:par>
+                                <p:cTn id="57" presetID="10" presetClass="entr" presetSubtype="0" fill="hold" nodeType="clickEffect">
+                                  <p:stCondLst>
+                                    <p:cond delay="0"/>
+                                  </p:stCondLst>
+                                  <p:childTnLst>
+                                    <p:set>
+                                      <p:cBhvr>
+                                        <p:cTn id="58" dur="1" fill="hold">
+                                          <p:stCondLst>
+                                            <p:cond delay="0"/>
+                                          </p:stCondLst>
+                                        </p:cTn>
+                                        <p:tgtEl>
+                                          <p:spTgt spid="252">
+                                            <p:txEl>
+                                              <p:pRg st="5" end="5"/>
+                                            </p:txEl>
+                                          </p:spTgt>
+                                        </p:tgtEl>
+                                        <p:attrNameLst>
+                                          <p:attrName>style.visibility</p:attrName>
+                                        </p:attrNameLst>
+                                      </p:cBhvr>
+                                      <p:to>
+                                        <p:strVal val="visible"/>
+                                      </p:to>
+                                    </p:set>
+                                    <p:animEffect transition="in" filter="fade">
+                                      <p:cBhvr>
+                                        <p:cTn id="59" dur="500"/>
+                                        <p:tgtEl>
+                                          <p:spTgt spid="252">
+                                            <p:txEl>
+                                              <p:pRg st="5" end="5"/>
                                             </p:txEl>
                                           </p:spTgt>
                                         </p:tgtEl>
@@ -19501,7 +19994,7 @@
       <p:bldP spid="8" grpId="0" animBg="1"/>
       <p:bldP spid="9" grpId="0"/>
       <p:bldP spid="10" grpId="0" animBg="1"/>
-      <p:bldP spid="11" grpId="0"/>
+      <p:bldP spid="2" grpId="0" animBg="1"/>
     </p:bldLst>
   </p:timing>
 </p:sld>
@@ -22260,13 +22753,13 @@
               <a:buNone/>
             </a:pPr>
             <a:r>
-              <a:rPr lang="en-US" sz="2400" b="1" strike="noStrike" spc="-1" dirty="0">
+              <a:rPr lang="en-US" sz="2400" b="1" spc="-1" dirty="0">
                 <a:solidFill>
                   <a:srgbClr val="FFFFFF"/>
                 </a:solidFill>
                 <a:latin typeface="Calibri"/>
               </a:rPr>
-              <a:t>Installations</a:t>
+              <a:t>PowerShell Setup and Installation</a:t>
             </a:r>
             <a:endParaRPr lang="en-PH" sz="2400" b="0" strike="noStrike" spc="-1" dirty="0">
               <a:latin typeface="Arial"/>
@@ -22290,7 +22783,7 @@
         </p:nvSpPr>
         <p:spPr>
           <a:xfrm>
-            <a:off x="214588" y="1534071"/>
+            <a:off x="214588" y="1296678"/>
             <a:ext cx="8544600" cy="3214427"/>
           </a:xfrm>
           <a:prstGeom prst="rect">
@@ -22484,8 +22977,104 @@
               <a:rPr lang="en-US" sz="1800" spc="-1" dirty="0">
                 <a:latin typeface="Trebuchet MS" panose="020B0603020202020204" pitchFamily="34" charset="0"/>
               </a:rPr>
-              <a:t>Set the execution policy to Unrestricted.	</a:t>
+              <a:t>Set execution policy to be </a:t>
             </a:r>
+            <a:r>
+              <a:rPr lang="en-US" sz="1800" b="1" spc="-1" dirty="0">
+                <a:latin typeface="Trebuchet MS" panose="020B0603020202020204" pitchFamily="34" charset="0"/>
+              </a:rPr>
+              <a:t>Unrestricted</a:t>
+            </a:r>
+            <a:r>
+              <a:rPr lang="en-US" sz="1800" spc="-1" dirty="0">
+                <a:latin typeface="Trebuchet MS" panose="020B0603020202020204" pitchFamily="34" charset="0"/>
+              </a:rPr>
+              <a:t>.</a:t>
+            </a:r>
+          </a:p>
+          <a:p>
+            <a:pPr algn="ctr">
+              <a:lnSpc>
+                <a:spcPct val="100000"/>
+              </a:lnSpc>
+              <a:buFont typeface="Wingdings" panose="05000000000000000000" pitchFamily="2" charset="2"/>
+              <a:buChar char="Ø"/>
+              <a:tabLst>
+                <a:tab pos="0" algn="l"/>
+              </a:tabLst>
+            </a:pPr>
+            <a:r>
+              <a:rPr lang="en-US" sz="1800" spc="-1" dirty="0">
+                <a:latin typeface="Trebuchet MS" panose="020B0603020202020204" pitchFamily="34" charset="0"/>
+              </a:rPr>
+              <a:t>Set-</a:t>
+            </a:r>
+            <a:r>
+              <a:rPr lang="en-US" sz="1800" spc="-1" dirty="0" err="1">
+                <a:latin typeface="Trebuchet MS" panose="020B0603020202020204" pitchFamily="34" charset="0"/>
+              </a:rPr>
+              <a:t>ExecutionPolicy</a:t>
+            </a:r>
+            <a:r>
+              <a:rPr lang="en-US" sz="1800" spc="-1" dirty="0">
+                <a:latin typeface="Trebuchet MS" panose="020B0603020202020204" pitchFamily="34" charset="0"/>
+              </a:rPr>
+              <a:t> –Scope </a:t>
+            </a:r>
+            <a:r>
+              <a:rPr lang="en-US" sz="1800" spc="-1" dirty="0" err="1">
+                <a:latin typeface="Trebuchet MS" panose="020B0603020202020204" pitchFamily="34" charset="0"/>
+              </a:rPr>
+              <a:t>CurrentUser</a:t>
+            </a:r>
+            <a:r>
+              <a:rPr lang="en-US" sz="1800" spc="-1" dirty="0">
+                <a:latin typeface="Trebuchet MS" panose="020B0603020202020204" pitchFamily="34" charset="0"/>
+              </a:rPr>
+              <a:t> –</a:t>
+            </a:r>
+            <a:r>
+              <a:rPr lang="en-US" sz="1800" spc="-1" dirty="0" err="1">
+                <a:latin typeface="Trebuchet MS" panose="020B0603020202020204" pitchFamily="34" charset="0"/>
+              </a:rPr>
+              <a:t>ExecutionPolicy</a:t>
+            </a:r>
+            <a:r>
+              <a:rPr lang="en-US" sz="1800" spc="-1" dirty="0">
+                <a:latin typeface="Trebuchet MS" panose="020B0603020202020204" pitchFamily="34" charset="0"/>
+              </a:rPr>
+              <a:t> Unrestricted</a:t>
+            </a:r>
+          </a:p>
+          <a:p>
+            <a:pPr marL="0" indent="0">
+              <a:lnSpc>
+                <a:spcPct val="100000"/>
+              </a:lnSpc>
+              <a:buFont typeface="Arial" panose="020B0604020202020204" pitchFamily="34" charset="0"/>
+              <a:buNone/>
+              <a:tabLst>
+                <a:tab pos="0" algn="l"/>
+              </a:tabLst>
+            </a:pPr>
+            <a:endParaRPr lang="en-US" sz="1800" spc="-1" dirty="0">
+              <a:latin typeface="Trebuchet MS" panose="020B0603020202020204" pitchFamily="34" charset="0"/>
+            </a:endParaRPr>
+          </a:p>
+          <a:p>
+            <a:pPr marL="0" indent="0">
+              <a:lnSpc>
+                <a:spcPct val="100000"/>
+              </a:lnSpc>
+              <a:buFont typeface="Arial" panose="020B0604020202020204" pitchFamily="34" charset="0"/>
+              <a:buNone/>
+              <a:tabLst>
+                <a:tab pos="0" algn="l"/>
+              </a:tabLst>
+            </a:pPr>
+            <a:endParaRPr lang="en-US" sz="1800" spc="-1" dirty="0">
+              <a:latin typeface="Trebuchet MS" panose="020B0603020202020204" pitchFamily="34" charset="0"/>
+            </a:endParaRPr>
           </a:p>
           <a:p>
             <a:pPr marL="0" indent="0">
@@ -22532,19 +23121,25 @@
               <a:rPr lang="en-US" sz="1800" spc="-1" dirty="0">
                 <a:latin typeface="Trebuchet MS" panose="020B0603020202020204" pitchFamily="34" charset="0"/>
               </a:rPr>
-              <a:t>The recommended way to install </a:t>
+              <a:t>Installing PowerShell 7</a:t>
             </a:r>
-            <a:r>
-              <a:rPr lang="en-US" sz="1800" spc="-1" dirty="0" err="1">
-                <a:latin typeface="Trebuchet MS" panose="020B0603020202020204" pitchFamily="34" charset="0"/>
-              </a:rPr>
-              <a:t>powershell</a:t>
-            </a:r>
+          </a:p>
+          <a:p>
+            <a:pPr marL="0" indent="0">
+              <a:lnSpc>
+                <a:spcPct val="100000"/>
+              </a:lnSpc>
+              <a:buFont typeface="Arial" panose="020B0604020202020204" pitchFamily="34" charset="0"/>
+              <a:buNone/>
+              <a:tabLst>
+                <a:tab pos="0" algn="l"/>
+              </a:tabLst>
+            </a:pPr>
             <a:r>
               <a:rPr lang="en-US" sz="1800" spc="-1" dirty="0">
                 <a:latin typeface="Trebuchet MS" panose="020B0603020202020204" pitchFamily="34" charset="0"/>
               </a:rPr>
-              <a:t> 7 is by using the </a:t>
+              <a:t>The recommended way to install PowerShell 7 is by using the </a:t>
             </a:r>
             <a:r>
               <a:rPr lang="en-US" sz="1800" spc="-1" dirty="0" err="1">
@@ -22623,7 +23218,7 @@
               <a:rPr lang="en-PH" sz="1800" b="1" spc="-1" dirty="0">
                 <a:latin typeface="Trebuchet MS" panose="020B0603020202020204" pitchFamily="34" charset="0"/>
               </a:rPr>
-              <a:t> search --id </a:t>
+              <a:t> install –-id </a:t>
             </a:r>
             <a:r>
               <a:rPr lang="en-PH" sz="1800" b="1" spc="-1" dirty="0" err="1">
@@ -22635,23 +23230,41 @@
               <a:rPr lang="en-PH" sz="1800" b="1" spc="-1" dirty="0">
                 <a:latin typeface="Trebuchet MS" panose="020B0603020202020204" pitchFamily="34" charset="0"/>
               </a:rPr>
-              <a:t> --source </a:t>
-            </a:r>
-            <a:r>
-              <a:rPr lang="en-PH" sz="1800" b="1" spc="-1" dirty="0" err="1">
-                <a:latin typeface="Trebuchet MS" panose="020B0603020202020204" pitchFamily="34" charset="0"/>
-              </a:rPr>
-              <a:t>winget</a:t>
-            </a:r>
-            <a:r>
-              <a:rPr lang="en-PH" sz="1800" b="1" spc="-1" dirty="0">
-                <a:latin typeface="Trebuchet MS" panose="020B0603020202020204" pitchFamily="34" charset="0"/>
-              </a:rPr>
               <a:t>	</a:t>
             </a:r>
           </a:p>
         </p:txBody>
       </p:sp>
+      <p:pic>
+        <p:nvPicPr>
+          <p:cNvPr id="4" name="Picture 3">
+            <a:extLst>
+              <a:ext uri="{FF2B5EF4-FFF2-40B4-BE49-F238E27FC236}">
+                <a16:creationId xmlns:a16="http://schemas.microsoft.com/office/drawing/2014/main" id="{349D1A82-0836-44DE-977C-F5992C61DDA0}"/>
+              </a:ext>
+            </a:extLst>
+          </p:cNvPr>
+          <p:cNvPicPr>
+            <a:picLocks noChangeAspect="1"/>
+          </p:cNvPicPr>
+          <p:nvPr/>
+        </p:nvPicPr>
+        <p:blipFill>
+          <a:blip r:embed="rId2"/>
+          <a:stretch>
+            <a:fillRect/>
+          </a:stretch>
+        </p:blipFill>
+        <p:spPr>
+          <a:xfrm>
+            <a:off x="580292" y="2226890"/>
+            <a:ext cx="8544600" cy="1354001"/>
+          </a:xfrm>
+          <a:prstGeom prst="rect">
+            <a:avLst/>
+          </a:prstGeom>
+        </p:spPr>
+      </p:pic>
     </p:spTree>
     <p:extLst>
       <p:ext uri="{BB962C8B-B14F-4D97-AF65-F5344CB8AC3E}">
@@ -22759,7 +23372,7 @@
                                         <p:tgtEl>
                                           <p:spTgt spid="22">
                                             <p:txEl>
-                                              <p:pRg st="3" end="3"/>
+                                              <p:pRg st="1" end="1"/>
                                             </p:txEl>
                                           </p:spTgt>
                                         </p:tgtEl>
@@ -22777,7 +23390,7 @@
                                         <p:tgtEl>
                                           <p:spTgt spid="22">
                                             <p:txEl>
-                                              <p:pRg st="3" end="3"/>
+                                              <p:pRg st="1" end="1"/>
                                             </p:txEl>
                                           </p:spTgt>
                                         </p:tgtEl>
@@ -22818,11 +23431,7 @@
                                           </p:stCondLst>
                                         </p:cTn>
                                         <p:tgtEl>
-                                          <p:spTgt spid="22">
-                                            <p:txEl>
-                                              <p:pRg st="4" end="4"/>
-                                            </p:txEl>
-                                          </p:spTgt>
+                                          <p:spTgt spid="4"/>
                                         </p:tgtEl>
                                         <p:attrNameLst>
                                           <p:attrName>style.visibility</p:attrName>
@@ -22836,11 +23445,7 @@
                                       <p:cBhvr>
                                         <p:cTn id="17" dur="500"/>
                                         <p:tgtEl>
-                                          <p:spTgt spid="22">
-                                            <p:txEl>
-                                              <p:pRg st="4" end="4"/>
-                                            </p:txEl>
-                                          </p:spTgt>
+                                          <p:spTgt spid="4"/>
                                         </p:tgtEl>
                                       </p:cBhvr>
                                     </p:animEffect>
@@ -22881,7 +23486,7 @@
                                         <p:tgtEl>
                                           <p:spTgt spid="22">
                                             <p:txEl>
-                                              <p:pRg st="5" end="5"/>
+                                              <p:pRg st="6" end="6"/>
                                             </p:txEl>
                                           </p:spTgt>
                                         </p:tgtEl>
@@ -22899,7 +23504,190 @@
                                         <p:tgtEl>
                                           <p:spTgt spid="22">
                                             <p:txEl>
-                                              <p:pRg st="5" end="5"/>
+                                              <p:pRg st="6" end="6"/>
+                                            </p:txEl>
+                                          </p:spTgt>
+                                        </p:tgtEl>
+                                      </p:cBhvr>
+                                    </p:animEffect>
+                                  </p:childTnLst>
+                                </p:cTn>
+                              </p:par>
+                            </p:childTnLst>
+                          </p:cTn>
+                        </p:par>
+                      </p:childTnLst>
+                    </p:cTn>
+                  </p:par>
+                  <p:par>
+                    <p:cTn id="23" fill="hold">
+                      <p:stCondLst>
+                        <p:cond delay="indefinite"/>
+                      </p:stCondLst>
+                      <p:childTnLst>
+                        <p:par>
+                          <p:cTn id="24" fill="hold">
+                            <p:stCondLst>
+                              <p:cond delay="0"/>
+                            </p:stCondLst>
+                            <p:childTnLst>
+                              <p:par>
+                                <p:cTn id="25" presetID="10" presetClass="entr" presetSubtype="0" fill="hold" nodeType="clickEffect">
+                                  <p:stCondLst>
+                                    <p:cond delay="0"/>
+                                  </p:stCondLst>
+                                  <p:childTnLst>
+                                    <p:set>
+                                      <p:cBhvr>
+                                        <p:cTn id="26" dur="1" fill="hold">
+                                          <p:stCondLst>
+                                            <p:cond delay="0"/>
+                                          </p:stCondLst>
+                                        </p:cTn>
+                                        <p:tgtEl>
+                                          <p:spTgt spid="22">
+                                            <p:txEl>
+                                              <p:pRg st="7" end="7"/>
+                                            </p:txEl>
+                                          </p:spTgt>
+                                        </p:tgtEl>
+                                        <p:attrNameLst>
+                                          <p:attrName>style.visibility</p:attrName>
+                                        </p:attrNameLst>
+                                      </p:cBhvr>
+                                      <p:to>
+                                        <p:strVal val="visible"/>
+                                      </p:to>
+                                    </p:set>
+                                    <p:animEffect transition="in" filter="fade">
+                                      <p:cBhvr>
+                                        <p:cTn id="27" dur="500"/>
+                                        <p:tgtEl>
+                                          <p:spTgt spid="22">
+                                            <p:txEl>
+                                              <p:pRg st="7" end="7"/>
+                                            </p:txEl>
+                                          </p:spTgt>
+                                        </p:tgtEl>
+                                      </p:cBhvr>
+                                    </p:animEffect>
+                                  </p:childTnLst>
+                                </p:cTn>
+                              </p:par>
+                            </p:childTnLst>
+                          </p:cTn>
+                        </p:par>
+                      </p:childTnLst>
+                    </p:cTn>
+                  </p:par>
+                  <p:par>
+                    <p:cTn id="28" fill="hold">
+                      <p:stCondLst>
+                        <p:cond delay="indefinite"/>
+                      </p:stCondLst>
+                      <p:childTnLst>
+                        <p:par>
+                          <p:cTn id="29" fill="hold">
+                            <p:stCondLst>
+                              <p:cond delay="0"/>
+                            </p:stCondLst>
+                            <p:childTnLst>
+                              <p:par>
+                                <p:cTn id="30" presetID="10" presetClass="entr" presetSubtype="0" fill="hold" nodeType="clickEffect">
+                                  <p:stCondLst>
+                                    <p:cond delay="0"/>
+                                  </p:stCondLst>
+                                  <p:childTnLst>
+                                    <p:set>
+                                      <p:cBhvr>
+                                        <p:cTn id="31" dur="1" fill="hold">
+                                          <p:stCondLst>
+                                            <p:cond delay="0"/>
+                                          </p:stCondLst>
+                                        </p:cTn>
+                                        <p:tgtEl>
+                                          <p:spTgt spid="22">
+                                            <p:txEl>
+                                              <p:pRg st="8" end="8"/>
+                                            </p:txEl>
+                                          </p:spTgt>
+                                        </p:tgtEl>
+                                        <p:attrNameLst>
+                                          <p:attrName>style.visibility</p:attrName>
+                                        </p:attrNameLst>
+                                      </p:cBhvr>
+                                      <p:to>
+                                        <p:strVal val="visible"/>
+                                      </p:to>
+                                    </p:set>
+                                    <p:animEffect transition="in" filter="fade">
+                                      <p:cBhvr>
+                                        <p:cTn id="32" dur="500"/>
+                                        <p:tgtEl>
+                                          <p:spTgt spid="22">
+                                            <p:txEl>
+                                              <p:pRg st="8" end="8"/>
+                                            </p:txEl>
+                                          </p:spTgt>
+                                        </p:tgtEl>
+                                      </p:cBhvr>
+                                    </p:animEffect>
+                                  </p:childTnLst>
+                                </p:cTn>
+                              </p:par>
+                            </p:childTnLst>
+                          </p:cTn>
+                        </p:par>
+                      </p:childTnLst>
+                    </p:cTn>
+                  </p:par>
+                  <p:par>
+                    <p:cTn id="33" fill="hold">
+                      <p:stCondLst>
+                        <p:cond delay="indefinite"/>
+                      </p:stCondLst>
+                      <p:childTnLst>
+                        <p:par>
+                          <p:cTn id="34" fill="hold">
+                            <p:stCondLst>
+                              <p:cond delay="0"/>
+                            </p:stCondLst>
+                            <p:childTnLst>
+                              <p:par>
+                                <p:cTn id="35" presetID="10" presetClass="entr" presetSubtype="0" fill="hold" nodeType="clickEffect">
+                                  <p:stCondLst>
+                                    <p:cond delay="0"/>
+                                  </p:stCondLst>
+                                  <p:childTnLst>
+                                    <p:set>
+                                      <p:cBhvr>
+                                        <p:cTn id="36" dur="1" fill="hold">
+                                          <p:stCondLst>
+                                            <p:cond delay="0"/>
+                                          </p:stCondLst>
+                                        </p:cTn>
+                                        <p:tgtEl>
+                                          <p:spTgt spid="22">
+                                            <p:txEl>
+                                              <p:pRg st="9" end="9"/>
+                                            </p:txEl>
+                                          </p:spTgt>
+                                        </p:tgtEl>
+                                        <p:attrNameLst>
+                                          <p:attrName>style.visibility</p:attrName>
+                                        </p:attrNameLst>
+                                      </p:cBhvr>
+                                      <p:to>
+                                        <p:strVal val="visible"/>
+                                      </p:to>
+                                    </p:set>
+                                    <p:animEffect transition="in" filter="fade">
+                                      <p:cBhvr>
+                                        <p:cTn id="37" dur="500"/>
+                                        <p:tgtEl>
+                                          <p:spTgt spid="22">
+                                            <p:txEl>
+                                              <p:pRg st="9" end="9"/>
                                             </p:txEl>
                                           </p:spTgt>
                                         </p:tgtEl>
@@ -24600,7 +25388,7 @@
                             </p:stCondLst>
                             <p:childTnLst>
                               <p:par>
-                                <p:cTn id="5" presetID="6" presetClass="entr" presetSubtype="16" fill="hold" nodeType="clickEffect">
+                                <p:cTn id="5" presetID="10" presetClass="entr" presetSubtype="0" fill="hold" nodeType="clickEffect">
                                   <p:stCondLst>
                                     <p:cond delay="0"/>
                                   </p:stCondLst>
@@ -24613,7 +25401,11 @@
                                           </p:stCondLst>
                                         </p:cTn>
                                         <p:tgtEl>
-                                          <p:spTgt spid="2"/>
+                                          <p:spTgt spid="5">
+                                            <p:txEl>
+                                              <p:pRg st="0" end="0"/>
+                                            </p:txEl>
+                                          </p:spTgt>
                                         </p:tgtEl>
                                         <p:attrNameLst>
                                           <p:attrName>style.visibility</p:attrName>
@@ -24623,11 +25415,15 @@
                                         <p:strVal val="visible"/>
                                       </p:to>
                                     </p:set>
-                                    <p:animEffect transition="in" filter="circle(in)">
+                                    <p:animEffect transition="in" filter="fade">
                                       <p:cBhvr>
-                                        <p:cTn id="7" dur="2000"/>
+                                        <p:cTn id="7" dur="500"/>
                                         <p:tgtEl>
-                                          <p:spTgt spid="2"/>
+                                          <p:spTgt spid="5">
+                                            <p:txEl>
+                                              <p:pRg st="0" end="0"/>
+                                            </p:txEl>
+                                          </p:spTgt>
                                         </p:tgtEl>
                                       </p:cBhvr>
                                     </p:animEffect>
@@ -24668,7 +25464,7 @@
                                         <p:tgtEl>
                                           <p:spTgt spid="5">
                                             <p:txEl>
-                                              <p:pRg st="0" end="0"/>
+                                              <p:pRg st="1" end="1"/>
                                             </p:txEl>
                                           </p:spTgt>
                                         </p:tgtEl>
@@ -24686,7 +25482,7 @@
                                         <p:tgtEl>
                                           <p:spTgt spid="5">
                                             <p:txEl>
-                                              <p:pRg st="0" end="0"/>
+                                              <p:pRg st="1" end="1"/>
                                             </p:txEl>
                                           </p:spTgt>
                                         </p:tgtEl>
@@ -24729,7 +25525,7 @@
                                         <p:tgtEl>
                                           <p:spTgt spid="5">
                                             <p:txEl>
-                                              <p:pRg st="1" end="1"/>
+                                              <p:pRg st="2" end="2"/>
                                             </p:txEl>
                                           </p:spTgt>
                                         </p:tgtEl>
@@ -24747,7 +25543,7 @@
                                         <p:tgtEl>
                                           <p:spTgt spid="5">
                                             <p:txEl>
-                                              <p:pRg st="1" end="1"/>
+                                              <p:pRg st="2" end="2"/>
                                             </p:txEl>
                                           </p:spTgt>
                                         </p:tgtEl>
@@ -24790,7 +25586,7 @@
                                         <p:tgtEl>
                                           <p:spTgt spid="5">
                                             <p:txEl>
-                                              <p:pRg st="2" end="2"/>
+                                              <p:pRg st="3" end="3"/>
                                             </p:txEl>
                                           </p:spTgt>
                                         </p:tgtEl>
@@ -24808,7 +25604,7 @@
                                         <p:tgtEl>
                                           <p:spTgt spid="5">
                                             <p:txEl>
-                                              <p:pRg st="2" end="2"/>
+                                              <p:pRg st="3" end="3"/>
                                             </p:txEl>
                                           </p:spTgt>
                                         </p:tgtEl>
@@ -24851,7 +25647,7 @@
                                         <p:tgtEl>
                                           <p:spTgt spid="5">
                                             <p:txEl>
-                                              <p:pRg st="3" end="3"/>
+                                              <p:pRg st="4" end="4"/>
                                             </p:txEl>
                                           </p:spTgt>
                                         </p:tgtEl>
@@ -24869,7 +25665,7 @@
                                         <p:tgtEl>
                                           <p:spTgt spid="5">
                                             <p:txEl>
-                                              <p:pRg st="3" end="3"/>
+                                              <p:pRg st="4" end="4"/>
                                             </p:txEl>
                                           </p:spTgt>
                                         </p:tgtEl>
@@ -24912,7 +25708,7 @@
                                         <p:tgtEl>
                                           <p:spTgt spid="5">
                                             <p:txEl>
-                                              <p:pRg st="4" end="4"/>
+                                              <p:pRg st="5" end="5"/>
                                             </p:txEl>
                                           </p:spTgt>
                                         </p:tgtEl>
@@ -24930,7 +25726,7 @@
                                         <p:tgtEl>
                                           <p:spTgt spid="5">
                                             <p:txEl>
-                                              <p:pRg st="4" end="4"/>
+                                              <p:pRg st="5" end="5"/>
                                             </p:txEl>
                                           </p:spTgt>
                                         </p:tgtEl>
@@ -24973,7 +25769,7 @@
                                         <p:tgtEl>
                                           <p:spTgt spid="5">
                                             <p:txEl>
-                                              <p:pRg st="5" end="5"/>
+                                              <p:pRg st="6" end="6"/>
                                             </p:txEl>
                                           </p:spTgt>
                                         </p:tgtEl>
@@ -24991,7 +25787,7 @@
                                         <p:tgtEl>
                                           <p:spTgt spid="5">
                                             <p:txEl>
-                                              <p:pRg st="5" end="5"/>
+                                              <p:pRg st="6" end="6"/>
                                             </p:txEl>
                                           </p:spTgt>
                                         </p:tgtEl>
@@ -25034,7 +25830,7 @@
                                         <p:tgtEl>
                                           <p:spTgt spid="5">
                                             <p:txEl>
-                                              <p:pRg st="6" end="6"/>
+                                              <p:pRg st="7" end="7"/>
                                             </p:txEl>
                                           </p:spTgt>
                                         </p:tgtEl>
@@ -25052,7 +25848,7 @@
                                         <p:tgtEl>
                                           <p:spTgt spid="5">
                                             <p:txEl>
-                                              <p:pRg st="6" end="6"/>
+                                              <p:pRg st="7" end="7"/>
                                             </p:txEl>
                                           </p:spTgt>
                                         </p:tgtEl>
@@ -25095,7 +25891,7 @@
                                         <p:tgtEl>
                                           <p:spTgt spid="5">
                                             <p:txEl>
-                                              <p:pRg st="7" end="7"/>
+                                              <p:pRg st="8" end="8"/>
                                             </p:txEl>
                                           </p:spTgt>
                                         </p:tgtEl>
@@ -25113,7 +25909,7 @@
                                         <p:tgtEl>
                                           <p:spTgt spid="5">
                                             <p:txEl>
-                                              <p:pRg st="7" end="7"/>
+                                              <p:pRg st="8" end="8"/>
                                             </p:txEl>
                                           </p:spTgt>
                                         </p:tgtEl>
@@ -25156,7 +25952,7 @@
                                         <p:tgtEl>
                                           <p:spTgt spid="5">
                                             <p:txEl>
-                                              <p:pRg st="8" end="8"/>
+                                              <p:pRg st="9" end="9"/>
                                             </p:txEl>
                                           </p:spTgt>
                                         </p:tgtEl>
@@ -25174,7 +25970,7 @@
                                         <p:tgtEl>
                                           <p:spTgt spid="5">
                                             <p:txEl>
-                                              <p:pRg st="8" end="8"/>
+                                              <p:pRg st="9" end="9"/>
                                             </p:txEl>
                                           </p:spTgt>
                                         </p:tgtEl>
@@ -25217,7 +26013,7 @@
                                         <p:tgtEl>
                                           <p:spTgt spid="5">
                                             <p:txEl>
-                                              <p:pRg st="9" end="9"/>
+                                              <p:pRg st="10" end="10"/>
                                             </p:txEl>
                                           </p:spTgt>
                                         </p:tgtEl>
@@ -25235,7 +26031,7 @@
                                         <p:tgtEl>
                                           <p:spTgt spid="5">
                                             <p:txEl>
-                                              <p:pRg st="9" end="9"/>
+                                              <p:pRg st="10" end="10"/>
                                             </p:txEl>
                                           </p:spTgt>
                                         </p:tgtEl>
@@ -25247,40 +26043,27 @@
                             </p:childTnLst>
                           </p:cTn>
                         </p:par>
-                      </p:childTnLst>
-                    </p:cTn>
-                  </p:par>
-                  <p:par>
-                    <p:cTn id="58" fill="hold">
-                      <p:stCondLst>
-                        <p:cond delay="indefinite"/>
-                      </p:stCondLst>
-                      <p:childTnLst>
                         <p:par>
-                          <p:cTn id="59" fill="hold">
+                          <p:cTn id="58" fill="hold">
                             <p:stCondLst>
-                              <p:cond delay="0"/>
+                              <p:cond delay="500"/>
                             </p:stCondLst>
                             <p:childTnLst>
                               <p:par>
-                                <p:cTn id="60" presetID="10" presetClass="entr" presetSubtype="0" fill="hold" nodeType="clickEffect">
+                                <p:cTn id="59" presetID="6" presetClass="entr" presetSubtype="16" fill="hold" nodeType="afterEffect">
                                   <p:stCondLst>
                                     <p:cond delay="0"/>
                                   </p:stCondLst>
                                   <p:childTnLst>
                                     <p:set>
                                       <p:cBhvr>
-                                        <p:cTn id="61" dur="1" fill="hold">
+                                        <p:cTn id="60" dur="1" fill="hold">
                                           <p:stCondLst>
                                             <p:cond delay="0"/>
                                           </p:stCondLst>
                                         </p:cTn>
                                         <p:tgtEl>
-                                          <p:spTgt spid="5">
-                                            <p:txEl>
-                                              <p:pRg st="10" end="10"/>
-                                            </p:txEl>
-                                          </p:spTgt>
+                                          <p:spTgt spid="2"/>
                                         </p:tgtEl>
                                         <p:attrNameLst>
                                           <p:attrName>style.visibility</p:attrName>
@@ -25290,15 +26073,11 @@
                                         <p:strVal val="visible"/>
                                       </p:to>
                                     </p:set>
-                                    <p:animEffect transition="in" filter="fade">
+                                    <p:animEffect transition="in" filter="circle(in)">
                                       <p:cBhvr>
-                                        <p:cTn id="62" dur="500"/>
+                                        <p:cTn id="61" dur="2000"/>
                                         <p:tgtEl>
-                                          <p:spTgt spid="5">
-                                            <p:txEl>
-                                              <p:pRg st="10" end="10"/>
-                                            </p:txEl>
-                                          </p:spTgt>
+                                          <p:spTgt spid="2"/>
                                         </p:tgtEl>
                                       </p:cBhvr>
                                     </p:animEffect>

</xml_diff>